<commit_message>
fix typo in the VM instructions
</commit_message>
<xml_diff>
--- a/VM_instructions.pptx
+++ b/VM_instructions.pptx
@@ -14,6 +14,8 @@
     <p:sldId id="262" r:id="rId11"/>
     <p:sldId id="263" r:id="rId12"/>
     <p:sldId id="264" r:id="rId13"/>
+    <p:sldId id="265" r:id="rId14"/>
+    <p:sldId id="266" r:id="rId15"/>
   </p:sldIdLst>
   <p:sldSz cx="12192000" cy="6858000"/>
   <p:notesSz cx="6858000" cy="9144000"/>
@@ -291,7 +293,7 @@
           <a:p>
             <a:fld id="{A97D098C-81A2-4741-849D-B3F04101F1CD}" type="datetimeFigureOut">
               <a:rPr lang="en-AU" smtClean="0"/>
-              <a:t>31/07/2020</a:t>
+              <a:t>9/08/2020</a:t>
             </a:fld>
             <a:endParaRPr lang="en-AU"/>
           </a:p>
@@ -606,7 +608,7 @@
           <a:p>
             <a:fld id="{A97D098C-81A2-4741-849D-B3F04101F1CD}" type="datetimeFigureOut">
               <a:rPr lang="en-AU" smtClean="0"/>
-              <a:t>31/07/2020</a:t>
+              <a:t>9/08/2020</a:t>
             </a:fld>
             <a:endParaRPr lang="en-AU"/>
           </a:p>
@@ -828,7 +830,7 @@
           <a:p>
             <a:fld id="{A97D098C-81A2-4741-849D-B3F04101F1CD}" type="datetimeFigureOut">
               <a:rPr lang="en-AU" smtClean="0"/>
-              <a:t>31/07/2020</a:t>
+              <a:t>9/08/2020</a:t>
             </a:fld>
             <a:endParaRPr lang="en-AU"/>
           </a:p>
@@ -1119,7 +1121,7 @@
           <a:p>
             <a:fld id="{A97D098C-81A2-4741-849D-B3F04101F1CD}" type="datetimeFigureOut">
               <a:rPr lang="en-AU" smtClean="0"/>
-              <a:t>31/07/2020</a:t>
+              <a:t>9/08/2020</a:t>
             </a:fld>
             <a:endParaRPr lang="en-AU"/>
           </a:p>
@@ -1573,7 +1575,7 @@
           <a:p>
             <a:fld id="{A97D098C-81A2-4741-849D-B3F04101F1CD}" type="datetimeFigureOut">
               <a:rPr lang="en-AU" smtClean="0"/>
-              <a:t>31/07/2020</a:t>
+              <a:t>9/08/2020</a:t>
             </a:fld>
             <a:endParaRPr lang="en-AU"/>
           </a:p>
@@ -2149,7 +2151,7 @@
           <a:p>
             <a:fld id="{A97D098C-81A2-4741-849D-B3F04101F1CD}" type="datetimeFigureOut">
               <a:rPr lang="en-AU" smtClean="0"/>
-              <a:t>31/07/2020</a:t>
+              <a:t>9/08/2020</a:t>
             </a:fld>
             <a:endParaRPr lang="en-AU"/>
           </a:p>
@@ -3010,7 +3012,7 @@
           <a:p>
             <a:fld id="{A97D098C-81A2-4741-849D-B3F04101F1CD}" type="datetimeFigureOut">
               <a:rPr lang="en-AU" smtClean="0"/>
-              <a:t>31/07/2020</a:t>
+              <a:t>9/08/2020</a:t>
             </a:fld>
             <a:endParaRPr lang="en-AU"/>
           </a:p>
@@ -3215,7 +3217,7 @@
           <a:p>
             <a:fld id="{A97D098C-81A2-4741-849D-B3F04101F1CD}" type="datetimeFigureOut">
               <a:rPr lang="en-AU" smtClean="0"/>
-              <a:t>31/07/2020</a:t>
+              <a:t>9/08/2020</a:t>
             </a:fld>
             <a:endParaRPr lang="en-AU"/>
           </a:p>
@@ -3429,7 +3431,7 @@
           <a:p>
             <a:fld id="{A97D098C-81A2-4741-849D-B3F04101F1CD}" type="datetimeFigureOut">
               <a:rPr lang="en-AU" smtClean="0"/>
-              <a:t>31/07/2020</a:t>
+              <a:t>9/08/2020</a:t>
             </a:fld>
             <a:endParaRPr lang="en-AU"/>
           </a:p>
@@ -3634,7 +3636,7 @@
           <a:p>
             <a:fld id="{A97D098C-81A2-4741-849D-B3F04101F1CD}" type="datetimeFigureOut">
               <a:rPr lang="en-AU" smtClean="0"/>
-              <a:t>31/07/2020</a:t>
+              <a:t>9/08/2020</a:t>
             </a:fld>
             <a:endParaRPr lang="en-AU"/>
           </a:p>
@@ -3914,7 +3916,7 @@
           <a:p>
             <a:fld id="{A97D098C-81A2-4741-849D-B3F04101F1CD}" type="datetimeFigureOut">
               <a:rPr lang="en-AU" smtClean="0"/>
-              <a:t>31/07/2020</a:t>
+              <a:t>9/08/2020</a:t>
             </a:fld>
             <a:endParaRPr lang="en-AU"/>
           </a:p>
@@ -4181,7 +4183,7 @@
           <a:p>
             <a:fld id="{A97D098C-81A2-4741-849D-B3F04101F1CD}" type="datetimeFigureOut">
               <a:rPr lang="en-AU" smtClean="0"/>
-              <a:t>31/07/2020</a:t>
+              <a:t>9/08/2020</a:t>
             </a:fld>
             <a:endParaRPr lang="en-AU"/>
           </a:p>
@@ -4596,7 +4598,7 @@
           <a:p>
             <a:fld id="{A97D098C-81A2-4741-849D-B3F04101F1CD}" type="datetimeFigureOut">
               <a:rPr lang="en-AU" smtClean="0"/>
-              <a:t>31/07/2020</a:t>
+              <a:t>9/08/2020</a:t>
             </a:fld>
             <a:endParaRPr lang="en-AU"/>
           </a:p>
@@ -4744,7 +4746,7 @@
           <a:p>
             <a:fld id="{A97D098C-81A2-4741-849D-B3F04101F1CD}" type="datetimeFigureOut">
               <a:rPr lang="en-AU" smtClean="0"/>
-              <a:t>31/07/2020</a:t>
+              <a:t>9/08/2020</a:t>
             </a:fld>
             <a:endParaRPr lang="en-AU"/>
           </a:p>
@@ -4869,7 +4871,7 @@
           <a:p>
             <a:fld id="{A97D098C-81A2-4741-849D-B3F04101F1CD}" type="datetimeFigureOut">
               <a:rPr lang="en-AU" smtClean="0"/>
-              <a:t>31/07/2020</a:t>
+              <a:t>9/08/2020</a:t>
             </a:fld>
             <a:endParaRPr lang="en-AU"/>
           </a:p>
@@ -5148,7 +5150,7 @@
           <a:p>
             <a:fld id="{A97D098C-81A2-4741-849D-B3F04101F1CD}" type="datetimeFigureOut">
               <a:rPr lang="en-AU" smtClean="0"/>
-              <a:t>31/07/2020</a:t>
+              <a:t>9/08/2020</a:t>
             </a:fld>
             <a:endParaRPr lang="en-AU"/>
           </a:p>
@@ -5463,7 +5465,7 @@
           <a:p>
             <a:fld id="{A97D098C-81A2-4741-849D-B3F04101F1CD}" type="datetimeFigureOut">
               <a:rPr lang="en-AU" smtClean="0"/>
-              <a:t>31/07/2020</a:t>
+              <a:t>9/08/2020</a:t>
             </a:fld>
             <a:endParaRPr lang="en-AU"/>
           </a:p>
@@ -5716,7 +5718,7 @@
           <a:p>
             <a:fld id="{A97D098C-81A2-4741-849D-B3F04101F1CD}" type="datetimeFigureOut">
               <a:rPr lang="en-AU" smtClean="0"/>
-              <a:t>31/07/2020</a:t>
+              <a:t>9/08/2020</a:t>
             </a:fld>
             <a:endParaRPr lang="en-AU"/>
           </a:p>
@@ -6247,19 +6249,7 @@
               <a:rPr lang="en-AU" dirty="0" smtClean="0">
                 <a:latin typeface="Lucida Sans Typewriter" panose="020B0509030504030204" pitchFamily="49" charset="0"/>
               </a:rPr>
-              <a:t> Notebooks</a:t>
-            </a:r>
-            <a:r>
-              <a:rPr lang="en-AU" dirty="0" smtClean="0">
-                <a:latin typeface="Lucida Sans Typewriter" panose="020B0509030504030204" pitchFamily="49" charset="0"/>
-              </a:rPr>
-              <a:t> </a:t>
-            </a:r>
-            <a:r>
-              <a:rPr lang="en-AU" dirty="0" smtClean="0">
-                <a:latin typeface="Lucida Sans Typewriter" panose="020B0509030504030204" pitchFamily="49" charset="0"/>
-              </a:rPr>
-              <a:t>with </a:t>
+              <a:t> Notebooks with </a:t>
             </a:r>
             <a:r>
               <a:rPr lang="en-AU" dirty="0" err="1" smtClean="0">
@@ -6323,6 +6313,543 @@
       </p:par>
     </p:tnLst>
   </p:timing>
+</p:sld>
+</file>
+
+<file path=ppt/slides/slide10.xml><?xml version="1.0" encoding="utf-8"?>
+<p:sld xmlns:a="http://schemas.openxmlformats.org/drawingml/2006/main" xmlns:r="http://schemas.openxmlformats.org/officeDocument/2006/relationships" xmlns:p="http://schemas.openxmlformats.org/presentationml/2006/main">
+  <p:cSld>
+    <p:spTree>
+      <p:nvGrpSpPr>
+        <p:cNvPr id="1" name=""/>
+        <p:cNvGrpSpPr/>
+        <p:nvPr/>
+      </p:nvGrpSpPr>
+      <p:grpSpPr>
+        <a:xfrm>
+          <a:off x="0" y="0"/>
+          <a:ext cx="0" cy="0"/>
+          <a:chOff x="0" y="0"/>
+          <a:chExt cx="0" cy="0"/>
+        </a:xfrm>
+      </p:grpSpPr>
+      <p:sp>
+        <p:nvSpPr>
+          <p:cNvPr id="2" name="Title 1"/>
+          <p:cNvSpPr>
+            <a:spLocks noGrp="1"/>
+          </p:cNvSpPr>
+          <p:nvPr>
+            <p:ph type="title"/>
+          </p:nvPr>
+        </p:nvSpPr>
+        <p:spPr>
+          <a:xfrm>
+            <a:off x="913775" y="618517"/>
+            <a:ext cx="10364451" cy="1143915"/>
+          </a:xfrm>
+        </p:spPr>
+        <p:txBody>
+          <a:bodyPr/>
+          <a:lstStyle/>
+          <a:p>
+            <a:r>
+              <a:rPr lang="en-AU" dirty="0" smtClean="0"/>
+              <a:t>VAGRANT BASIC COMMANDS</a:t>
+            </a:r>
+            <a:endParaRPr lang="en-AU" dirty="0"/>
+          </a:p>
+        </p:txBody>
+      </p:sp>
+      <p:sp>
+        <p:nvSpPr>
+          <p:cNvPr id="3" name="TextBox 2"/>
+          <p:cNvSpPr txBox="1"/>
+          <p:nvPr/>
+        </p:nvSpPr>
+        <p:spPr>
+          <a:xfrm>
+            <a:off x="1474840" y="2168013"/>
+            <a:ext cx="9070258" cy="3416320"/>
+          </a:xfrm>
+          <a:prstGeom prst="rect">
+            <a:avLst/>
+          </a:prstGeom>
+          <a:noFill/>
+        </p:spPr>
+        <p:txBody>
+          <a:bodyPr wrap="square" rtlCol="0">
+            <a:spAutoFit/>
+          </a:bodyPr>
+          <a:lstStyle/>
+          <a:p>
+            <a:r>
+              <a:rPr lang="en-AU" dirty="0" smtClean="0"/>
+              <a:t>The basics vagrant commands to manage your virtual instance.</a:t>
+            </a:r>
+          </a:p>
+          <a:p>
+            <a:pPr marL="285750" indent="-285750">
+              <a:buFont typeface="Arial" panose="020B0604020202020204" pitchFamily="34" charset="0"/>
+              <a:buChar char="•"/>
+            </a:pPr>
+            <a:r>
+              <a:rPr lang="en-AU" dirty="0" smtClean="0"/>
+              <a:t>Command: </a:t>
+            </a:r>
+            <a:r>
+              <a:rPr lang="en-AU" b="1" dirty="0" smtClean="0"/>
+              <a:t>vagrant up</a:t>
+            </a:r>
+          </a:p>
+          <a:p>
+            <a:r>
+              <a:rPr lang="en-AU" dirty="0" smtClean="0"/>
+              <a:t>	This command creates and configures guest machines according to your </a:t>
+            </a:r>
+            <a:r>
+              <a:rPr lang="en-AU" dirty="0" err="1" smtClean="0"/>
+              <a:t>Vagrantfile</a:t>
+            </a:r>
+            <a:r>
+              <a:rPr lang="en-AU" dirty="0" smtClean="0"/>
+              <a:t>.</a:t>
+            </a:r>
+          </a:p>
+          <a:p>
+            <a:r>
+              <a:rPr lang="en-AU" dirty="0" smtClean="0"/>
+              <a:t>	This is the single most important command in Vagrant, since it is how any Vagrant machine is 	created. Anyone using Vagrant must use this command on a day-to-day basis.</a:t>
+            </a:r>
+          </a:p>
+          <a:p>
+            <a:endParaRPr lang="en-AU" dirty="0" smtClean="0"/>
+          </a:p>
+          <a:p>
+            <a:pPr marL="285750" indent="-285750">
+              <a:buFont typeface="Arial" panose="020B0604020202020204" pitchFamily="34" charset="0"/>
+              <a:buChar char="•"/>
+            </a:pPr>
+            <a:r>
+              <a:rPr lang="en-AU" dirty="0" smtClean="0"/>
+              <a:t>Command: </a:t>
+            </a:r>
+            <a:r>
+              <a:rPr lang="en-AU" b="1" dirty="0" smtClean="0"/>
+              <a:t>vagrant </a:t>
+            </a:r>
+            <a:r>
+              <a:rPr lang="en-AU" b="1" dirty="0" err="1" smtClean="0"/>
+              <a:t>ssh</a:t>
+            </a:r>
+            <a:endParaRPr lang="en-AU" b="1" dirty="0" smtClean="0"/>
+          </a:p>
+          <a:p>
+            <a:pPr lvl="1"/>
+            <a:r>
+              <a:rPr lang="en-AU" dirty="0" smtClean="0"/>
+              <a:t>This will SSH (</a:t>
+            </a:r>
+            <a:r>
+              <a:rPr lang="en-AU" i="1" dirty="0" smtClean="0"/>
+              <a:t>S</a:t>
+            </a:r>
+            <a:r>
+              <a:rPr lang="en-AU" dirty="0" smtClean="0"/>
+              <a:t>ecure </a:t>
+            </a:r>
+            <a:r>
+              <a:rPr lang="en-AU" i="1" dirty="0" err="1" smtClean="0"/>
+              <a:t>SH</a:t>
+            </a:r>
+            <a:r>
+              <a:rPr lang="en-AU" dirty="0" err="1" smtClean="0"/>
+              <a:t>ell</a:t>
+            </a:r>
+            <a:r>
+              <a:rPr lang="en-AU" dirty="0" smtClean="0"/>
+              <a:t>) into a running Vagrant machine and give you access to a shell.</a:t>
+            </a:r>
+          </a:p>
+          <a:p>
+            <a:pPr lvl="1"/>
+            <a:endParaRPr lang="en-AU" dirty="0"/>
+          </a:p>
+          <a:p>
+            <a:pPr marL="285750" indent="-285750">
+              <a:buFont typeface="Arial" panose="020B0604020202020204" pitchFamily="34" charset="0"/>
+              <a:buChar char="•"/>
+            </a:pPr>
+            <a:r>
+              <a:rPr lang="en-AU" dirty="0" smtClean="0"/>
+              <a:t>Command: </a:t>
+            </a:r>
+            <a:r>
+              <a:rPr lang="en-AU" b="1" dirty="0" smtClean="0"/>
+              <a:t>vagrant status</a:t>
+            </a:r>
+          </a:p>
+          <a:p>
+            <a:pPr lvl="1"/>
+            <a:r>
+              <a:rPr lang="en-AU" dirty="0" smtClean="0"/>
+              <a:t>This will tell you the state of the machines Vagrant is managing. (running, suspended, not created, etc.  This command tells you the state of the underlying guest machine.</a:t>
+            </a:r>
+          </a:p>
+        </p:txBody>
+      </p:sp>
+      <p:sp>
+        <p:nvSpPr>
+          <p:cNvPr id="6" name="Footer Placeholder 5"/>
+          <p:cNvSpPr>
+            <a:spLocks noGrp="1"/>
+          </p:cNvSpPr>
+          <p:nvPr>
+            <p:ph type="ftr" sz="quarter" idx="11"/>
+          </p:nvPr>
+        </p:nvSpPr>
+        <p:spPr>
+          <a:xfrm>
+            <a:off x="913774" y="5611761"/>
+            <a:ext cx="6672887" cy="636639"/>
+          </a:xfrm>
+        </p:spPr>
+        <p:txBody>
+          <a:bodyPr/>
+          <a:lstStyle/>
+          <a:p>
+            <a:r>
+              <a:rPr lang="en-AU" dirty="0" smtClean="0">
+                <a:hlinkClick r:id="rId2"/>
+              </a:rPr>
+              <a:t>https://www.vagrantup.com/docs/cli/up</a:t>
+            </a:r>
+            <a:endParaRPr lang="en-AU" dirty="0" smtClean="0"/>
+          </a:p>
+          <a:p>
+            <a:r>
+              <a:rPr lang="en-AU" dirty="0">
+                <a:hlinkClick r:id="rId3"/>
+              </a:rPr>
+              <a:t>https://</a:t>
+            </a:r>
+            <a:r>
+              <a:rPr lang="en-AU" dirty="0" smtClean="0">
+                <a:hlinkClick r:id="rId3"/>
+              </a:rPr>
+              <a:t>www.vagrantup.com/docs/cli/ssh</a:t>
+            </a:r>
+            <a:endParaRPr lang="en-AU" dirty="0" smtClean="0"/>
+          </a:p>
+          <a:p>
+            <a:r>
+              <a:rPr lang="en-AU" dirty="0">
+                <a:hlinkClick r:id="rId4"/>
+              </a:rPr>
+              <a:t>https://www.vagrantup.com/docs/cli/status</a:t>
+            </a:r>
+            <a:endParaRPr lang="en-AU" dirty="0" smtClean="0"/>
+          </a:p>
+          <a:p>
+            <a:endParaRPr lang="en-AU" dirty="0"/>
+          </a:p>
+        </p:txBody>
+      </p:sp>
+    </p:spTree>
+    <p:extLst>
+      <p:ext uri="{BB962C8B-B14F-4D97-AF65-F5344CB8AC3E}">
+        <p14:creationId xmlns:p14="http://schemas.microsoft.com/office/powerpoint/2010/main" val="1052113141"/>
+      </p:ext>
+    </p:extLst>
+  </p:cSld>
+  <p:clrMapOvr>
+    <a:masterClrMapping/>
+  </p:clrMapOvr>
+</p:sld>
+</file>
+
+<file path=ppt/slides/slide11.xml><?xml version="1.0" encoding="utf-8"?>
+<p:sld xmlns:a="http://schemas.openxmlformats.org/drawingml/2006/main" xmlns:r="http://schemas.openxmlformats.org/officeDocument/2006/relationships" xmlns:p="http://schemas.openxmlformats.org/presentationml/2006/main">
+  <p:cSld>
+    <p:spTree>
+      <p:nvGrpSpPr>
+        <p:cNvPr id="1" name=""/>
+        <p:cNvGrpSpPr/>
+        <p:nvPr/>
+      </p:nvGrpSpPr>
+      <p:grpSpPr>
+        <a:xfrm>
+          <a:off x="0" y="0"/>
+          <a:ext cx="0" cy="0"/>
+          <a:chOff x="0" y="0"/>
+          <a:chExt cx="0" cy="0"/>
+        </a:xfrm>
+      </p:grpSpPr>
+      <p:sp>
+        <p:nvSpPr>
+          <p:cNvPr id="2" name="Title 1"/>
+          <p:cNvSpPr>
+            <a:spLocks noGrp="1"/>
+          </p:cNvSpPr>
+          <p:nvPr>
+            <p:ph type="title"/>
+          </p:nvPr>
+        </p:nvSpPr>
+        <p:spPr>
+          <a:xfrm>
+            <a:off x="913775" y="618517"/>
+            <a:ext cx="10364451" cy="841573"/>
+          </a:xfrm>
+        </p:spPr>
+        <p:txBody>
+          <a:bodyPr/>
+          <a:lstStyle/>
+          <a:p>
+            <a:r>
+              <a:rPr lang="en-AU" dirty="0" smtClean="0"/>
+              <a:t>Vagrant Basic Commands</a:t>
+            </a:r>
+            <a:endParaRPr lang="en-AU" dirty="0"/>
+          </a:p>
+        </p:txBody>
+      </p:sp>
+      <p:sp>
+        <p:nvSpPr>
+          <p:cNvPr id="3" name="TextBox 2"/>
+          <p:cNvSpPr txBox="1"/>
+          <p:nvPr/>
+        </p:nvSpPr>
+        <p:spPr>
+          <a:xfrm>
+            <a:off x="1456364" y="1409525"/>
+            <a:ext cx="9279272" cy="4524315"/>
+          </a:xfrm>
+          <a:prstGeom prst="rect">
+            <a:avLst/>
+          </a:prstGeom>
+          <a:noFill/>
+        </p:spPr>
+        <p:txBody>
+          <a:bodyPr wrap="none" rtlCol="0">
+            <a:spAutoFit/>
+          </a:bodyPr>
+          <a:lstStyle/>
+          <a:p>
+            <a:r>
+              <a:rPr lang="en-AU" dirty="0" smtClean="0"/>
+              <a:t>The vagrant commands for shutting down your Vagrant machine and destroying </a:t>
+            </a:r>
+          </a:p>
+          <a:p>
+            <a:r>
+              <a:rPr lang="en-AU" dirty="0" smtClean="0"/>
+              <a:t>your Vagrant machine. It is important to understand the differences.</a:t>
+            </a:r>
+          </a:p>
+          <a:p>
+            <a:endParaRPr lang="en-AU" dirty="0" smtClean="0"/>
+          </a:p>
+          <a:p>
+            <a:pPr marL="285750" indent="-285750">
+              <a:buFont typeface="Arial" panose="020B0604020202020204" pitchFamily="34" charset="0"/>
+              <a:buChar char="•"/>
+            </a:pPr>
+            <a:r>
+              <a:rPr lang="en-AU" dirty="0" smtClean="0"/>
+              <a:t>Command: </a:t>
+            </a:r>
+            <a:r>
+              <a:rPr lang="en-AU" b="1" dirty="0" smtClean="0"/>
+              <a:t>vagrant halt</a:t>
+            </a:r>
+          </a:p>
+          <a:p>
+            <a:pPr lvl="1"/>
+            <a:r>
+              <a:rPr lang="en-AU" dirty="0" smtClean="0"/>
+              <a:t>This command shuts down the running machine Vagrant is managing. This frees up</a:t>
+            </a:r>
+          </a:p>
+          <a:p>
+            <a:pPr lvl="1"/>
+            <a:r>
+              <a:rPr lang="en-AU" dirty="0" smtClean="0"/>
+              <a:t>the resources (CPU cores and RAM) allocated to the Virtual machine.  It saves the environment </a:t>
+            </a:r>
+          </a:p>
+          <a:p>
+            <a:pPr lvl="1"/>
+            <a:r>
+              <a:rPr lang="en-AU" dirty="0" smtClean="0"/>
+              <a:t>and files.  Vagrant will effectively just shut off power to the machine. The Vagrant command </a:t>
+            </a:r>
+          </a:p>
+          <a:p>
+            <a:pPr lvl="1"/>
+            <a:r>
+              <a:rPr lang="en-AU" dirty="0" smtClean="0"/>
+              <a:t>“vagrant up” will restart the Vagrant machine to it’s previous state.  </a:t>
+            </a:r>
+          </a:p>
+          <a:p>
+            <a:pPr lvl="1"/>
+            <a:r>
+              <a:rPr lang="en-AU" dirty="0" smtClean="0"/>
+              <a:t>  </a:t>
+            </a:r>
+          </a:p>
+          <a:p>
+            <a:pPr marL="285750" indent="-285750">
+              <a:buFont typeface="Arial" panose="020B0604020202020204" pitchFamily="34" charset="0"/>
+              <a:buChar char="•"/>
+            </a:pPr>
+            <a:r>
+              <a:rPr lang="en-AU" dirty="0" smtClean="0"/>
+              <a:t>Command: </a:t>
+            </a:r>
+            <a:r>
+              <a:rPr lang="en-AU" b="1" dirty="0" smtClean="0"/>
+              <a:t>vagrant</a:t>
+            </a:r>
+            <a:r>
+              <a:rPr lang="en-AU" dirty="0" smtClean="0"/>
+              <a:t> </a:t>
+            </a:r>
+            <a:r>
+              <a:rPr lang="en-AU" b="1" dirty="0" smtClean="0"/>
+              <a:t>destroy</a:t>
+            </a:r>
+          </a:p>
+          <a:p>
+            <a:pPr lvl="1"/>
+            <a:r>
+              <a:rPr lang="en-AU" dirty="0"/>
+              <a:t>This command stops the running machine Vagrant is managing and destroys all </a:t>
+            </a:r>
+            <a:r>
+              <a:rPr lang="en-AU" dirty="0" smtClean="0"/>
+              <a:t>resources </a:t>
+            </a:r>
+          </a:p>
+          <a:p>
+            <a:pPr lvl="1"/>
+            <a:r>
+              <a:rPr lang="en-AU" dirty="0" smtClean="0"/>
+              <a:t>(CPU cores, RAM, and </a:t>
+            </a:r>
+            <a:r>
+              <a:rPr lang="en-AU" dirty="0" err="1" smtClean="0"/>
+              <a:t>diskspace</a:t>
+            </a:r>
+            <a:r>
+              <a:rPr lang="en-AU" dirty="0" smtClean="0"/>
+              <a:t>) </a:t>
+            </a:r>
+            <a:r>
+              <a:rPr lang="en-AU" dirty="0"/>
+              <a:t>that were </a:t>
+            </a:r>
+            <a:r>
+              <a:rPr lang="en-AU" dirty="0" smtClean="0"/>
+              <a:t>allocated </a:t>
+            </a:r>
+            <a:r>
+              <a:rPr lang="en-AU" dirty="0"/>
+              <a:t>during the machine creation process. </a:t>
+            </a:r>
+            <a:endParaRPr lang="en-AU" dirty="0" smtClean="0"/>
+          </a:p>
+          <a:p>
+            <a:pPr lvl="1"/>
+            <a:r>
+              <a:rPr lang="en-AU" dirty="0" smtClean="0"/>
+              <a:t>After </a:t>
+            </a:r>
+            <a:r>
+              <a:rPr lang="en-AU" dirty="0"/>
+              <a:t>running </a:t>
+            </a:r>
+            <a:r>
+              <a:rPr lang="en-AU" dirty="0" smtClean="0"/>
+              <a:t>this </a:t>
+            </a:r>
+            <a:r>
+              <a:rPr lang="en-AU" dirty="0"/>
+              <a:t>command, your computer should be left at a clean state, as if you never </a:t>
+            </a:r>
+            <a:endParaRPr lang="en-AU" dirty="0" smtClean="0"/>
+          </a:p>
+          <a:p>
+            <a:pPr lvl="1"/>
+            <a:r>
+              <a:rPr lang="en-AU" dirty="0" smtClean="0"/>
+              <a:t>created </a:t>
+            </a:r>
+            <a:r>
+              <a:rPr lang="en-AU" dirty="0"/>
+              <a:t>the guest machine in the first place</a:t>
+            </a:r>
+            <a:r>
+              <a:rPr lang="en-AU" dirty="0" smtClean="0"/>
+              <a:t>.  The FILES in your SHARED directories</a:t>
+            </a:r>
+          </a:p>
+          <a:p>
+            <a:pPr lvl="1"/>
+            <a:r>
+              <a:rPr lang="en-AU" dirty="0" smtClean="0"/>
+              <a:t>are not deleted!!</a:t>
+            </a:r>
+          </a:p>
+          <a:p>
+            <a:endParaRPr lang="en-AU" dirty="0"/>
+          </a:p>
+        </p:txBody>
+      </p:sp>
+      <p:sp>
+        <p:nvSpPr>
+          <p:cNvPr id="4" name="Footer Placeholder 3"/>
+          <p:cNvSpPr>
+            <a:spLocks noGrp="1"/>
+          </p:cNvSpPr>
+          <p:nvPr>
+            <p:ph type="ftr" sz="quarter" idx="11"/>
+          </p:nvPr>
+        </p:nvSpPr>
+        <p:spPr/>
+        <p:txBody>
+          <a:bodyPr/>
+          <a:lstStyle/>
+          <a:p>
+            <a:r>
+              <a:rPr lang="en-AU" dirty="0" smtClean="0">
+                <a:hlinkClick r:id="rId2"/>
+              </a:rPr>
+              <a:t>https://www.vagrantup.com/docs/cli/halt</a:t>
+            </a:r>
+            <a:endParaRPr lang="en-AU" dirty="0" smtClean="0"/>
+          </a:p>
+          <a:p>
+            <a:r>
+              <a:rPr lang="en-AU" dirty="0">
+                <a:hlinkClick r:id="rId3"/>
+              </a:rPr>
+              <a:t>https://www.vagrantup.com/docs/cli/destroy</a:t>
+            </a:r>
+            <a:endParaRPr lang="en-AU" dirty="0"/>
+          </a:p>
+        </p:txBody>
+      </p:sp>
+    </p:spTree>
+    <p:extLst>
+      <p:ext uri="{BB962C8B-B14F-4D97-AF65-F5344CB8AC3E}">
+        <p14:creationId xmlns:p14="http://schemas.microsoft.com/office/powerpoint/2010/main" val="2744008792"/>
+      </p:ext>
+    </p:extLst>
+  </p:cSld>
+  <p:clrMapOvr>
+    <a:masterClrMapping/>
+  </p:clrMapOvr>
 </p:sld>
 </file>
 
@@ -7355,14 +7882,7 @@
                 <a:latin typeface="Lucida Sans" panose="020B0602030504020204" pitchFamily="34" charset="0"/>
                 <a:cs typeface="Arial" panose="020B0604020202020204" pitchFamily="34" charset="0"/>
               </a:rPr>
-              <a:t>% git clone </a:t>
-            </a:r>
-            <a:r>
-              <a:rPr lang="en-AU" dirty="0" smtClean="0">
-                <a:latin typeface="Lucida Sans" panose="020B0602030504020204" pitchFamily="34" charset="0"/>
-                <a:cs typeface="Arial" panose="020B0604020202020204" pitchFamily="34" charset="0"/>
-              </a:rPr>
-              <a:t>https</a:t>
+              <a:t>% git clone https</a:t>
             </a:r>
             <a:r>
               <a:rPr lang="en-AU" dirty="0">
@@ -7554,21 +8074,7 @@
                 <a:latin typeface="Arial" panose="020B0604020202020204" pitchFamily="34" charset="0"/>
                 <a:cs typeface="Arial" panose="020B0604020202020204" pitchFamily="34" charset="0"/>
               </a:rPr>
-              <a:t>Step 3: change director into the </a:t>
-            </a:r>
-            <a:r>
-              <a:rPr lang="en-AU" dirty="0" smtClean="0">
-                <a:latin typeface="Arial" panose="020B0604020202020204" pitchFamily="34" charset="0"/>
-                <a:cs typeface="Arial" panose="020B0604020202020204" pitchFamily="34" charset="0"/>
-              </a:rPr>
-              <a:t>course/stat1400 </a:t>
-            </a:r>
-            <a:r>
-              <a:rPr lang="en-AU" dirty="0" smtClean="0">
-                <a:latin typeface="Arial" panose="020B0604020202020204" pitchFamily="34" charset="0"/>
-                <a:cs typeface="Arial" panose="020B0604020202020204" pitchFamily="34" charset="0"/>
-              </a:rPr>
-              <a:t>directory</a:t>
+              <a:t>Step 3: change director into the course/stat1400 directory</a:t>
             </a:r>
           </a:p>
           <a:p>
@@ -7655,42 +8161,28 @@
                 <a:latin typeface="Arial" panose="020B0604020202020204" pitchFamily="34" charset="0"/>
                 <a:cs typeface="Arial" panose="020B0604020202020204" pitchFamily="34" charset="0"/>
               </a:rPr>
-              <a:t>stat1400</a:t>
+              <a:t>stat1400 </a:t>
+            </a:r>
+            <a:r>
+              <a:rPr lang="en-AU" dirty="0" smtClean="0">
+                <a:latin typeface="Arial" panose="020B0604020202020204" pitchFamily="34" charset="0"/>
+                <a:cs typeface="Arial" panose="020B0604020202020204" pitchFamily="34" charset="0"/>
+              </a:rPr>
+              <a:t>directory and you MUST be in the </a:t>
             </a:r>
             <a:r>
               <a:rPr lang="en-AU" b="1" dirty="0" smtClean="0">
                 <a:latin typeface="Arial" panose="020B0604020202020204" pitchFamily="34" charset="0"/>
                 <a:cs typeface="Arial" panose="020B0604020202020204" pitchFamily="34" charset="0"/>
               </a:rPr>
-              <a:t> </a:t>
+              <a:t>stat1400</a:t>
             </a:r>
             <a:r>
               <a:rPr lang="en-AU" dirty="0" smtClean="0">
                 <a:latin typeface="Arial" panose="020B0604020202020204" pitchFamily="34" charset="0"/>
                 <a:cs typeface="Arial" panose="020B0604020202020204" pitchFamily="34" charset="0"/>
               </a:rPr>
-              <a:t>directory and you MUST be in the </a:t>
-            </a:r>
-            <a:r>
-              <a:rPr lang="en-AU" b="1" dirty="0" smtClean="0">
-                <a:latin typeface="Arial" panose="020B0604020202020204" pitchFamily="34" charset="0"/>
-                <a:cs typeface="Arial" panose="020B0604020202020204" pitchFamily="34" charset="0"/>
-              </a:rPr>
-              <a:t>stat1400</a:t>
-            </a:r>
-            <a:r>
-              <a:rPr lang="en-AU" dirty="0" smtClean="0">
-                <a:latin typeface="Arial" panose="020B0604020202020204" pitchFamily="34" charset="0"/>
-                <a:cs typeface="Arial" panose="020B0604020202020204" pitchFamily="34" charset="0"/>
-              </a:rPr>
-              <a:t> </a:t>
-            </a:r>
-            <a:r>
-              <a:rPr lang="en-AU" dirty="0" smtClean="0">
-                <a:latin typeface="Arial" panose="020B0604020202020204" pitchFamily="34" charset="0"/>
-                <a:cs typeface="Arial" panose="020B0604020202020204" pitchFamily="34" charset="0"/>
-              </a:rPr>
-              <a:t>directory as that is where the </a:t>
+              <a:t> directory as that is where the </a:t>
             </a:r>
             <a:r>
               <a:rPr lang="en-AU" dirty="0" err="1" smtClean="0">
@@ -7727,19 +8219,8 @@
                 <a:latin typeface="Lucida Sans" panose="020B0602030504020204" pitchFamily="34" charset="0"/>
                 <a:cs typeface="Arial" panose="020B0604020202020204" pitchFamily="34" charset="0"/>
               </a:rPr>
-              <a:t>% vagrant </a:t>
-            </a:r>
-            <a:r>
-              <a:rPr lang="en-AU" dirty="0" smtClean="0">
-                <a:latin typeface="Lucida Sans" panose="020B0602030504020204" pitchFamily="34" charset="0"/>
-                <a:cs typeface="Arial" panose="020B0604020202020204" pitchFamily="34" charset="0"/>
-              </a:rPr>
-              <a:t>up</a:t>
-            </a:r>
-            <a:endParaRPr lang="en-AU" dirty="0" smtClean="0">
-              <a:latin typeface="Lucida Sans" panose="020B0602030504020204" pitchFamily="34" charset="0"/>
-              <a:cs typeface="Arial" panose="020B0604020202020204" pitchFamily="34" charset="0"/>
-            </a:endParaRPr>
+              <a:t>% vagrant up</a:t>
+            </a:r>
           </a:p>
           <a:p>
             <a:r>
@@ -8301,21 +8782,7 @@
                 <a:latin typeface="Lucida Sans Typewriter" panose="020B0509030504030204" pitchFamily="49" charset="0"/>
                 <a:cs typeface="Arial" panose="020B0604020202020204" pitchFamily="34" charset="0"/>
               </a:rPr>
-              <a:t>cd </a:t>
-            </a:r>
-            <a:r>
-              <a:rPr lang="en-AU" dirty="0" smtClean="0">
-                <a:latin typeface="Lucida Sans Typewriter" panose="020B0509030504030204" pitchFamily="49" charset="0"/>
-                <a:cs typeface="Arial" panose="020B0604020202020204" pitchFamily="34" charset="0"/>
-              </a:rPr>
-              <a:t>stat1400</a:t>
-            </a:r>
-            <a:r>
-              <a:rPr lang="en-AU" dirty="0" smtClean="0">
-                <a:latin typeface="Lucida Sans Typewriter" panose="020B0509030504030204" pitchFamily="49" charset="0"/>
-                <a:cs typeface="Arial" panose="020B0604020202020204" pitchFamily="34" charset="0"/>
-              </a:rPr>
-              <a:t>	</a:t>
+              <a:t>cd stat1400	</a:t>
             </a:r>
           </a:p>
           <a:p>
@@ -8411,7 +8878,14 @@
                 <a:latin typeface="Lucida Sans Typewriter" panose="020B0509030504030204" pitchFamily="49" charset="0"/>
                 <a:cs typeface="Arial" panose="020B0604020202020204" pitchFamily="34" charset="0"/>
               </a:rPr>
-              <a:t> notebook –</a:t>
+              <a:t> notebook </a:t>
+            </a:r>
+            <a:r>
+              <a:rPr lang="en-AU" dirty="0" smtClean="0">
+                <a:latin typeface="Lucida Sans Typewriter" panose="020B0509030504030204" pitchFamily="49" charset="0"/>
+                <a:cs typeface="Arial" panose="020B0604020202020204" pitchFamily="34" charset="0"/>
+              </a:rPr>
+              <a:t>–-</a:t>
             </a:r>
             <a:r>
               <a:rPr lang="en-AU" dirty="0" err="1" smtClean="0">
@@ -8425,7 +8899,14 @@
                 <a:latin typeface="Lucida Sans Typewriter" panose="020B0509030504030204" pitchFamily="49" charset="0"/>
                 <a:cs typeface="Arial" panose="020B0604020202020204" pitchFamily="34" charset="0"/>
               </a:rPr>
-              <a:t>=0.0.0.0 –-no-browser</a:t>
+              <a:t>=0.0.0.0 </a:t>
+            </a:r>
+            <a:r>
+              <a:rPr lang="en-AU" dirty="0" smtClean="0">
+                <a:latin typeface="Lucida Sans Typewriter" panose="020B0509030504030204" pitchFamily="49" charset="0"/>
+                <a:cs typeface="Arial" panose="020B0604020202020204" pitchFamily="34" charset="0"/>
+              </a:rPr>
+              <a:t>–-no-browser</a:t>
             </a:r>
           </a:p>
           <a:p>
@@ -8752,21 +9233,6 @@
 </file>
 
 <file path=customXml/item1.xml><?xml version="1.0" encoding="utf-8"?>
-<?mso-contentType ?>
-<FormTemplates xmlns="http://schemas.microsoft.com/sharepoint/v3/contenttype/forms">
-  <Display>DocumentLibraryForm</Display>
-  <Edit>DocumentLibraryForm</Edit>
-  <New>DocumentLibraryForm</New>
-</FormTemplates>
-</file>
-
-<file path=customXml/item2.xml><?xml version="1.0" encoding="utf-8"?>
-<p:properties xmlns:p="http://schemas.microsoft.com/office/2006/metadata/properties" xmlns:xsi="http://www.w3.org/2001/XMLSchema-instance" xmlns:pc="http://schemas.microsoft.com/office/infopath/2007/PartnerControls">
-  <documentManagement/>
-</p:properties>
-</file>
-
-<file path=customXml/item3.xml><?xml version="1.0" encoding="utf-8"?>
 <ct:contentTypeSchema xmlns:ct="http://schemas.microsoft.com/office/2006/metadata/contentType" xmlns:ma="http://schemas.microsoft.com/office/2006/metadata/properties/metaAttributes" ct:_="" ma:_="" ma:contentTypeName="Document" ma:contentTypeID="0x0101000C3F0734F22D774883C052A360730DF9" ma:contentTypeVersion="7" ma:contentTypeDescription="Create a new document." ma:contentTypeScope="" ma:versionID="68dbab044d50f9bfa9580c1de6249254">
   <xsd:schema xmlns:xsd="http://www.w3.org/2001/XMLSchema" xmlns:xs="http://www.w3.org/2001/XMLSchema" xmlns:p="http://schemas.microsoft.com/office/2006/metadata/properties" xmlns:ns3="c0477a94-a81b-4865-9707-6c9300ae147f" xmlns:ns4="45fda36c-df07-4f55-9922-29409b58d9d3" targetNamespace="http://schemas.microsoft.com/office/2006/metadata/properties" ma:root="true" ma:fieldsID="ea92a476c86701b878abbd8645c4be93" ns3:_="" ns4:_="">
     <xsd:import namespace="c0477a94-a81b-4865-9707-6c9300ae147f"/>
@@ -8951,32 +9417,22 @@
 </ct:contentTypeSchema>
 </file>
 
-<file path=customXml/itemProps1.xml><?xml version="1.0" encoding="utf-8"?>
-<ds:datastoreItem xmlns:ds="http://schemas.openxmlformats.org/officeDocument/2006/customXml" ds:itemID="{10127F0B-EA07-4AFF-8549-55D4D4284DC4}">
-  <ds:schemaRefs>
-    <ds:schemaRef ds:uri="http://schemas.microsoft.com/sharepoint/v3/contenttype/forms"/>
-  </ds:schemaRefs>
-</ds:datastoreItem>
+<file path=customXml/item2.xml><?xml version="1.0" encoding="utf-8"?>
+<p:properties xmlns:p="http://schemas.microsoft.com/office/2006/metadata/properties" xmlns:xsi="http://www.w3.org/2001/XMLSchema-instance" xmlns:pc="http://schemas.microsoft.com/office/infopath/2007/PartnerControls">
+  <documentManagement/>
+</p:properties>
 </file>
 
-<file path=customXml/itemProps2.xml><?xml version="1.0" encoding="utf-8"?>
-<ds:datastoreItem xmlns:ds="http://schemas.openxmlformats.org/officeDocument/2006/customXml" ds:itemID="{DC2CE541-9384-4F78-A2DC-081CEDD5EAE8}">
-  <ds:schemaRefs>
-    <ds:schemaRef ds:uri="http://schemas.openxmlformats.org/package/2006/metadata/core-properties"/>
-    <ds:schemaRef ds:uri="http://purl.org/dc/elements/1.1/"/>
-    <ds:schemaRef ds:uri="http://purl.org/dc/dcmitype/"/>
-    <ds:schemaRef ds:uri="45fda36c-df07-4f55-9922-29409b58d9d3"/>
-    <ds:schemaRef ds:uri="http://purl.org/dc/terms/"/>
-    <ds:schemaRef ds:uri="c0477a94-a81b-4865-9707-6c9300ae147f"/>
-    <ds:schemaRef ds:uri="http://schemas.microsoft.com/office/2006/documentManagement/types"/>
-    <ds:schemaRef ds:uri="http://schemas.microsoft.com/office/infopath/2007/PartnerControls"/>
-    <ds:schemaRef ds:uri="http://schemas.microsoft.com/office/2006/metadata/properties"/>
-    <ds:schemaRef ds:uri="http://www.w3.org/XML/1998/namespace"/>
-  </ds:schemaRefs>
-</ds:datastoreItem>
+<file path=customXml/item3.xml><?xml version="1.0" encoding="utf-8"?>
+<?mso-contentType ?>
+<FormTemplates xmlns="http://schemas.microsoft.com/sharepoint/v3/contenttype/forms">
+  <Display>DocumentLibraryForm</Display>
+  <Edit>DocumentLibraryForm</Edit>
+  <New>DocumentLibraryForm</New>
+</FormTemplates>
 </file>
 
-<file path=customXml/itemProps3.xml><?xml version="1.0" encoding="utf-8"?>
+<file path=customXml/itemProps1.xml><?xml version="1.0" encoding="utf-8"?>
 <ds:datastoreItem xmlns:ds="http://schemas.openxmlformats.org/officeDocument/2006/customXml" ds:itemID="{328FAD76-43D1-414B-B6EC-7811CDF23869}">
   <ds:schemaRefs>
     <ds:schemaRef ds:uri="http://schemas.microsoft.com/office/2006/metadata/contentType"/>
@@ -8993,4 +9449,29 @@
     <ds:schemaRef ds:uri="http://schemas.microsoft.com/internal/obd"/>
   </ds:schemaRefs>
 </ds:datastoreItem>
+</file>
+
+<file path=customXml/itemProps2.xml><?xml version="1.0" encoding="utf-8"?>
+<ds:datastoreItem xmlns:ds="http://schemas.openxmlformats.org/officeDocument/2006/customXml" ds:itemID="{DC2CE541-9384-4F78-A2DC-081CEDD5EAE8}">
+  <ds:schemaRefs>
+    <ds:schemaRef ds:uri="http://schemas.microsoft.com/office/2006/metadata/properties"/>
+    <ds:schemaRef ds:uri="c0477a94-a81b-4865-9707-6c9300ae147f"/>
+    <ds:schemaRef ds:uri="http://schemas.microsoft.com/office/2006/documentManagement/types"/>
+    <ds:schemaRef ds:uri="http://purl.org/dc/terms/"/>
+    <ds:schemaRef ds:uri="http://schemas.openxmlformats.org/package/2006/metadata/core-properties"/>
+    <ds:schemaRef ds:uri="http://purl.org/dc/dcmitype/"/>
+    <ds:schemaRef ds:uri="45fda36c-df07-4f55-9922-29409b58d9d3"/>
+    <ds:schemaRef ds:uri="http://purl.org/dc/elements/1.1/"/>
+    <ds:schemaRef ds:uri="http://schemas.microsoft.com/office/infopath/2007/PartnerControls"/>
+    <ds:schemaRef ds:uri="http://www.w3.org/XML/1998/namespace"/>
+  </ds:schemaRefs>
+</ds:datastoreItem>
+</file>
+
+<file path=customXml/itemProps3.xml><?xml version="1.0" encoding="utf-8"?>
+<ds:datastoreItem xmlns:ds="http://schemas.openxmlformats.org/officeDocument/2006/customXml" ds:itemID="{10127F0B-EA07-4AFF-8549-55D4D4284DC4}">
+  <ds:schemaRefs>
+    <ds:schemaRef ds:uri="http://schemas.microsoft.com/sharepoint/v3/contenttype/forms"/>
+  </ds:schemaRefs>
+</ds:datastoreItem>
 </file>
</xml_diff>

<commit_message>
updates for 2021 sem1
</commit_message>
<xml_diff>
--- a/VM_instructions.pptx
+++ b/VM_instructions.pptx
@@ -12,10 +12,11 @@
     <p:sldId id="260" r:id="rId9"/>
     <p:sldId id="261" r:id="rId10"/>
     <p:sldId id="262" r:id="rId11"/>
-    <p:sldId id="263" r:id="rId12"/>
-    <p:sldId id="264" r:id="rId13"/>
-    <p:sldId id="265" r:id="rId14"/>
-    <p:sldId id="266" r:id="rId15"/>
+    <p:sldId id="265" r:id="rId12"/>
+    <p:sldId id="263" r:id="rId13"/>
+    <p:sldId id="266" r:id="rId14"/>
+    <p:sldId id="267" r:id="rId15"/>
+    <p:sldId id="264" r:id="rId16"/>
   </p:sldIdLst>
   <p:sldSz cx="12192000" cy="6858000"/>
   <p:notesSz cx="6858000" cy="9144000"/>
@@ -293,7 +294,7 @@
           <a:p>
             <a:fld id="{A97D098C-81A2-4741-849D-B3F04101F1CD}" type="datetimeFigureOut">
               <a:rPr lang="en-AU" smtClean="0"/>
-              <a:t>9/08/2020</a:t>
+              <a:t>24/02/2021</a:t>
             </a:fld>
             <a:endParaRPr lang="en-AU"/>
           </a:p>
@@ -608,7 +609,7 @@
           <a:p>
             <a:fld id="{A97D098C-81A2-4741-849D-B3F04101F1CD}" type="datetimeFigureOut">
               <a:rPr lang="en-AU" smtClean="0"/>
-              <a:t>9/08/2020</a:t>
+              <a:t>24/02/2021</a:t>
             </a:fld>
             <a:endParaRPr lang="en-AU"/>
           </a:p>
@@ -830,7 +831,7 @@
           <a:p>
             <a:fld id="{A97D098C-81A2-4741-849D-B3F04101F1CD}" type="datetimeFigureOut">
               <a:rPr lang="en-AU" smtClean="0"/>
-              <a:t>9/08/2020</a:t>
+              <a:t>24/02/2021</a:t>
             </a:fld>
             <a:endParaRPr lang="en-AU"/>
           </a:p>
@@ -1121,7 +1122,7 @@
           <a:p>
             <a:fld id="{A97D098C-81A2-4741-849D-B3F04101F1CD}" type="datetimeFigureOut">
               <a:rPr lang="en-AU" smtClean="0"/>
-              <a:t>9/08/2020</a:t>
+              <a:t>24/02/2021</a:t>
             </a:fld>
             <a:endParaRPr lang="en-AU"/>
           </a:p>
@@ -1575,7 +1576,7 @@
           <a:p>
             <a:fld id="{A97D098C-81A2-4741-849D-B3F04101F1CD}" type="datetimeFigureOut">
               <a:rPr lang="en-AU" smtClean="0"/>
-              <a:t>9/08/2020</a:t>
+              <a:t>24/02/2021</a:t>
             </a:fld>
             <a:endParaRPr lang="en-AU"/>
           </a:p>
@@ -2151,7 +2152,7 @@
           <a:p>
             <a:fld id="{A97D098C-81A2-4741-849D-B3F04101F1CD}" type="datetimeFigureOut">
               <a:rPr lang="en-AU" smtClean="0"/>
-              <a:t>9/08/2020</a:t>
+              <a:t>24/02/2021</a:t>
             </a:fld>
             <a:endParaRPr lang="en-AU"/>
           </a:p>
@@ -3012,7 +3013,7 @@
           <a:p>
             <a:fld id="{A97D098C-81A2-4741-849D-B3F04101F1CD}" type="datetimeFigureOut">
               <a:rPr lang="en-AU" smtClean="0"/>
-              <a:t>9/08/2020</a:t>
+              <a:t>24/02/2021</a:t>
             </a:fld>
             <a:endParaRPr lang="en-AU"/>
           </a:p>
@@ -3217,7 +3218,7 @@
           <a:p>
             <a:fld id="{A97D098C-81A2-4741-849D-B3F04101F1CD}" type="datetimeFigureOut">
               <a:rPr lang="en-AU" smtClean="0"/>
-              <a:t>9/08/2020</a:t>
+              <a:t>24/02/2021</a:t>
             </a:fld>
             <a:endParaRPr lang="en-AU"/>
           </a:p>
@@ -3431,7 +3432,7 @@
           <a:p>
             <a:fld id="{A97D098C-81A2-4741-849D-B3F04101F1CD}" type="datetimeFigureOut">
               <a:rPr lang="en-AU" smtClean="0"/>
-              <a:t>9/08/2020</a:t>
+              <a:t>24/02/2021</a:t>
             </a:fld>
             <a:endParaRPr lang="en-AU"/>
           </a:p>
@@ -3636,7 +3637,7 @@
           <a:p>
             <a:fld id="{A97D098C-81A2-4741-849D-B3F04101F1CD}" type="datetimeFigureOut">
               <a:rPr lang="en-AU" smtClean="0"/>
-              <a:t>9/08/2020</a:t>
+              <a:t>24/02/2021</a:t>
             </a:fld>
             <a:endParaRPr lang="en-AU"/>
           </a:p>
@@ -3916,7 +3917,7 @@
           <a:p>
             <a:fld id="{A97D098C-81A2-4741-849D-B3F04101F1CD}" type="datetimeFigureOut">
               <a:rPr lang="en-AU" smtClean="0"/>
-              <a:t>9/08/2020</a:t>
+              <a:t>24/02/2021</a:t>
             </a:fld>
             <a:endParaRPr lang="en-AU"/>
           </a:p>
@@ -4183,7 +4184,7 @@
           <a:p>
             <a:fld id="{A97D098C-81A2-4741-849D-B3F04101F1CD}" type="datetimeFigureOut">
               <a:rPr lang="en-AU" smtClean="0"/>
-              <a:t>9/08/2020</a:t>
+              <a:t>24/02/2021</a:t>
             </a:fld>
             <a:endParaRPr lang="en-AU"/>
           </a:p>
@@ -4598,7 +4599,7 @@
           <a:p>
             <a:fld id="{A97D098C-81A2-4741-849D-B3F04101F1CD}" type="datetimeFigureOut">
               <a:rPr lang="en-AU" smtClean="0"/>
-              <a:t>9/08/2020</a:t>
+              <a:t>24/02/2021</a:t>
             </a:fld>
             <a:endParaRPr lang="en-AU"/>
           </a:p>
@@ -4746,7 +4747,7 @@
           <a:p>
             <a:fld id="{A97D098C-81A2-4741-849D-B3F04101F1CD}" type="datetimeFigureOut">
               <a:rPr lang="en-AU" smtClean="0"/>
-              <a:t>9/08/2020</a:t>
+              <a:t>24/02/2021</a:t>
             </a:fld>
             <a:endParaRPr lang="en-AU"/>
           </a:p>
@@ -4871,7 +4872,7 @@
           <a:p>
             <a:fld id="{A97D098C-81A2-4741-849D-B3F04101F1CD}" type="datetimeFigureOut">
               <a:rPr lang="en-AU" smtClean="0"/>
-              <a:t>9/08/2020</a:t>
+              <a:t>24/02/2021</a:t>
             </a:fld>
             <a:endParaRPr lang="en-AU"/>
           </a:p>
@@ -5150,7 +5151,7 @@
           <a:p>
             <a:fld id="{A97D098C-81A2-4741-849D-B3F04101F1CD}" type="datetimeFigureOut">
               <a:rPr lang="en-AU" smtClean="0"/>
-              <a:t>9/08/2020</a:t>
+              <a:t>24/02/2021</a:t>
             </a:fld>
             <a:endParaRPr lang="en-AU"/>
           </a:p>
@@ -5465,7 +5466,7 @@
           <a:p>
             <a:fld id="{A97D098C-81A2-4741-849D-B3F04101F1CD}" type="datetimeFigureOut">
               <a:rPr lang="en-AU" smtClean="0"/>
-              <a:t>9/08/2020</a:t>
+              <a:t>24/02/2021</a:t>
             </a:fld>
             <a:endParaRPr lang="en-AU"/>
           </a:p>
@@ -5718,7 +5719,7 @@
           <a:p>
             <a:fld id="{A97D098C-81A2-4741-849D-B3F04101F1CD}" type="datetimeFigureOut">
               <a:rPr lang="en-AU" smtClean="0"/>
-              <a:t>9/08/2020</a:t>
+              <a:t>24/02/2021</a:t>
             </a:fld>
             <a:endParaRPr lang="en-AU"/>
           </a:p>
@@ -6288,7 +6289,7 @@
               <a:rPr lang="en-AU" dirty="0" smtClean="0">
                 <a:latin typeface="Lucida Sans Typewriter" panose="020B0509030504030204" pitchFamily="49" charset="0"/>
               </a:rPr>
-              <a:t>StaT1400</a:t>
+              <a:t>Data1001</a:t>
             </a:r>
             <a:endParaRPr lang="en-AU" dirty="0">
               <a:latin typeface="Lucida Sans Typewriter" panose="020B0509030504030204" pitchFamily="49" charset="0"/>
@@ -6343,19 +6344,22 @@
             <p:ph type="title"/>
           </p:nvPr>
         </p:nvSpPr>
-        <p:spPr>
-          <a:xfrm>
-            <a:off x="913775" y="618517"/>
-            <a:ext cx="10364451" cy="1143915"/>
-          </a:xfrm>
-        </p:spPr>
+        <p:spPr/>
         <p:txBody>
           <a:bodyPr/>
           <a:lstStyle/>
           <a:p>
             <a:r>
               <a:rPr lang="en-AU" dirty="0" smtClean="0"/>
-              <a:t>VAGRANT BASIC COMMANDS</a:t>
+              <a:t>Starting the </a:t>
+            </a:r>
+            <a:r>
+              <a:rPr lang="en-AU" dirty="0" err="1" smtClean="0"/>
+              <a:t>Jupyter</a:t>
+            </a:r>
+            <a:r>
+              <a:rPr lang="en-AU" dirty="0" smtClean="0"/>
+              <a:t> Notebook Server</a:t>
             </a:r>
             <a:endParaRPr lang="en-AU" dirty="0"/>
           </a:p>
@@ -6369,8 +6373,8 @@
         </p:nvSpPr>
         <p:spPr>
           <a:xfrm>
-            <a:off x="1474840" y="2168013"/>
-            <a:ext cx="9070258" cy="3416320"/>
+            <a:off x="1287312" y="1782146"/>
+            <a:ext cx="9417963" cy="1200329"/>
           </a:xfrm>
           <a:prstGeom prst="rect">
             <a:avLst/>
@@ -6378,193 +6382,223 @@
           <a:noFill/>
         </p:spPr>
         <p:txBody>
-          <a:bodyPr wrap="square" rtlCol="0">
+          <a:bodyPr wrap="none" rtlCol="0">
             <a:spAutoFit/>
           </a:bodyPr>
           <a:lstStyle/>
           <a:p>
             <a:r>
+              <a:rPr lang="en-AU" dirty="0" smtClean="0">
+                <a:latin typeface="Arial" panose="020B0604020202020204" pitchFamily="34" charset="0"/>
+                <a:cs typeface="Arial" panose="020B0604020202020204" pitchFamily="34" charset="0"/>
+              </a:rPr>
+              <a:t>Step </a:t>
+            </a:r>
+            <a:r>
+              <a:rPr lang="en-AU" dirty="0">
+                <a:latin typeface="Arial" panose="020B0604020202020204" pitchFamily="34" charset="0"/>
+                <a:cs typeface="Arial" panose="020B0604020202020204" pitchFamily="34" charset="0"/>
+              </a:rPr>
+              <a:t>5</a:t>
+            </a:r>
+            <a:r>
+              <a:rPr lang="en-AU" dirty="0" smtClean="0">
+                <a:latin typeface="Arial" panose="020B0604020202020204" pitchFamily="34" charset="0"/>
+                <a:cs typeface="Arial" panose="020B0604020202020204" pitchFamily="34" charset="0"/>
+              </a:rPr>
+              <a:t>: Starting the </a:t>
+            </a:r>
+            <a:r>
+              <a:rPr lang="en-AU" dirty="0" err="1" smtClean="0">
+                <a:latin typeface="Arial" panose="020B0604020202020204" pitchFamily="34" charset="0"/>
+                <a:cs typeface="Arial" panose="020B0604020202020204" pitchFamily="34" charset="0"/>
+              </a:rPr>
+              <a:t>jupyter</a:t>
+            </a:r>
+            <a:r>
+              <a:rPr lang="en-AU" dirty="0" smtClean="0">
+                <a:latin typeface="Arial" panose="020B0604020202020204" pitchFamily="34" charset="0"/>
+                <a:cs typeface="Arial" panose="020B0604020202020204" pitchFamily="34" charset="0"/>
+              </a:rPr>
+              <a:t> notebook server </a:t>
+            </a:r>
+            <a:r>
+              <a:rPr lang="en-AU" dirty="0">
+                <a:latin typeface="Arial" panose="020B0604020202020204" pitchFamily="34" charset="0"/>
+                <a:cs typeface="Arial" panose="020B0604020202020204" pitchFamily="34" charset="0"/>
+              </a:rPr>
+              <a:t>your VM.  </a:t>
+            </a:r>
+            <a:r>
+              <a:rPr lang="en-AU" dirty="0" smtClean="0">
+                <a:latin typeface="Arial" panose="020B0604020202020204" pitchFamily="34" charset="0"/>
+                <a:cs typeface="Arial" panose="020B0604020202020204" pitchFamily="34" charset="0"/>
+              </a:rPr>
+              <a:t>From the command line on your VM</a:t>
+            </a:r>
+          </a:p>
+          <a:p>
+            <a:r>
+              <a:rPr lang="en-AU" dirty="0">
+                <a:latin typeface="Arial" panose="020B0604020202020204" pitchFamily="34" charset="0"/>
+                <a:cs typeface="Arial" panose="020B0604020202020204" pitchFamily="34" charset="0"/>
+              </a:rPr>
+              <a:t>	</a:t>
+            </a:r>
+            <a:r>
+              <a:rPr lang="en-AU" dirty="0" smtClean="0">
+                <a:latin typeface="Arial" panose="020B0604020202020204" pitchFamily="34" charset="0"/>
+                <a:cs typeface="Arial" panose="020B0604020202020204" pitchFamily="34" charset="0"/>
+              </a:rPr>
+              <a:t>the command to start the </a:t>
+            </a:r>
+            <a:r>
+              <a:rPr lang="en-AU" dirty="0" err="1" smtClean="0">
+                <a:latin typeface="Arial" panose="020B0604020202020204" pitchFamily="34" charset="0"/>
+                <a:cs typeface="Arial" panose="020B0604020202020204" pitchFamily="34" charset="0"/>
+              </a:rPr>
+              <a:t>jupyter</a:t>
+            </a:r>
+            <a:r>
+              <a:rPr lang="en-AU" dirty="0" smtClean="0">
+                <a:latin typeface="Arial" panose="020B0604020202020204" pitchFamily="34" charset="0"/>
+                <a:cs typeface="Arial" panose="020B0604020202020204" pitchFamily="34" charset="0"/>
+              </a:rPr>
+              <a:t> notebook server is:</a:t>
+            </a:r>
+          </a:p>
+          <a:p>
+            <a:r>
+              <a:rPr lang="en-AU" dirty="0">
+                <a:latin typeface="Arial" panose="020B0604020202020204" pitchFamily="34" charset="0"/>
+                <a:cs typeface="Arial" panose="020B0604020202020204" pitchFamily="34" charset="0"/>
+              </a:rPr>
+              <a:t> </a:t>
+            </a:r>
+            <a:r>
+              <a:rPr lang="en-AU" dirty="0" smtClean="0">
+                <a:latin typeface="Arial" panose="020B0604020202020204" pitchFamily="34" charset="0"/>
+                <a:cs typeface="Arial" panose="020B0604020202020204" pitchFamily="34" charset="0"/>
+              </a:rPr>
+              <a:t>  &gt; </a:t>
+            </a:r>
+            <a:r>
+              <a:rPr lang="en-AU" dirty="0" err="1" smtClean="0">
+                <a:latin typeface="Arial" panose="020B0604020202020204" pitchFamily="34" charset="0"/>
+                <a:cs typeface="Arial" panose="020B0604020202020204" pitchFamily="34" charset="0"/>
+              </a:rPr>
+              <a:t>juptyer</a:t>
+            </a:r>
+            <a:r>
+              <a:rPr lang="en-AU" dirty="0" smtClean="0">
+                <a:latin typeface="Arial" panose="020B0604020202020204" pitchFamily="34" charset="0"/>
+                <a:cs typeface="Arial" panose="020B0604020202020204" pitchFamily="34" charset="0"/>
+              </a:rPr>
+              <a:t> notebook  --</a:t>
+            </a:r>
+            <a:r>
+              <a:rPr lang="en-AU" dirty="0" err="1" smtClean="0">
+                <a:latin typeface="Arial" panose="020B0604020202020204" pitchFamily="34" charset="0"/>
+                <a:cs typeface="Arial" panose="020B0604020202020204" pitchFamily="34" charset="0"/>
+              </a:rPr>
+              <a:t>ip</a:t>
+            </a:r>
+            <a:r>
+              <a:rPr lang="en-AU" dirty="0" smtClean="0">
+                <a:latin typeface="Arial" panose="020B0604020202020204" pitchFamily="34" charset="0"/>
+                <a:cs typeface="Arial" panose="020B0604020202020204" pitchFamily="34" charset="0"/>
+              </a:rPr>
+              <a:t>=0.0.0.0 --no-browser</a:t>
+            </a:r>
+            <a:endParaRPr lang="en-AU" dirty="0">
+              <a:latin typeface="Lucida Sans" panose="020B0602030504020204" pitchFamily="34" charset="0"/>
+              <a:cs typeface="Arial" panose="020B0604020202020204" pitchFamily="34" charset="0"/>
+            </a:endParaRPr>
+          </a:p>
+          <a:p>
+            <a:r>
               <a:rPr lang="en-AU" dirty="0" smtClean="0"/>
-              <a:t>The basics vagrant commands to manage your virtual instance.</a:t>
-            </a:r>
-          </a:p>
-          <a:p>
-            <a:pPr marL="285750" indent="-285750">
-              <a:buFont typeface="Arial" panose="020B0604020202020204" pitchFamily="34" charset="0"/>
-              <a:buChar char="•"/>
-            </a:pPr>
-            <a:r>
-              <a:rPr lang="en-AU" dirty="0" smtClean="0"/>
-              <a:t>Command: </a:t>
-            </a:r>
-            <a:r>
-              <a:rPr lang="en-AU" b="1" dirty="0" smtClean="0"/>
-              <a:t>vagrant up</a:t>
-            </a:r>
-          </a:p>
-          <a:p>
-            <a:r>
-              <a:rPr lang="en-AU" dirty="0" smtClean="0"/>
-              <a:t>	This command creates and configures guest machines according to your </a:t>
-            </a:r>
-            <a:r>
-              <a:rPr lang="en-AU" dirty="0" err="1" smtClean="0"/>
-              <a:t>Vagrantfile</a:t>
-            </a:r>
-            <a:r>
-              <a:rPr lang="en-AU" dirty="0" smtClean="0"/>
-              <a:t>.</a:t>
-            </a:r>
-          </a:p>
-          <a:p>
-            <a:r>
-              <a:rPr lang="en-AU" dirty="0" smtClean="0"/>
-              <a:t>	This is the single most important command in Vagrant, since it is how any Vagrant machine is 	created. Anyone using Vagrant must use this command on a day-to-day basis.</a:t>
-            </a:r>
-          </a:p>
-          <a:p>
-            <a:endParaRPr lang="en-AU" dirty="0" smtClean="0"/>
-          </a:p>
-          <a:p>
-            <a:pPr marL="285750" indent="-285750">
-              <a:buFont typeface="Arial" panose="020B0604020202020204" pitchFamily="34" charset="0"/>
-              <a:buChar char="•"/>
-            </a:pPr>
-            <a:r>
-              <a:rPr lang="en-AU" dirty="0" smtClean="0"/>
-              <a:t>Command: </a:t>
-            </a:r>
-            <a:r>
-              <a:rPr lang="en-AU" b="1" dirty="0" smtClean="0"/>
-              <a:t>vagrant </a:t>
-            </a:r>
-            <a:r>
-              <a:rPr lang="en-AU" b="1" dirty="0" err="1" smtClean="0"/>
-              <a:t>ssh</a:t>
-            </a:r>
-            <a:endParaRPr lang="en-AU" b="1" dirty="0" smtClean="0"/>
-          </a:p>
-          <a:p>
-            <a:pPr lvl="1"/>
-            <a:r>
-              <a:rPr lang="en-AU" dirty="0" smtClean="0"/>
-              <a:t>This will SSH (</a:t>
-            </a:r>
-            <a:r>
-              <a:rPr lang="en-AU" i="1" dirty="0" smtClean="0"/>
-              <a:t>S</a:t>
-            </a:r>
-            <a:r>
-              <a:rPr lang="en-AU" dirty="0" smtClean="0"/>
-              <a:t>ecure </a:t>
-            </a:r>
-            <a:r>
-              <a:rPr lang="en-AU" i="1" dirty="0" err="1" smtClean="0"/>
-              <a:t>SH</a:t>
-            </a:r>
-            <a:r>
-              <a:rPr lang="en-AU" dirty="0" err="1" smtClean="0"/>
-              <a:t>ell</a:t>
-            </a:r>
-            <a:r>
-              <a:rPr lang="en-AU" dirty="0" smtClean="0"/>
-              <a:t>) into a running Vagrant machine and give you access to a shell.</a:t>
-            </a:r>
-          </a:p>
-          <a:p>
-            <a:pPr lvl="1"/>
-            <a:endParaRPr lang="en-AU" dirty="0"/>
-          </a:p>
-          <a:p>
-            <a:pPr marL="285750" indent="-285750">
-              <a:buFont typeface="Arial" panose="020B0604020202020204" pitchFamily="34" charset="0"/>
-              <a:buChar char="•"/>
-            </a:pPr>
-            <a:r>
-              <a:rPr lang="en-AU" dirty="0" smtClean="0"/>
-              <a:t>Command: </a:t>
-            </a:r>
-            <a:r>
-              <a:rPr lang="en-AU" b="1" dirty="0" smtClean="0"/>
-              <a:t>vagrant status</a:t>
-            </a:r>
-          </a:p>
-          <a:p>
-            <a:pPr lvl="1"/>
-            <a:r>
-              <a:rPr lang="en-AU" dirty="0" smtClean="0"/>
-              <a:t>This will tell you the state of the machines Vagrant is managing. (running, suspended, not created, etc.  This command tells you the state of the underlying guest machine.</a:t>
-            </a:r>
-          </a:p>
-        </p:txBody>
-      </p:sp>
-      <p:sp>
-        <p:nvSpPr>
-          <p:cNvPr id="6" name="Footer Placeholder 5"/>
-          <p:cNvSpPr>
-            <a:spLocks noGrp="1"/>
-          </p:cNvSpPr>
-          <p:nvPr>
-            <p:ph type="ftr" sz="quarter" idx="11"/>
-          </p:nvPr>
-        </p:nvSpPr>
+              <a:t>   </a:t>
+            </a:r>
+            <a:r>
+              <a:rPr lang="en-AU" dirty="0" smtClean="0">
+                <a:solidFill>
+                  <a:srgbClr val="FFFF00"/>
+                </a:solidFill>
+              </a:rPr>
+              <a:t>NOTE: there are 2 dashes before “</a:t>
+            </a:r>
+            <a:r>
+              <a:rPr lang="en-AU" dirty="0" err="1" smtClean="0">
+                <a:solidFill>
+                  <a:srgbClr val="FFFF00"/>
+                </a:solidFill>
+              </a:rPr>
+              <a:t>ip</a:t>
+            </a:r>
+            <a:r>
+              <a:rPr lang="en-AU" dirty="0" smtClean="0">
+                <a:solidFill>
+                  <a:srgbClr val="FFFF00"/>
+                </a:solidFill>
+              </a:rPr>
+              <a:t>” and “no-browser”</a:t>
+            </a:r>
+            <a:endParaRPr lang="en-AU" dirty="0">
+              <a:solidFill>
+                <a:srgbClr val="FFFF00"/>
+              </a:solidFill>
+            </a:endParaRPr>
+          </a:p>
+        </p:txBody>
+      </p:sp>
+      <p:pic>
+        <p:nvPicPr>
+          <p:cNvPr id="4" name="Picture 3"/>
+          <p:cNvPicPr>
+            <a:picLocks noChangeAspect="1"/>
+          </p:cNvPicPr>
+          <p:nvPr/>
+        </p:nvPicPr>
+        <p:blipFill>
+          <a:blip r:embed="rId2">
+            <a:extLst>
+              <a:ext uri="{28A0092B-C50C-407E-A947-70E740481C1C}">
+                <a14:useLocalDpi xmlns:a14="http://schemas.microsoft.com/office/drawing/2010/main" val="0"/>
+              </a:ext>
+            </a:extLst>
+          </a:blip>
+          <a:stretch>
+            <a:fillRect/>
+          </a:stretch>
+        </p:blipFill>
         <p:spPr>
           <a:xfrm>
-            <a:off x="913774" y="5611761"/>
-            <a:ext cx="6672887" cy="636639"/>
-          </a:xfrm>
-        </p:spPr>
-        <p:txBody>
-          <a:bodyPr/>
-          <a:lstStyle/>
-          <a:p>
-            <a:r>
-              <a:rPr lang="en-AU" dirty="0" smtClean="0">
-                <a:hlinkClick r:id="rId2"/>
-              </a:rPr>
-              <a:t>https://www.vagrantup.com/docs/cli/up</a:t>
-            </a:r>
-            <a:endParaRPr lang="en-AU" dirty="0" smtClean="0"/>
-          </a:p>
-          <a:p>
-            <a:r>
-              <a:rPr lang="en-AU" dirty="0">
-                <a:hlinkClick r:id="rId3"/>
-              </a:rPr>
-              <a:t>https://</a:t>
-            </a:r>
-            <a:r>
-              <a:rPr lang="en-AU" dirty="0" smtClean="0">
-                <a:hlinkClick r:id="rId3"/>
-              </a:rPr>
-              <a:t>www.vagrantup.com/docs/cli/ssh</a:t>
-            </a:r>
-            <a:endParaRPr lang="en-AU" dirty="0" smtClean="0"/>
-          </a:p>
-          <a:p>
-            <a:r>
-              <a:rPr lang="en-AU" dirty="0">
-                <a:hlinkClick r:id="rId4"/>
-              </a:rPr>
-              <a:t>https://www.vagrantup.com/docs/cli/status</a:t>
-            </a:r>
-            <a:endParaRPr lang="en-AU" dirty="0" smtClean="0"/>
-          </a:p>
-          <a:p>
-            <a:endParaRPr lang="en-AU" dirty="0"/>
-          </a:p>
-        </p:txBody>
-      </p:sp>
+            <a:off x="1287312" y="2982476"/>
+            <a:ext cx="9330925" cy="2439686"/>
+          </a:xfrm>
+          <a:prstGeom prst="rect">
+            <a:avLst/>
+          </a:prstGeom>
+        </p:spPr>
+      </p:pic>
     </p:spTree>
     <p:extLst>
       <p:ext uri="{BB962C8B-B14F-4D97-AF65-F5344CB8AC3E}">
-        <p14:creationId xmlns:p14="http://schemas.microsoft.com/office/powerpoint/2010/main" val="1052113141"/>
+        <p14:creationId xmlns:p14="http://schemas.microsoft.com/office/powerpoint/2010/main" val="1246425237"/>
       </p:ext>
     </p:extLst>
   </p:cSld>
   <p:clrMapOvr>
     <a:masterClrMapping/>
   </p:clrMapOvr>
+  <p:timing>
+    <p:tnLst>
+      <p:par>
+        <p:cTn id="1" dur="indefinite" restart="never" nodeType="tmRoot"/>
+      </p:par>
+    </p:tnLst>
+  </p:timing>
 </p:sld>
 </file>
 
@@ -6595,19 +6629,22 @@
             <p:ph type="title"/>
           </p:nvPr>
         </p:nvSpPr>
-        <p:spPr>
-          <a:xfrm>
-            <a:off x="913775" y="618517"/>
-            <a:ext cx="10364451" cy="841573"/>
-          </a:xfrm>
-        </p:spPr>
+        <p:spPr/>
         <p:txBody>
           <a:bodyPr/>
           <a:lstStyle/>
           <a:p>
             <a:r>
               <a:rPr lang="en-AU" dirty="0" smtClean="0"/>
-              <a:t>Vagrant Basic Commands</a:t>
+              <a:t>Open the </a:t>
+            </a:r>
+            <a:r>
+              <a:rPr lang="en-AU" dirty="0" err="1" smtClean="0"/>
+              <a:t>Jupyter</a:t>
+            </a:r>
+            <a:r>
+              <a:rPr lang="en-AU" dirty="0" smtClean="0"/>
+              <a:t> Notebook Server on a browser</a:t>
             </a:r>
             <a:endParaRPr lang="en-AU" dirty="0"/>
           </a:p>
@@ -6621,8 +6658,8 @@
         </p:nvSpPr>
         <p:spPr>
           <a:xfrm>
-            <a:off x="1456364" y="1409525"/>
-            <a:ext cx="9279272" cy="4524315"/>
+            <a:off x="1276582" y="1869255"/>
+            <a:ext cx="9638835" cy="3693319"/>
           </a:xfrm>
           <a:prstGeom prst="rect">
             <a:avLst/>
@@ -6630,175 +6667,158 @@
           <a:noFill/>
         </p:spPr>
         <p:txBody>
-          <a:bodyPr wrap="none" rtlCol="0">
+          <a:bodyPr wrap="square" rtlCol="0">
             <a:spAutoFit/>
           </a:bodyPr>
           <a:lstStyle/>
           <a:p>
             <a:r>
-              <a:rPr lang="en-AU" dirty="0" smtClean="0"/>
-              <a:t>The vagrant commands for shutting down your Vagrant machine and destroying </a:t>
-            </a:r>
-          </a:p>
-          <a:p>
-            <a:r>
-              <a:rPr lang="en-AU" dirty="0" smtClean="0"/>
-              <a:t>your Vagrant machine. It is important to understand the differences.</a:t>
-            </a:r>
-          </a:p>
-          <a:p>
-            <a:endParaRPr lang="en-AU" dirty="0" smtClean="0"/>
-          </a:p>
-          <a:p>
-            <a:pPr marL="285750" indent="-285750">
-              <a:buFont typeface="Arial" panose="020B0604020202020204" pitchFamily="34" charset="0"/>
-              <a:buChar char="•"/>
-            </a:pPr>
-            <a:r>
-              <a:rPr lang="en-AU" dirty="0" smtClean="0"/>
-              <a:t>Command: </a:t>
-            </a:r>
-            <a:r>
-              <a:rPr lang="en-AU" b="1" dirty="0" smtClean="0"/>
-              <a:t>vagrant halt</a:t>
-            </a:r>
-          </a:p>
-          <a:p>
-            <a:pPr lvl="1"/>
-            <a:r>
-              <a:rPr lang="en-AU" dirty="0" smtClean="0"/>
-              <a:t>This command shuts down the running machine Vagrant is managing. This frees up</a:t>
-            </a:r>
-          </a:p>
-          <a:p>
-            <a:pPr lvl="1"/>
-            <a:r>
-              <a:rPr lang="en-AU" dirty="0" smtClean="0"/>
-              <a:t>the resources (CPU cores and RAM) allocated to the Virtual machine.  It saves the environment </a:t>
-            </a:r>
-          </a:p>
-          <a:p>
-            <a:pPr lvl="1"/>
-            <a:r>
-              <a:rPr lang="en-AU" dirty="0" smtClean="0"/>
-              <a:t>and files.  Vagrant will effectively just shut off power to the machine. The Vagrant command </a:t>
-            </a:r>
-          </a:p>
-          <a:p>
-            <a:pPr lvl="1"/>
-            <a:r>
-              <a:rPr lang="en-AU" dirty="0" smtClean="0"/>
-              <a:t>“vagrant up” will restart the Vagrant machine to it’s previous state.  </a:t>
-            </a:r>
-          </a:p>
-          <a:p>
-            <a:pPr lvl="1"/>
-            <a:r>
-              <a:rPr lang="en-AU" dirty="0" smtClean="0"/>
-              <a:t>  </a:t>
-            </a:r>
-          </a:p>
-          <a:p>
-            <a:pPr marL="285750" indent="-285750">
-              <a:buFont typeface="Arial" panose="020B0604020202020204" pitchFamily="34" charset="0"/>
-              <a:buChar char="•"/>
-            </a:pPr>
-            <a:r>
-              <a:rPr lang="en-AU" dirty="0" smtClean="0"/>
-              <a:t>Command: </a:t>
-            </a:r>
-            <a:r>
-              <a:rPr lang="en-AU" b="1" dirty="0" smtClean="0"/>
-              <a:t>vagrant</a:t>
-            </a:r>
-            <a:r>
-              <a:rPr lang="en-AU" dirty="0" smtClean="0"/>
+              <a:rPr lang="en-AU" dirty="0" smtClean="0">
+                <a:latin typeface="Arial" panose="020B0604020202020204" pitchFamily="34" charset="0"/>
+                <a:cs typeface="Arial" panose="020B0604020202020204" pitchFamily="34" charset="0"/>
+              </a:rPr>
+              <a:t>Step 6: Once the </a:t>
+            </a:r>
+            <a:r>
+              <a:rPr lang="en-AU" dirty="0" err="1" smtClean="0">
+                <a:latin typeface="Arial" panose="020B0604020202020204" pitchFamily="34" charset="0"/>
+                <a:cs typeface="Arial" panose="020B0604020202020204" pitchFamily="34" charset="0"/>
+              </a:rPr>
+              <a:t>jupyter</a:t>
+            </a:r>
+            <a:r>
+              <a:rPr lang="en-AU" dirty="0" smtClean="0">
+                <a:latin typeface="Arial" panose="020B0604020202020204" pitchFamily="34" charset="0"/>
+                <a:cs typeface="Arial" panose="020B0604020202020204" pitchFamily="34" charset="0"/>
+              </a:rPr>
+              <a:t> notebook server is running on your VM you can then open a browser and copy and paste the URL that starts with </a:t>
+            </a:r>
+            <a:r>
+              <a:rPr lang="en-AU" dirty="0" smtClean="0">
+                <a:latin typeface="Arial" panose="020B0604020202020204" pitchFamily="34" charset="0"/>
+                <a:cs typeface="Arial" panose="020B0604020202020204" pitchFamily="34" charset="0"/>
+                <a:hlinkClick r:id="rId2"/>
+              </a:rPr>
+              <a:t>http://127.0.0.1:8888/?token=...</a:t>
+            </a:r>
+            <a:r>
+              <a:rPr lang="en-AU" dirty="0">
+                <a:latin typeface="Arial" panose="020B0604020202020204" pitchFamily="34" charset="0"/>
+                <a:cs typeface="Arial" panose="020B0604020202020204" pitchFamily="34" charset="0"/>
+              </a:rPr>
               <a:t> </a:t>
             </a:r>
             <a:r>
-              <a:rPr lang="en-AU" b="1" dirty="0" smtClean="0"/>
-              <a:t>destroy</a:t>
-            </a:r>
-          </a:p>
-          <a:p>
-            <a:pPr lvl="1"/>
-            <a:r>
-              <a:rPr lang="en-AU" dirty="0"/>
-              <a:t>This command stops the running machine Vagrant is managing and destroys all </a:t>
-            </a:r>
-            <a:r>
-              <a:rPr lang="en-AU" dirty="0" smtClean="0"/>
-              <a:t>resources </a:t>
-            </a:r>
-          </a:p>
-          <a:p>
-            <a:pPr lvl="1"/>
-            <a:r>
-              <a:rPr lang="en-AU" dirty="0" smtClean="0"/>
-              <a:t>(CPU cores, RAM, and </a:t>
-            </a:r>
-            <a:r>
-              <a:rPr lang="en-AU" dirty="0" err="1" smtClean="0"/>
-              <a:t>diskspace</a:t>
-            </a:r>
-            <a:r>
-              <a:rPr lang="en-AU" dirty="0" smtClean="0"/>
-              <a:t>) </a:t>
-            </a:r>
-            <a:r>
-              <a:rPr lang="en-AU" dirty="0"/>
-              <a:t>that were </a:t>
-            </a:r>
-            <a:r>
-              <a:rPr lang="en-AU" dirty="0" smtClean="0"/>
-              <a:t>allocated </a:t>
-            </a:r>
-            <a:r>
-              <a:rPr lang="en-AU" dirty="0"/>
-              <a:t>during the machine creation process. </a:t>
-            </a:r>
-            <a:endParaRPr lang="en-AU" dirty="0" smtClean="0"/>
-          </a:p>
-          <a:p>
-            <a:pPr lvl="1"/>
-            <a:r>
-              <a:rPr lang="en-AU" dirty="0" smtClean="0"/>
-              <a:t>After </a:t>
-            </a:r>
-            <a:r>
-              <a:rPr lang="en-AU" dirty="0"/>
-              <a:t>running </a:t>
-            </a:r>
-            <a:r>
-              <a:rPr lang="en-AU" dirty="0" smtClean="0"/>
-              <a:t>this </a:t>
-            </a:r>
-            <a:r>
-              <a:rPr lang="en-AU" dirty="0"/>
-              <a:t>command, your computer should be left at a clean state, as if you never </a:t>
-            </a:r>
-            <a:endParaRPr lang="en-AU" dirty="0" smtClean="0"/>
-          </a:p>
-          <a:p>
-            <a:pPr lvl="1"/>
-            <a:r>
-              <a:rPr lang="en-AU" dirty="0" smtClean="0"/>
-              <a:t>created </a:t>
-            </a:r>
-            <a:r>
-              <a:rPr lang="en-AU" dirty="0"/>
-              <a:t>the guest machine in the first place</a:t>
-            </a:r>
-            <a:r>
-              <a:rPr lang="en-AU" dirty="0" smtClean="0"/>
-              <a:t>.  The FILES in your SHARED directories</a:t>
-            </a:r>
-          </a:p>
-          <a:p>
-            <a:pPr lvl="1"/>
-            <a:r>
-              <a:rPr lang="en-AU" dirty="0" smtClean="0"/>
-              <a:t>are not deleted!!</a:t>
+              <a:rPr lang="en-AU" dirty="0" smtClean="0">
+                <a:latin typeface="Arial" panose="020B0604020202020204" pitchFamily="34" charset="0"/>
+                <a:cs typeface="Arial" panose="020B0604020202020204" pitchFamily="34" charset="0"/>
+              </a:rPr>
+              <a:t>into </a:t>
+            </a:r>
+          </a:p>
+          <a:p>
+            <a:r>
+              <a:rPr lang="en-AU" dirty="0" smtClean="0">
+                <a:latin typeface="Arial" panose="020B0604020202020204" pitchFamily="34" charset="0"/>
+                <a:cs typeface="Arial" panose="020B0604020202020204" pitchFamily="34" charset="0"/>
+              </a:rPr>
+              <a:t>your address bar. </a:t>
+            </a:r>
+          </a:p>
+          <a:p>
+            <a:endParaRPr lang="en-AU" dirty="0" smtClean="0">
+              <a:latin typeface="Arial" panose="020B0604020202020204" pitchFamily="34" charset="0"/>
+              <a:cs typeface="Arial" panose="020B0604020202020204" pitchFamily="34" charset="0"/>
+            </a:endParaRPr>
+          </a:p>
+          <a:p>
+            <a:endParaRPr lang="en-AU" dirty="0" smtClean="0">
+              <a:latin typeface="Arial" panose="020B0604020202020204" pitchFamily="34" charset="0"/>
+              <a:cs typeface="Arial" panose="020B0604020202020204" pitchFamily="34" charset="0"/>
+            </a:endParaRPr>
+          </a:p>
+          <a:p>
+            <a:endParaRPr lang="en-AU" dirty="0">
+              <a:latin typeface="Arial" panose="020B0604020202020204" pitchFamily="34" charset="0"/>
+              <a:cs typeface="Arial" panose="020B0604020202020204" pitchFamily="34" charset="0"/>
+            </a:endParaRPr>
+          </a:p>
+          <a:p>
+            <a:endParaRPr lang="en-AU" dirty="0" smtClean="0">
+              <a:latin typeface="Arial" panose="020B0604020202020204" pitchFamily="34" charset="0"/>
+              <a:cs typeface="Arial" panose="020B0604020202020204" pitchFamily="34" charset="0"/>
+            </a:endParaRPr>
+          </a:p>
+          <a:p>
+            <a:endParaRPr lang="en-AU" dirty="0">
+              <a:latin typeface="Arial" panose="020B0604020202020204" pitchFamily="34" charset="0"/>
+              <a:cs typeface="Arial" panose="020B0604020202020204" pitchFamily="34" charset="0"/>
+            </a:endParaRPr>
+          </a:p>
+          <a:p>
+            <a:r>
+              <a:rPr lang="en-AU" dirty="0" smtClean="0">
+                <a:latin typeface="Arial" panose="020B0604020202020204" pitchFamily="34" charset="0"/>
+                <a:cs typeface="Arial" panose="020B0604020202020204" pitchFamily="34" charset="0"/>
+              </a:rPr>
+              <a:t>The token number is unique to a </a:t>
+            </a:r>
+            <a:r>
+              <a:rPr lang="en-AU" dirty="0" err="1" smtClean="0">
+                <a:latin typeface="Arial" panose="020B0604020202020204" pitchFamily="34" charset="0"/>
+                <a:cs typeface="Arial" panose="020B0604020202020204" pitchFamily="34" charset="0"/>
+              </a:rPr>
+              <a:t>juptyer</a:t>
+            </a:r>
+            <a:r>
+              <a:rPr lang="en-AU" dirty="0" smtClean="0">
+                <a:latin typeface="Arial" panose="020B0604020202020204" pitchFamily="34" charset="0"/>
+                <a:cs typeface="Arial" panose="020B0604020202020204" pitchFamily="34" charset="0"/>
+              </a:rPr>
+              <a:t> notebook lab SESSION while you are running the </a:t>
+            </a:r>
+            <a:r>
+              <a:rPr lang="en-AU" dirty="0" err="1" smtClean="0">
+                <a:latin typeface="Arial" panose="020B0604020202020204" pitchFamily="34" charset="0"/>
+                <a:cs typeface="Arial" panose="020B0604020202020204" pitchFamily="34" charset="0"/>
+              </a:rPr>
+              <a:t>juypter</a:t>
+            </a:r>
+            <a:r>
+              <a:rPr lang="en-AU" dirty="0" smtClean="0">
+                <a:latin typeface="Arial" panose="020B0604020202020204" pitchFamily="34" charset="0"/>
+                <a:cs typeface="Arial" panose="020B0604020202020204" pitchFamily="34" charset="0"/>
+              </a:rPr>
+              <a:t> notebook server.</a:t>
+            </a:r>
+          </a:p>
+          <a:p>
+            <a:endParaRPr lang="en-AU" dirty="0" smtClean="0">
+              <a:latin typeface="Arial" panose="020B0604020202020204" pitchFamily="34" charset="0"/>
+              <a:cs typeface="Arial" panose="020B0604020202020204" pitchFamily="34" charset="0"/>
+            </a:endParaRPr>
+          </a:p>
+          <a:p>
+            <a:r>
+              <a:rPr lang="en-AU" dirty="0" smtClean="0">
+                <a:latin typeface="Arial" panose="020B0604020202020204" pitchFamily="34" charset="0"/>
+                <a:cs typeface="Arial" panose="020B0604020202020204" pitchFamily="34" charset="0"/>
+              </a:rPr>
+              <a:t>Restarting the </a:t>
+            </a:r>
+            <a:r>
+              <a:rPr lang="en-AU" dirty="0" err="1" smtClean="0">
+                <a:latin typeface="Arial" panose="020B0604020202020204" pitchFamily="34" charset="0"/>
+                <a:cs typeface="Arial" panose="020B0604020202020204" pitchFamily="34" charset="0"/>
+              </a:rPr>
+              <a:t>jupyter</a:t>
+            </a:r>
+            <a:r>
+              <a:rPr lang="en-AU" dirty="0" smtClean="0">
+                <a:latin typeface="Arial" panose="020B0604020202020204" pitchFamily="34" charset="0"/>
+                <a:cs typeface="Arial" panose="020B0604020202020204" pitchFamily="34" charset="0"/>
+              </a:rPr>
+              <a:t> notebook will generate a new token! </a:t>
             </a:r>
           </a:p>
           <a:p>
@@ -6806,50 +6826,516 @@
           </a:p>
         </p:txBody>
       </p:sp>
-      <p:sp>
-        <p:nvSpPr>
-          <p:cNvPr id="4" name="Footer Placeholder 3"/>
-          <p:cNvSpPr>
-            <a:spLocks noGrp="1"/>
-          </p:cNvSpPr>
-          <p:nvPr>
-            <p:ph type="ftr" sz="quarter" idx="11"/>
-          </p:nvPr>
-        </p:nvSpPr>
-        <p:spPr/>
-        <p:txBody>
-          <a:bodyPr/>
+      <p:pic>
+        <p:nvPicPr>
+          <p:cNvPr id="5" name="Picture 4"/>
+          <p:cNvPicPr>
+            <a:picLocks noChangeAspect="1"/>
+          </p:cNvPicPr>
+          <p:nvPr/>
+        </p:nvPicPr>
+        <p:blipFill>
+          <a:blip r:embed="rId3">
+            <a:extLst>
+              <a:ext uri="{28A0092B-C50C-407E-A947-70E740481C1C}">
+                <a14:useLocalDpi xmlns:a14="http://schemas.microsoft.com/office/drawing/2010/main" val="0"/>
+              </a:ext>
+            </a:extLst>
+          </a:blip>
+          <a:stretch>
+            <a:fillRect/>
+          </a:stretch>
+        </p:blipFill>
+        <p:spPr>
+          <a:xfrm>
+            <a:off x="1356480" y="2782854"/>
+            <a:ext cx="9217022" cy="867747"/>
+          </a:xfrm>
+          <a:prstGeom prst="rect">
+            <a:avLst/>
+          </a:prstGeom>
+        </p:spPr>
+      </p:pic>
+      <p:sp>
+        <p:nvSpPr>
+          <p:cNvPr id="8" name="Rounded Rectangle 7"/>
+          <p:cNvSpPr/>
+          <p:nvPr/>
+        </p:nvSpPr>
+        <p:spPr>
+          <a:xfrm>
+            <a:off x="2181427" y="3195732"/>
+            <a:ext cx="7567127" cy="326572"/>
+          </a:xfrm>
+          <a:prstGeom prst="roundRect">
+            <a:avLst/>
+          </a:prstGeom>
+          <a:noFill/>
+          <a:ln>
+            <a:solidFill>
+              <a:srgbClr val="00B050"/>
+            </a:solidFill>
+          </a:ln>
+        </p:spPr>
+        <p:style>
+          <a:lnRef idx="2">
+            <a:schemeClr val="accent1">
+              <a:shade val="50000"/>
+            </a:schemeClr>
+          </a:lnRef>
+          <a:fillRef idx="1">
+            <a:schemeClr val="accent1"/>
+          </a:fillRef>
+          <a:effectRef idx="0">
+            <a:schemeClr val="accent1"/>
+          </a:effectRef>
+          <a:fontRef idx="minor">
+            <a:schemeClr val="lt1"/>
+          </a:fontRef>
+        </p:style>
+        <p:txBody>
+          <a:bodyPr rtlCol="0" anchor="ctr"/>
           <a:lstStyle/>
           <a:p>
-            <a:r>
-              <a:rPr lang="en-AU" dirty="0" smtClean="0">
-                <a:hlinkClick r:id="rId2"/>
-              </a:rPr>
-              <a:t>https://www.vagrantup.com/docs/cli/halt</a:t>
-            </a:r>
-            <a:endParaRPr lang="en-AU" dirty="0" smtClean="0"/>
-          </a:p>
-          <a:p>
-            <a:r>
-              <a:rPr lang="en-AU" dirty="0">
-                <a:hlinkClick r:id="rId3"/>
-              </a:rPr>
-              <a:t>https://www.vagrantup.com/docs/cli/destroy</a:t>
-            </a:r>
-            <a:endParaRPr lang="en-AU" dirty="0"/>
+            <a:pPr algn="ctr"/>
+            <a:endParaRPr lang="en-AU"/>
           </a:p>
         </p:txBody>
       </p:sp>
     </p:spTree>
     <p:extLst>
       <p:ext uri="{BB962C8B-B14F-4D97-AF65-F5344CB8AC3E}">
-        <p14:creationId xmlns:p14="http://schemas.microsoft.com/office/powerpoint/2010/main" val="2744008792"/>
+        <p14:creationId xmlns:p14="http://schemas.microsoft.com/office/powerpoint/2010/main" val="2306365248"/>
       </p:ext>
     </p:extLst>
   </p:cSld>
   <p:clrMapOvr>
     <a:masterClrMapping/>
   </p:clrMapOvr>
+  <p:timing>
+    <p:tnLst>
+      <p:par>
+        <p:cTn id="1" dur="indefinite" restart="never" nodeType="tmRoot"/>
+      </p:par>
+    </p:tnLst>
+  </p:timing>
+</p:sld>
+</file>
+
+<file path=ppt/slides/slide12.xml><?xml version="1.0" encoding="utf-8"?>
+<p:sld xmlns:a="http://schemas.openxmlformats.org/drawingml/2006/main" xmlns:r="http://schemas.openxmlformats.org/officeDocument/2006/relationships" xmlns:p="http://schemas.openxmlformats.org/presentationml/2006/main">
+  <p:cSld>
+    <p:spTree>
+      <p:nvGrpSpPr>
+        <p:cNvPr id="1" name=""/>
+        <p:cNvGrpSpPr/>
+        <p:nvPr/>
+      </p:nvGrpSpPr>
+      <p:grpSpPr>
+        <a:xfrm>
+          <a:off x="0" y="0"/>
+          <a:ext cx="0" cy="0"/>
+          <a:chOff x="0" y="0"/>
+          <a:chExt cx="0" cy="0"/>
+        </a:xfrm>
+      </p:grpSpPr>
+      <p:sp>
+        <p:nvSpPr>
+          <p:cNvPr id="2" name="Title 1"/>
+          <p:cNvSpPr>
+            <a:spLocks noGrp="1"/>
+          </p:cNvSpPr>
+          <p:nvPr>
+            <p:ph type="title"/>
+          </p:nvPr>
+        </p:nvSpPr>
+        <p:spPr>
+          <a:xfrm>
+            <a:off x="989972" y="282341"/>
+            <a:ext cx="10364451" cy="1210283"/>
+          </a:xfrm>
+        </p:spPr>
+        <p:txBody>
+          <a:bodyPr/>
+          <a:lstStyle/>
+          <a:p>
+            <a:r>
+              <a:rPr lang="en-AU" b="1" dirty="0" smtClean="0">
+                <a:latin typeface="Lucida Sans Typewriter" panose="020B0509030504030204" pitchFamily="49" charset="0"/>
+              </a:rPr>
+              <a:t>Summary of commands	</a:t>
+            </a:r>
+            <a:endParaRPr lang="en-AU" b="1" dirty="0">
+              <a:latin typeface="Lucida Sans Typewriter" panose="020B0509030504030204" pitchFamily="49" charset="0"/>
+            </a:endParaRPr>
+          </a:p>
+        </p:txBody>
+      </p:sp>
+      <p:sp>
+        <p:nvSpPr>
+          <p:cNvPr id="3" name="TextBox 2"/>
+          <p:cNvSpPr txBox="1"/>
+          <p:nvPr/>
+        </p:nvSpPr>
+        <p:spPr>
+          <a:xfrm>
+            <a:off x="1559856" y="1690688"/>
+            <a:ext cx="9224685" cy="3970318"/>
+          </a:xfrm>
+          <a:prstGeom prst="rect">
+            <a:avLst/>
+          </a:prstGeom>
+          <a:noFill/>
+        </p:spPr>
+        <p:txBody>
+          <a:bodyPr wrap="square" rtlCol="0">
+            <a:spAutoFit/>
+          </a:bodyPr>
+          <a:lstStyle/>
+          <a:p>
+            <a:r>
+              <a:rPr lang="en-AU" dirty="0" smtClean="0">
+                <a:latin typeface="Arial" panose="020B0604020202020204" pitchFamily="34" charset="0"/>
+                <a:cs typeface="Arial" panose="020B0604020202020204" pitchFamily="34" charset="0"/>
+              </a:rPr>
+              <a:t>Step 1  - Create the project directory</a:t>
+            </a:r>
+          </a:p>
+          <a:p>
+            <a:pPr marL="742950" lvl="1" indent="-285750">
+              <a:buFont typeface="Wingdings" panose="05000000000000000000" pitchFamily="2" charset="2"/>
+              <a:buChar char="Ø"/>
+            </a:pPr>
+            <a:r>
+              <a:rPr lang="en-AU" dirty="0" err="1" smtClean="0">
+                <a:latin typeface="Lucida Sans Typewriter" panose="020B0509030504030204" pitchFamily="49" charset="0"/>
+                <a:cs typeface="Arial" panose="020B0604020202020204" pitchFamily="34" charset="0"/>
+              </a:rPr>
+              <a:t>mkdir</a:t>
+            </a:r>
+            <a:r>
+              <a:rPr lang="en-AU" dirty="0" smtClean="0">
+                <a:latin typeface="Lucida Sans Typewriter" panose="020B0509030504030204" pitchFamily="49" charset="0"/>
+                <a:cs typeface="Arial" panose="020B0604020202020204" pitchFamily="34" charset="0"/>
+              </a:rPr>
+              <a:t> courses</a:t>
+            </a:r>
+          </a:p>
+          <a:p>
+            <a:pPr marL="742950" lvl="1" indent="-285750">
+              <a:buFont typeface="Wingdings" panose="05000000000000000000" pitchFamily="2" charset="2"/>
+              <a:buChar char="Ø"/>
+            </a:pPr>
+            <a:r>
+              <a:rPr lang="en-AU" dirty="0" smtClean="0">
+                <a:latin typeface="Lucida Sans Typewriter" panose="020B0509030504030204" pitchFamily="49" charset="0"/>
+                <a:cs typeface="Arial" panose="020B0604020202020204" pitchFamily="34" charset="0"/>
+              </a:rPr>
+              <a:t>cd courses</a:t>
+            </a:r>
+          </a:p>
+          <a:p>
+            <a:r>
+              <a:rPr lang="en-AU" dirty="0" smtClean="0">
+                <a:latin typeface="Arial" panose="020B0604020202020204" pitchFamily="34" charset="0"/>
+                <a:cs typeface="Arial" panose="020B0604020202020204" pitchFamily="34" charset="0"/>
+              </a:rPr>
+              <a:t>Step 2  - Clone the repository with </a:t>
+            </a:r>
+            <a:r>
+              <a:rPr lang="en-AU" dirty="0" err="1" smtClean="0">
+                <a:latin typeface="Arial" panose="020B0604020202020204" pitchFamily="34" charset="0"/>
+                <a:cs typeface="Arial" panose="020B0604020202020204" pitchFamily="34" charset="0"/>
+              </a:rPr>
+              <a:t>Vagrantfile</a:t>
+            </a:r>
+            <a:endParaRPr lang="en-AU" dirty="0" smtClean="0">
+              <a:latin typeface="Arial" panose="020B0604020202020204" pitchFamily="34" charset="0"/>
+              <a:cs typeface="Arial" panose="020B0604020202020204" pitchFamily="34" charset="0"/>
+            </a:endParaRPr>
+          </a:p>
+          <a:p>
+            <a:pPr marL="742950" lvl="1" indent="-285750">
+              <a:buFont typeface="Wingdings" panose="05000000000000000000" pitchFamily="2" charset="2"/>
+              <a:buChar char="Ø"/>
+            </a:pPr>
+            <a:r>
+              <a:rPr lang="en-AU" dirty="0" smtClean="0">
+                <a:latin typeface="Lucida Sans Typewriter" panose="020B0509030504030204" pitchFamily="49" charset="0"/>
+                <a:cs typeface="Arial" panose="020B0604020202020204" pitchFamily="34" charset="0"/>
+              </a:rPr>
+              <a:t>git clone </a:t>
+            </a:r>
+            <a:r>
+              <a:rPr lang="en-AU" dirty="0" smtClean="0">
+                <a:latin typeface="Lucida Sans Typewriter" panose="020B0509030504030204" pitchFamily="49" charset="0"/>
+                <a:cs typeface="Arial" panose="020B0604020202020204" pitchFamily="34" charset="0"/>
+                <a:hlinkClick r:id="rId2"/>
+              </a:rPr>
+              <a:t>https</a:t>
+            </a:r>
+            <a:r>
+              <a:rPr lang="en-AU" dirty="0">
+                <a:latin typeface="Lucida Sans Typewriter" panose="020B0509030504030204" pitchFamily="49" charset="0"/>
+                <a:cs typeface="Arial" panose="020B0604020202020204" pitchFamily="34" charset="0"/>
+                <a:hlinkClick r:id="rId2"/>
+              </a:rPr>
+              <a:t>://</a:t>
+            </a:r>
+            <a:r>
+              <a:rPr lang="en-AU" dirty="0" smtClean="0">
+                <a:latin typeface="Lucida Sans Typewriter" panose="020B0509030504030204" pitchFamily="49" charset="0"/>
+                <a:cs typeface="Arial" panose="020B0604020202020204" pitchFamily="34" charset="0"/>
+                <a:hlinkClick r:id="rId2"/>
+              </a:rPr>
+              <a:t>github.com/chrisbpawsey/Data1001.git</a:t>
+            </a:r>
+            <a:endParaRPr lang="en-AU" dirty="0" smtClean="0">
+              <a:latin typeface="Lucida Sans Typewriter" panose="020B0509030504030204" pitchFamily="49" charset="0"/>
+              <a:cs typeface="Arial" panose="020B0604020202020204" pitchFamily="34" charset="0"/>
+            </a:endParaRPr>
+          </a:p>
+          <a:p>
+            <a:r>
+              <a:rPr lang="en-AU" dirty="0" smtClean="0">
+                <a:latin typeface="Arial" panose="020B0604020202020204" pitchFamily="34" charset="0"/>
+                <a:cs typeface="Arial" panose="020B0604020202020204" pitchFamily="34" charset="0"/>
+              </a:rPr>
+              <a:t>Step 3  - launch the Virtual machine</a:t>
+            </a:r>
+          </a:p>
+          <a:p>
+            <a:pPr marL="742950" lvl="1" indent="-285750">
+              <a:buFont typeface="Wingdings" panose="05000000000000000000" pitchFamily="2" charset="2"/>
+              <a:buChar char="Ø"/>
+            </a:pPr>
+            <a:r>
+              <a:rPr lang="en-AU" dirty="0" smtClean="0">
+                <a:latin typeface="Lucida Sans Typewriter" panose="020B0509030504030204" pitchFamily="49" charset="0"/>
+                <a:cs typeface="Arial" panose="020B0604020202020204" pitchFamily="34" charset="0"/>
+              </a:rPr>
+              <a:t>cd Data1001</a:t>
+            </a:r>
+          </a:p>
+          <a:p>
+            <a:pPr marL="742950" lvl="1" indent="-285750">
+              <a:buFont typeface="Wingdings" panose="05000000000000000000" pitchFamily="2" charset="2"/>
+              <a:buChar char="Ø"/>
+            </a:pPr>
+            <a:r>
+              <a:rPr lang="en-AU" dirty="0" smtClean="0">
+                <a:latin typeface="Lucida Sans Typewriter" panose="020B0509030504030204" pitchFamily="49" charset="0"/>
+                <a:cs typeface="Arial" panose="020B0604020202020204" pitchFamily="34" charset="0"/>
+              </a:rPr>
+              <a:t>vagrant up</a:t>
+            </a:r>
+          </a:p>
+          <a:p>
+            <a:r>
+              <a:rPr lang="en-AU" dirty="0" smtClean="0">
+                <a:latin typeface="Arial" panose="020B0604020202020204" pitchFamily="34" charset="0"/>
+                <a:cs typeface="Arial" panose="020B0604020202020204" pitchFamily="34" charset="0"/>
+              </a:rPr>
+              <a:t>Step 4  - use </a:t>
+            </a:r>
+            <a:r>
+              <a:rPr lang="en-AU" dirty="0" err="1" smtClean="0">
+                <a:latin typeface="Arial" panose="020B0604020202020204" pitchFamily="34" charset="0"/>
+                <a:cs typeface="Arial" panose="020B0604020202020204" pitchFamily="34" charset="0"/>
+              </a:rPr>
+              <a:t>ssh</a:t>
+            </a:r>
+            <a:r>
+              <a:rPr lang="en-AU" dirty="0" smtClean="0">
+                <a:latin typeface="Arial" panose="020B0604020202020204" pitchFamily="34" charset="0"/>
+                <a:cs typeface="Arial" panose="020B0604020202020204" pitchFamily="34" charset="0"/>
+              </a:rPr>
+              <a:t> to login to the virtual machine (VM)</a:t>
+            </a:r>
+          </a:p>
+          <a:p>
+            <a:pPr marL="742950" lvl="1" indent="-285750">
+              <a:buFont typeface="Wingdings" panose="05000000000000000000" pitchFamily="2" charset="2"/>
+              <a:buChar char="Ø"/>
+            </a:pPr>
+            <a:r>
+              <a:rPr lang="en-AU" dirty="0" smtClean="0">
+                <a:latin typeface="Lucida Sans Typewriter" panose="020B0509030504030204" pitchFamily="49" charset="0"/>
+                <a:cs typeface="Arial" panose="020B0604020202020204" pitchFamily="34" charset="0"/>
+              </a:rPr>
+              <a:t>vagrant </a:t>
+            </a:r>
+            <a:r>
+              <a:rPr lang="en-AU" dirty="0" err="1" smtClean="0">
+                <a:latin typeface="Lucida Sans Typewriter" panose="020B0509030504030204" pitchFamily="49" charset="0"/>
+                <a:cs typeface="Arial" panose="020B0604020202020204" pitchFamily="34" charset="0"/>
+              </a:rPr>
+              <a:t>ssh</a:t>
+            </a:r>
+            <a:endParaRPr lang="en-AU" dirty="0" smtClean="0">
+              <a:latin typeface="Lucida Sans Typewriter" panose="020B0509030504030204" pitchFamily="49" charset="0"/>
+              <a:cs typeface="Arial" panose="020B0604020202020204" pitchFamily="34" charset="0"/>
+            </a:endParaRPr>
+          </a:p>
+          <a:p>
+            <a:r>
+              <a:rPr lang="en-AU" dirty="0" smtClean="0">
+                <a:latin typeface="Arial" panose="020B0604020202020204" pitchFamily="34" charset="0"/>
+                <a:cs typeface="Arial" panose="020B0604020202020204" pitchFamily="34" charset="0"/>
+              </a:rPr>
+              <a:t>Step </a:t>
+            </a:r>
+            <a:r>
+              <a:rPr lang="en-AU" dirty="0">
+                <a:latin typeface="Arial" panose="020B0604020202020204" pitchFamily="34" charset="0"/>
+                <a:cs typeface="Arial" panose="020B0604020202020204" pitchFamily="34" charset="0"/>
+              </a:rPr>
+              <a:t>5</a:t>
+            </a:r>
+            <a:r>
+              <a:rPr lang="en-AU" dirty="0" smtClean="0">
+                <a:latin typeface="Arial" panose="020B0604020202020204" pitchFamily="34" charset="0"/>
+                <a:cs typeface="Arial" panose="020B0604020202020204" pitchFamily="34" charset="0"/>
+              </a:rPr>
+              <a:t> - start the </a:t>
+            </a:r>
+            <a:r>
+              <a:rPr lang="en-AU" dirty="0" err="1" smtClean="0">
+                <a:latin typeface="Arial" panose="020B0604020202020204" pitchFamily="34" charset="0"/>
+                <a:cs typeface="Arial" panose="020B0604020202020204" pitchFamily="34" charset="0"/>
+              </a:rPr>
+              <a:t>jupyter</a:t>
+            </a:r>
+            <a:r>
+              <a:rPr lang="en-AU" dirty="0" smtClean="0">
+                <a:latin typeface="Arial" panose="020B0604020202020204" pitchFamily="34" charset="0"/>
+                <a:cs typeface="Arial" panose="020B0604020202020204" pitchFamily="34" charset="0"/>
+              </a:rPr>
+              <a:t> notebook server in your </a:t>
+            </a:r>
+            <a:r>
+              <a:rPr lang="en-AU" smtClean="0">
+                <a:latin typeface="Arial" panose="020B0604020202020204" pitchFamily="34" charset="0"/>
+                <a:cs typeface="Arial" panose="020B0604020202020204" pitchFamily="34" charset="0"/>
+              </a:rPr>
+              <a:t>virtual machine (VM)</a:t>
+            </a:r>
+            <a:endParaRPr lang="en-AU" dirty="0" smtClean="0">
+              <a:latin typeface="Arial" panose="020B0604020202020204" pitchFamily="34" charset="0"/>
+              <a:cs typeface="Arial" panose="020B0604020202020204" pitchFamily="34" charset="0"/>
+            </a:endParaRPr>
+          </a:p>
+          <a:p>
+            <a:pPr marL="742950" lvl="1" indent="-285750">
+              <a:buFont typeface="Wingdings" panose="05000000000000000000" pitchFamily="2" charset="2"/>
+              <a:buChar char="Ø"/>
+            </a:pPr>
+            <a:r>
+              <a:rPr lang="en-AU" dirty="0" smtClean="0">
+                <a:latin typeface="Lucida Sans Typewriter" panose="020B0509030504030204" pitchFamily="49" charset="0"/>
+                <a:cs typeface="Arial" panose="020B0604020202020204" pitchFamily="34" charset="0"/>
+              </a:rPr>
+              <a:t> </a:t>
+            </a:r>
+            <a:r>
+              <a:rPr lang="en-AU" dirty="0" err="1" smtClean="0">
+                <a:latin typeface="Lucida Sans Typewriter" panose="020B0509030504030204" pitchFamily="49" charset="0"/>
+                <a:cs typeface="Arial" panose="020B0604020202020204" pitchFamily="34" charset="0"/>
+              </a:rPr>
+              <a:t>jupyter</a:t>
+            </a:r>
+            <a:r>
+              <a:rPr lang="en-AU" dirty="0" smtClean="0">
+                <a:latin typeface="Lucida Sans Typewriter" panose="020B0509030504030204" pitchFamily="49" charset="0"/>
+                <a:cs typeface="Arial" panose="020B0604020202020204" pitchFamily="34" charset="0"/>
+              </a:rPr>
+              <a:t> notebook –</a:t>
+            </a:r>
+            <a:r>
+              <a:rPr lang="en-AU" dirty="0" err="1" smtClean="0">
+                <a:latin typeface="Lucida Sans Typewriter" panose="020B0509030504030204" pitchFamily="49" charset="0"/>
+                <a:cs typeface="Arial" panose="020B0604020202020204" pitchFamily="34" charset="0"/>
+              </a:rPr>
+              <a:t>ip</a:t>
+            </a:r>
+            <a:r>
+              <a:rPr lang="en-AU" dirty="0" smtClean="0">
+                <a:latin typeface="Lucida Sans Typewriter" panose="020B0509030504030204" pitchFamily="49" charset="0"/>
+                <a:cs typeface="Arial" panose="020B0604020202020204" pitchFamily="34" charset="0"/>
+              </a:rPr>
+              <a:t>=0.0.0.0 –-no-browser</a:t>
+            </a:r>
+          </a:p>
+          <a:p>
+            <a:r>
+              <a:rPr lang="en-AU" dirty="0" smtClean="0">
+                <a:latin typeface="Arial" panose="020B0604020202020204" pitchFamily="34" charset="0"/>
+                <a:cs typeface="Arial" panose="020B0604020202020204" pitchFamily="34" charset="0"/>
+              </a:rPr>
+              <a:t>Step </a:t>
+            </a:r>
+            <a:r>
+              <a:rPr lang="en-AU" dirty="0">
+                <a:latin typeface="Arial" panose="020B0604020202020204" pitchFamily="34" charset="0"/>
+                <a:cs typeface="Arial" panose="020B0604020202020204" pitchFamily="34" charset="0"/>
+              </a:rPr>
+              <a:t>6</a:t>
+            </a:r>
+            <a:r>
+              <a:rPr lang="en-AU" dirty="0" smtClean="0">
+                <a:latin typeface="Arial" panose="020B0604020202020204" pitchFamily="34" charset="0"/>
+                <a:cs typeface="Arial" panose="020B0604020202020204" pitchFamily="34" charset="0"/>
+              </a:rPr>
+              <a:t> – open </a:t>
+            </a:r>
+            <a:r>
+              <a:rPr lang="en-AU" dirty="0" err="1" smtClean="0">
+                <a:latin typeface="Arial" panose="020B0604020202020204" pitchFamily="34" charset="0"/>
+                <a:cs typeface="Arial" panose="020B0604020202020204" pitchFamily="34" charset="0"/>
+              </a:rPr>
+              <a:t>jupyter</a:t>
+            </a:r>
+            <a:r>
+              <a:rPr lang="en-AU" dirty="0" smtClean="0">
+                <a:latin typeface="Arial" panose="020B0604020202020204" pitchFamily="34" charset="0"/>
+                <a:cs typeface="Arial" panose="020B0604020202020204" pitchFamily="34" charset="0"/>
+              </a:rPr>
+              <a:t> notebook in browser</a:t>
+            </a:r>
+          </a:p>
+          <a:p>
+            <a:pPr lvl="1"/>
+            <a:r>
+              <a:rPr lang="en-AU" dirty="0">
+                <a:latin typeface="Lucida Sans Typewriter" panose="020B0509030504030204" pitchFamily="49" charset="0"/>
+                <a:cs typeface="Arial" panose="020B0604020202020204" pitchFamily="34" charset="0"/>
+              </a:rPr>
+              <a:t> </a:t>
+            </a:r>
+            <a:endParaRPr lang="en-AU" dirty="0" smtClean="0">
+              <a:latin typeface="Lucida Sans Typewriter" panose="020B0509030504030204" pitchFamily="49" charset="0"/>
+              <a:cs typeface="Arial" panose="020B0604020202020204" pitchFamily="34" charset="0"/>
+            </a:endParaRPr>
+          </a:p>
+        </p:txBody>
+      </p:sp>
+    </p:spTree>
+    <p:extLst>
+      <p:ext uri="{BB962C8B-B14F-4D97-AF65-F5344CB8AC3E}">
+        <p14:creationId xmlns:p14="http://schemas.microsoft.com/office/powerpoint/2010/main" val="832770814"/>
+      </p:ext>
+    </p:extLst>
+  </p:cSld>
+  <p:clrMapOvr>
+    <a:masterClrMapping/>
+  </p:clrMapOvr>
+  <p:timing>
+    <p:tnLst>
+      <p:par>
+        <p:cTn id="1" dur="indefinite" restart="never" nodeType="tmRoot"/>
+      </p:par>
+    </p:tnLst>
+  </p:timing>
 </p:sld>
 </file>
 
@@ -7242,9 +7728,38 @@
           </a:p>
         </p:txBody>
       </p:sp>
+      <p:sp>
+        <p:nvSpPr>
+          <p:cNvPr id="11" name="TextBox 10"/>
+          <p:cNvSpPr txBox="1"/>
+          <p:nvPr/>
+        </p:nvSpPr>
+        <p:spPr>
+          <a:xfrm>
+            <a:off x="1008529" y="5647764"/>
+            <a:ext cx="7221071" cy="369332"/>
+          </a:xfrm>
+          <a:prstGeom prst="rect">
+            <a:avLst/>
+          </a:prstGeom>
+          <a:noFill/>
+        </p:spPr>
+        <p:txBody>
+          <a:bodyPr wrap="square" rtlCol="0">
+            <a:spAutoFit/>
+          </a:bodyPr>
+          <a:lstStyle/>
+          <a:p>
+            <a:r>
+              <a:rPr lang="en-AU" dirty="0" smtClean="0"/>
+              <a:t>If it returns the version number as shown above you are good to go! </a:t>
+            </a:r>
+          </a:p>
+        </p:txBody>
+      </p:sp>
       <p:pic>
         <p:nvPicPr>
-          <p:cNvPr id="10" name="Picture 9"/>
+          <p:cNvPr id="7" name="Picture 6"/>
           <p:cNvPicPr>
             <a:picLocks noChangeAspect="1"/>
           </p:cNvPicPr>
@@ -7264,43 +7779,14 @@
         </p:blipFill>
         <p:spPr>
           <a:xfrm>
-            <a:off x="1008529" y="3215483"/>
-            <a:ext cx="4427604" cy="1958510"/>
+            <a:off x="1008529" y="3584085"/>
+            <a:ext cx="5997460" cy="1364098"/>
           </a:xfrm>
           <a:prstGeom prst="rect">
             <a:avLst/>
           </a:prstGeom>
         </p:spPr>
       </p:pic>
-      <p:sp>
-        <p:nvSpPr>
-          <p:cNvPr id="11" name="TextBox 10"/>
-          <p:cNvSpPr txBox="1"/>
-          <p:nvPr/>
-        </p:nvSpPr>
-        <p:spPr>
-          <a:xfrm>
-            <a:off x="1008529" y="5647764"/>
-            <a:ext cx="7221071" cy="369332"/>
-          </a:xfrm>
-          <a:prstGeom prst="rect">
-            <a:avLst/>
-          </a:prstGeom>
-          <a:noFill/>
-        </p:spPr>
-        <p:txBody>
-          <a:bodyPr wrap="square" rtlCol="0">
-            <a:spAutoFit/>
-          </a:bodyPr>
-          <a:lstStyle/>
-          <a:p>
-            <a:r>
-              <a:rPr lang="en-AU" dirty="0" smtClean="0"/>
-              <a:t>If it returns the version number as shown above you are good to go! </a:t>
-            </a:r>
-          </a:p>
-        </p:txBody>
-      </p:sp>
     </p:spTree>
     <p:extLst>
       <p:ext uri="{BB962C8B-B14F-4D97-AF65-F5344CB8AC3E}">
@@ -7399,8 +7885,8 @@
         </p:nvSpPr>
         <p:spPr>
           <a:xfrm>
-            <a:off x="3070363" y="3809673"/>
-            <a:ext cx="6051272" cy="1200329"/>
+            <a:off x="3097133" y="3809673"/>
+            <a:ext cx="5997732" cy="1231106"/>
           </a:xfrm>
           <a:prstGeom prst="rect">
             <a:avLst/>
@@ -7429,12 +7915,12 @@
               <a:buChar char="•"/>
             </a:pPr>
             <a:r>
-              <a:rPr lang="en-AU" dirty="0">
+              <a:rPr lang="en-AU" sz="2000" dirty="0">
                 <a:hlinkClick r:id="rId3"/>
               </a:rPr>
               <a:t>https://gitforwindows.org/</a:t>
             </a:r>
-            <a:endParaRPr lang="en-AU" dirty="0"/>
+            <a:endParaRPr lang="en-AU" sz="2000" dirty="0"/>
           </a:p>
           <a:p>
             <a:pPr algn="ctr"/>
@@ -7646,7 +8132,7 @@
                 <a:latin typeface="Lucida Sans" panose="020B0602030504020204" pitchFamily="34" charset="0"/>
                 <a:cs typeface="Arial" panose="020B0604020202020204" pitchFamily="34" charset="0"/>
               </a:rPr>
-              <a:t> courses</a:t>
+              <a:t> Courses</a:t>
             </a:r>
           </a:p>
           <a:p>
@@ -7717,7 +8203,7 @@
                 <a:latin typeface="Lucida Sans" panose="020B0602030504020204" pitchFamily="34" charset="0"/>
                 <a:cs typeface="Arial" panose="020B0604020202020204" pitchFamily="34" charset="0"/>
               </a:rPr>
-              <a:t> courses</a:t>
+              <a:t> Courses</a:t>
             </a:r>
           </a:p>
           <a:p>
@@ -7769,7 +8255,7 @@
                 <a:latin typeface="Lucida Sans" panose="020B0602030504020204" pitchFamily="34" charset="0"/>
                 <a:cs typeface="Arial" panose="020B0604020202020204" pitchFamily="34" charset="0"/>
               </a:rPr>
-              <a:t>% cd courses</a:t>
+              <a:t>% cd Courses</a:t>
             </a:r>
           </a:p>
           <a:p>
@@ -7846,7 +8332,7 @@
         <p:spPr>
           <a:xfrm>
             <a:off x="1504999" y="1596559"/>
-            <a:ext cx="8701319" cy="2862322"/>
+            <a:ext cx="8701319" cy="3970318"/>
           </a:xfrm>
           <a:prstGeom prst="rect">
             <a:avLst/>
@@ -7889,12 +8375,15 @@
                 <a:latin typeface="Lucida Sans" panose="020B0602030504020204" pitchFamily="34" charset="0"/>
                 <a:cs typeface="Arial" panose="020B0604020202020204" pitchFamily="34" charset="0"/>
               </a:rPr>
-              <a:t>://github.com/adrianopolpo/stat1400.git</a:t>
-            </a:r>
-            <a:endParaRPr lang="en-AU" dirty="0" smtClean="0">
-              <a:latin typeface="Lucida Sans" panose="020B0602030504020204" pitchFamily="34" charset="0"/>
-              <a:cs typeface="Arial" panose="020B0604020202020204" pitchFamily="34" charset="0"/>
-            </a:endParaRPr>
+              <a:t>://</a:t>
+            </a:r>
+            <a:r>
+              <a:rPr lang="en-AU" dirty="0" smtClean="0">
+                <a:latin typeface="Lucida Sans" panose="020B0602030504020204" pitchFamily="34" charset="0"/>
+                <a:cs typeface="Arial" panose="020B0604020202020204" pitchFamily="34" charset="0"/>
+              </a:rPr>
+              <a:t>github.com/chrisbpawsey/Data1001.git</a:t>
+            </a:r>
           </a:p>
           <a:p>
             <a:pPr lvl="1"/>
@@ -7906,7 +8395,7 @@
           <a:p>
             <a:r>
               <a:rPr lang="en-AU" dirty="0" smtClean="0"/>
-              <a:t>Verify the command worked</a:t>
+              <a:t>To verify that the command worked you can inspect the current directory for the new folder.</a:t>
             </a:r>
           </a:p>
           <a:p>
@@ -7974,8 +8463,26 @@
             </a:r>
             <a:r>
               <a:rPr lang="en-AU" dirty="0" smtClean="0"/>
-              <a:t> -- LIST so that is lower case L not capital I </a:t>
-            </a:r>
+              <a:t> -- LIST so that is lower case L </a:t>
+            </a:r>
+            <a:endParaRPr lang="en-AU" dirty="0"/>
+          </a:p>
+          <a:p>
+            <a:pPr lvl="1"/>
+            <a:endParaRPr lang="en-AU" dirty="0" smtClean="0"/>
+          </a:p>
+          <a:p>
+            <a:r>
+              <a:rPr lang="en-AU" dirty="0" smtClean="0"/>
+              <a:t>You should see a directory Data1001.</a:t>
+            </a:r>
+          </a:p>
+          <a:p>
+            <a:endParaRPr lang="en-AU" dirty="0" smtClean="0"/>
+          </a:p>
+          <a:p>
+            <a:pPr lvl="1"/>
+            <a:endParaRPr lang="en-AU" dirty="0" smtClean="0"/>
           </a:p>
           <a:p>
             <a:endParaRPr lang="en-AU" dirty="0" smtClean="0"/>
@@ -8056,7 +8563,7 @@
         <p:spPr>
           <a:xfrm>
             <a:off x="838200" y="1385047"/>
-            <a:ext cx="10378888" cy="3693319"/>
+            <a:ext cx="10378888" cy="4370427"/>
           </a:xfrm>
           <a:prstGeom prst="rect">
             <a:avLst/>
@@ -8074,7 +8581,7 @@
                 <a:latin typeface="Arial" panose="020B0604020202020204" pitchFamily="34" charset="0"/>
                 <a:cs typeface="Arial" panose="020B0604020202020204" pitchFamily="34" charset="0"/>
               </a:rPr>
-              <a:t>Step 3: change director into the course/stat1400 directory</a:t>
+              <a:t>Step 3: Change director into the course/Data1001 directory</a:t>
             </a:r>
           </a:p>
           <a:p>
@@ -8084,7 +8591,7 @@
                 <a:latin typeface="Lucida Sans" panose="020B0602030504020204" pitchFamily="34" charset="0"/>
                 <a:cs typeface="Arial" panose="020B0604020202020204" pitchFamily="34" charset="0"/>
               </a:rPr>
-              <a:t>% cd </a:t>
+              <a:t>% cd Course </a:t>
             </a:r>
           </a:p>
           <a:p>
@@ -8143,6 +8650,19 @@
             </a:r>
           </a:p>
           <a:p>
+            <a:endParaRPr lang="en-AU" dirty="0" smtClean="0">
+              <a:latin typeface="Arial" panose="020B0604020202020204" pitchFamily="34" charset="0"/>
+              <a:cs typeface="Arial" panose="020B0604020202020204" pitchFamily="34" charset="0"/>
+            </a:endParaRPr>
+          </a:p>
+          <a:p>
+            <a:r>
+              <a:rPr lang="en-AU" dirty="0" smtClean="0">
+                <a:latin typeface="Arial" panose="020B0604020202020204" pitchFamily="34" charset="0"/>
+                <a:cs typeface="Arial" panose="020B0604020202020204" pitchFamily="34" charset="0"/>
+              </a:rPr>
+              <a:t>Step 3a: Creating the VM</a:t>
+            </a:r>
             <a:endParaRPr lang="en-AU" dirty="0">
               <a:latin typeface="Arial" panose="020B0604020202020204" pitchFamily="34" charset="0"/>
               <a:cs typeface="Arial" panose="020B0604020202020204" pitchFamily="34" charset="0"/>
@@ -8154,58 +8674,44 @@
                 <a:latin typeface="Arial" panose="020B0604020202020204" pitchFamily="34" charset="0"/>
                 <a:cs typeface="Arial" panose="020B0604020202020204" pitchFamily="34" charset="0"/>
               </a:rPr>
-              <a:t>Launch the VM, you should still be in the </a:t>
+              <a:t>To create the VM, you must be in same directory as </a:t>
+            </a:r>
+            <a:r>
+              <a:rPr lang="en-AU" dirty="0" err="1" smtClean="0">
+                <a:latin typeface="Arial" panose="020B0604020202020204" pitchFamily="34" charset="0"/>
+                <a:cs typeface="Arial" panose="020B0604020202020204" pitchFamily="34" charset="0"/>
+              </a:rPr>
+              <a:t>Vagrantfile</a:t>
+            </a:r>
+            <a:r>
+              <a:rPr lang="en-AU" dirty="0" smtClean="0">
+                <a:latin typeface="Arial" panose="020B0604020202020204" pitchFamily="34" charset="0"/>
+                <a:cs typeface="Arial" panose="020B0604020202020204" pitchFamily="34" charset="0"/>
+              </a:rPr>
+              <a:t> which is the </a:t>
             </a:r>
             <a:r>
               <a:rPr lang="en-AU" b="1" dirty="0" smtClean="0">
                 <a:latin typeface="Arial" panose="020B0604020202020204" pitchFamily="34" charset="0"/>
                 <a:cs typeface="Arial" panose="020B0604020202020204" pitchFamily="34" charset="0"/>
               </a:rPr>
-              <a:t>stat1400 </a:t>
+              <a:t>Data1001 </a:t>
             </a:r>
             <a:r>
               <a:rPr lang="en-AU" dirty="0" smtClean="0">
                 <a:latin typeface="Arial" panose="020B0604020202020204" pitchFamily="34" charset="0"/>
                 <a:cs typeface="Arial" panose="020B0604020202020204" pitchFamily="34" charset="0"/>
               </a:rPr>
-              <a:t>directory and you MUST be in the </a:t>
-            </a:r>
-            <a:r>
-              <a:rPr lang="en-AU" b="1" dirty="0" smtClean="0">
-                <a:latin typeface="Arial" panose="020B0604020202020204" pitchFamily="34" charset="0"/>
-                <a:cs typeface="Arial" panose="020B0604020202020204" pitchFamily="34" charset="0"/>
-              </a:rPr>
-              <a:t>stat1400</a:t>
-            </a:r>
+              <a:t>directory.</a:t>
+            </a:r>
+          </a:p>
+          <a:p>
             <a:r>
               <a:rPr lang="en-AU" dirty="0" smtClean="0">
                 <a:latin typeface="Arial" panose="020B0604020202020204" pitchFamily="34" charset="0"/>
                 <a:cs typeface="Arial" panose="020B0604020202020204" pitchFamily="34" charset="0"/>
               </a:rPr>
-              <a:t> directory as that is where the </a:t>
-            </a:r>
-            <a:r>
-              <a:rPr lang="en-AU" dirty="0" err="1" smtClean="0">
-                <a:latin typeface="Arial" panose="020B0604020202020204" pitchFamily="34" charset="0"/>
-                <a:cs typeface="Arial" panose="020B0604020202020204" pitchFamily="34" charset="0"/>
-              </a:rPr>
-              <a:t>Vagrantfile</a:t>
-            </a:r>
-            <a:r>
-              <a:rPr lang="en-AU" dirty="0" smtClean="0">
-                <a:latin typeface="Arial" panose="020B0604020202020204" pitchFamily="34" charset="0"/>
-                <a:cs typeface="Arial" panose="020B0604020202020204" pitchFamily="34" charset="0"/>
-              </a:rPr>
-              <a:t> is.</a:t>
-            </a:r>
-          </a:p>
-          <a:p>
-            <a:r>
-              <a:rPr lang="en-AU" dirty="0" smtClean="0">
-                <a:latin typeface="Arial" panose="020B0604020202020204" pitchFamily="34" charset="0"/>
-                <a:cs typeface="Arial" panose="020B0604020202020204" pitchFamily="34" charset="0"/>
-              </a:rPr>
-              <a:t>To start the VM the Vagrant command is </a:t>
+              <a:t>To create the VM the Vagrant command is </a:t>
             </a:r>
             <a:endParaRPr lang="en-AU" dirty="0">
               <a:latin typeface="Arial" panose="020B0604020202020204" pitchFamily="34" charset="0"/>
@@ -8223,20 +8729,27 @@
             </a:r>
           </a:p>
           <a:p>
-            <a:r>
-              <a:rPr lang="en-AU" dirty="0" smtClean="0">
+            <a:pPr lvl="2"/>
+            <a:endParaRPr lang="en-AU" dirty="0" smtClean="0">
+              <a:latin typeface="Lucida Sans" panose="020B0602030504020204" pitchFamily="34" charset="0"/>
+              <a:cs typeface="Arial" panose="020B0604020202020204" pitchFamily="34" charset="0"/>
+            </a:endParaRPr>
+          </a:p>
+          <a:p>
+            <a:r>
+              <a:rPr lang="en-AU" sz="2000" dirty="0" smtClean="0">
                 <a:solidFill>
                   <a:srgbClr val="FF0000"/>
                 </a:solidFill>
                 <a:latin typeface="Arial" panose="020B0604020202020204" pitchFamily="34" charset="0"/>
                 <a:cs typeface="Arial" panose="020B0604020202020204" pitchFamily="34" charset="0"/>
               </a:rPr>
-              <a:t>Coffee Break:</a:t>
-            </a:r>
-          </a:p>
-          <a:p>
-            <a:r>
-              <a:rPr lang="en-AU" dirty="0" smtClean="0">
+              <a:t>Coffee/Tea Break:</a:t>
+            </a:r>
+          </a:p>
+          <a:p>
+            <a:r>
+              <a:rPr lang="en-AU" sz="2000" dirty="0" smtClean="0">
                 <a:solidFill>
                   <a:srgbClr val="FF0000"/>
                 </a:solidFill>
@@ -8246,7 +8759,7 @@
               <a:t>This </a:t>
             </a:r>
             <a:r>
-              <a:rPr lang="en-AU" b="1" dirty="0" smtClean="0">
+              <a:rPr lang="en-AU" sz="2000" b="1" dirty="0" smtClean="0">
                 <a:solidFill>
                   <a:srgbClr val="FF0000"/>
                 </a:solidFill>
@@ -8256,7 +8769,7 @@
               <a:t>will take some time</a:t>
             </a:r>
             <a:r>
-              <a:rPr lang="en-AU" dirty="0" smtClean="0">
+              <a:rPr lang="en-AU" sz="2000" dirty="0" smtClean="0">
                 <a:solidFill>
                   <a:srgbClr val="FF0000"/>
                 </a:solidFill>
@@ -8266,7 +8779,7 @@
               <a:t> as it automatically downloading and configuring the base Ubuntu OS image that is used for your VM</a:t>
             </a:r>
             <a:r>
-              <a:rPr lang="en-AU" dirty="0" smtClean="0">
+              <a:rPr lang="en-AU" sz="2000" dirty="0" smtClean="0">
                 <a:solidFill>
                   <a:srgbClr val="FF0000"/>
                 </a:solidFill>
@@ -8277,36 +8790,6 @@
           </a:p>
         </p:txBody>
       </p:sp>
-      <p:pic>
-        <p:nvPicPr>
-          <p:cNvPr id="5" name="Picture 4"/>
-          <p:cNvPicPr>
-            <a:picLocks noChangeAspect="1"/>
-          </p:cNvPicPr>
-          <p:nvPr/>
-        </p:nvPicPr>
-        <p:blipFill>
-          <a:blip r:embed="rId2">
-            <a:extLst>
-              <a:ext uri="{28A0092B-C50C-407E-A947-70E740481C1C}">
-                <a14:useLocalDpi xmlns:a14="http://schemas.microsoft.com/office/drawing/2010/main" val="0"/>
-              </a:ext>
-            </a:extLst>
-          </a:blip>
-          <a:stretch>
-            <a:fillRect/>
-          </a:stretch>
-        </p:blipFill>
-        <p:spPr>
-          <a:xfrm>
-            <a:off x="1204809" y="5217459"/>
-            <a:ext cx="9508958" cy="1147460"/>
-          </a:xfrm>
-          <a:prstGeom prst="rect">
-            <a:avLst/>
-          </a:prstGeom>
-        </p:spPr>
-      </p:pic>
     </p:spTree>
     <p:extLst>
       <p:ext uri="{BB962C8B-B14F-4D97-AF65-F5344CB8AC3E}">
@@ -8354,16 +8837,19 @@
             <p:ph type="title"/>
           </p:nvPr>
         </p:nvSpPr>
-        <p:spPr/>
-        <p:txBody>
-          <a:bodyPr>
-            <a:normAutofit/>
-          </a:bodyPr>
+        <p:spPr>
+          <a:xfrm>
+            <a:off x="777062" y="375493"/>
+            <a:ext cx="10364451" cy="1206165"/>
+          </a:xfrm>
+        </p:spPr>
+        <p:txBody>
+          <a:bodyPr/>
           <a:lstStyle/>
           <a:p>
             <a:r>
               <a:rPr lang="en-AU" dirty="0" smtClean="0"/>
-              <a:t>Install the  environment in the VM</a:t>
+              <a:t>VM success</a:t>
             </a:r>
             <a:endParaRPr lang="en-AU" dirty="0"/>
           </a:p>
@@ -8371,14 +8857,14 @@
       </p:sp>
       <p:sp>
         <p:nvSpPr>
-          <p:cNvPr id="4" name="TextBox 3"/>
+          <p:cNvPr id="3" name="TextBox 2"/>
           <p:cNvSpPr txBox="1"/>
           <p:nvPr/>
         </p:nvSpPr>
         <p:spPr>
           <a:xfrm>
-            <a:off x="1382805" y="2337019"/>
-            <a:ext cx="9426389" cy="1477328"/>
+            <a:off x="762625" y="1581658"/>
+            <a:ext cx="10378888" cy="2554545"/>
           </a:xfrm>
           <a:prstGeom prst="rect">
             <a:avLst/>
@@ -8392,188 +8878,140 @@
           <a:lstStyle/>
           <a:p>
             <a:r>
-              <a:rPr lang="en-AU" dirty="0" smtClean="0">
-                <a:latin typeface="Arial" panose="020B0604020202020204" pitchFamily="34" charset="0"/>
-                <a:cs typeface="Arial" panose="020B0604020202020204" pitchFamily="34" charset="0"/>
-              </a:rPr>
-              <a:t>Step 4a: Start your </a:t>
-            </a:r>
-            <a:r>
-              <a:rPr lang="en-AU" dirty="0" err="1" smtClean="0">
-                <a:latin typeface="Arial" panose="020B0604020202020204" pitchFamily="34" charset="0"/>
-                <a:cs typeface="Arial" panose="020B0604020202020204" pitchFamily="34" charset="0"/>
-              </a:rPr>
-              <a:t>jupyter</a:t>
-            </a:r>
-            <a:r>
-              <a:rPr lang="en-AU" dirty="0" smtClean="0">
-                <a:latin typeface="Arial" panose="020B0604020202020204" pitchFamily="34" charset="0"/>
-                <a:cs typeface="Arial" panose="020B0604020202020204" pitchFamily="34" charset="0"/>
-              </a:rPr>
-              <a:t> notebook</a:t>
-            </a:r>
-          </a:p>
-          <a:p>
-            <a:r>
-              <a:rPr lang="en-AU" dirty="0" smtClean="0">
-                <a:latin typeface="Arial" panose="020B0604020202020204" pitchFamily="34" charset="0"/>
-                <a:cs typeface="Arial" panose="020B0604020202020204" pitchFamily="34" charset="0"/>
-              </a:rPr>
-              <a:t> </a:t>
-            </a:r>
-            <a:r>
-              <a:rPr lang="en-AU" dirty="0" smtClean="0">
+              <a:rPr lang="en-AU" sz="2000" dirty="0" smtClean="0">
+                <a:solidFill>
+                  <a:srgbClr val="FF0000"/>
+                </a:solidFill>
+                <a:latin typeface="Arial" panose="020B0604020202020204" pitchFamily="34" charset="0"/>
+                <a:cs typeface="Arial" panose="020B0604020202020204" pitchFamily="34" charset="0"/>
+              </a:rPr>
+              <a:t>Coffee/Tea Break:</a:t>
+            </a:r>
+          </a:p>
+          <a:p>
+            <a:r>
+              <a:rPr lang="en-AU" sz="2000" dirty="0" smtClean="0">
+                <a:solidFill>
+                  <a:srgbClr val="FF0000"/>
+                </a:solidFill>
+                <a:latin typeface="Arial" panose="020B0604020202020204" pitchFamily="34" charset="0"/>
+                <a:cs typeface="Arial" panose="020B0604020202020204" pitchFamily="34" charset="0"/>
+              </a:rPr>
+              <a:t>This </a:t>
+            </a:r>
+            <a:r>
+              <a:rPr lang="en-AU" sz="2000" b="1" dirty="0" smtClean="0">
+                <a:solidFill>
+                  <a:srgbClr val="FF0000"/>
+                </a:solidFill>
+                <a:latin typeface="Arial" panose="020B0604020202020204" pitchFamily="34" charset="0"/>
+                <a:cs typeface="Arial" panose="020B0604020202020204" pitchFamily="34" charset="0"/>
+              </a:rPr>
+              <a:t>will take some time (UP to 60 MINUTES!)</a:t>
+            </a:r>
+            <a:r>
+              <a:rPr lang="en-AU" sz="2000" dirty="0" smtClean="0">
+                <a:solidFill>
+                  <a:srgbClr val="FF0000"/>
+                </a:solidFill>
+                <a:latin typeface="Arial" panose="020B0604020202020204" pitchFamily="34" charset="0"/>
+                <a:cs typeface="Arial" panose="020B0604020202020204" pitchFamily="34" charset="0"/>
+              </a:rPr>
+              <a:t> as it automatically downloading and configuring the base Ubuntu OS image that is used for your VM</a:t>
+            </a:r>
+            <a:r>
+              <a:rPr lang="en-AU" sz="2000" dirty="0" smtClean="0">
+                <a:solidFill>
+                  <a:srgbClr val="FF0000"/>
+                </a:solidFill>
                 <a:latin typeface="Lucida Sans" panose="020B0602030504020204" pitchFamily="34" charset="0"/>
               </a:rPr>
-              <a:t>% </a:t>
-            </a:r>
-            <a:r>
-              <a:rPr lang="en-AU" dirty="0" err="1">
-                <a:latin typeface="Lucida Sans" panose="020B0602030504020204" pitchFamily="34" charset="0"/>
-              </a:rPr>
-              <a:t>jupyter</a:t>
-            </a:r>
-            <a:r>
-              <a:rPr lang="en-AU" dirty="0">
-                <a:latin typeface="Lucida Sans" panose="020B0602030504020204" pitchFamily="34" charset="0"/>
-              </a:rPr>
-              <a:t> notebook --</a:t>
-            </a:r>
-            <a:r>
-              <a:rPr lang="en-AU" dirty="0" err="1">
-                <a:latin typeface="Lucida Sans" panose="020B0602030504020204" pitchFamily="34" charset="0"/>
-              </a:rPr>
-              <a:t>ip</a:t>
-            </a:r>
-            <a:r>
-              <a:rPr lang="en-AU" dirty="0">
-                <a:latin typeface="Lucida Sans" panose="020B0602030504020204" pitchFamily="34" charset="0"/>
-              </a:rPr>
-              <a:t>=0.0.0.0 --no-browser</a:t>
-            </a:r>
-            <a:endParaRPr lang="en-AU" dirty="0" smtClean="0">
+              <a:t>.  It is dependent on your internet connection and laptop.</a:t>
+            </a:r>
+          </a:p>
+          <a:p>
+            <a:endParaRPr lang="en-AU" sz="2000" dirty="0" smtClean="0">
+              <a:solidFill>
+                <a:srgbClr val="FF0000"/>
+              </a:solidFill>
               <a:latin typeface="Lucida Sans" panose="020B0602030504020204" pitchFamily="34" charset="0"/>
             </a:endParaRPr>
           </a:p>
           <a:p>
-            <a:endParaRPr lang="en-AU" dirty="0">
-              <a:latin typeface="Arial" panose="020B0604020202020204" pitchFamily="34" charset="0"/>
-              <a:cs typeface="Arial" panose="020B0604020202020204" pitchFamily="34" charset="0"/>
+            <a:r>
+              <a:rPr lang="en-AU" sz="2000" dirty="0" smtClean="0">
+                <a:latin typeface="Lucida Sans" panose="020B0602030504020204" pitchFamily="34" charset="0"/>
+              </a:rPr>
+              <a:t>When Vagrant up command finishes you should see the follow message!</a:t>
+            </a:r>
+          </a:p>
+          <a:p>
+            <a:r>
+              <a:rPr lang="en-AU" sz="2000" dirty="0" smtClean="0">
+                <a:latin typeface="Lucida Sans" panose="020B0602030504020204" pitchFamily="34" charset="0"/>
+              </a:rPr>
+              <a:t>You are now ready to login to your VM and start your </a:t>
+            </a:r>
+            <a:r>
+              <a:rPr lang="en-AU" sz="2000" dirty="0" err="1" smtClean="0">
+                <a:latin typeface="Lucida Sans" panose="020B0602030504020204" pitchFamily="34" charset="0"/>
+              </a:rPr>
+              <a:t>jupyter</a:t>
+            </a:r>
+            <a:r>
+              <a:rPr lang="en-AU" sz="2000" dirty="0" smtClean="0">
+                <a:latin typeface="Lucida Sans" panose="020B0602030504020204" pitchFamily="34" charset="0"/>
+              </a:rPr>
+              <a:t> notebook!</a:t>
+            </a:r>
+            <a:endParaRPr lang="en-AU" sz="2000" dirty="0">
+              <a:latin typeface="Lucida Sans" panose="020B0602030504020204" pitchFamily="34" charset="0"/>
             </a:endParaRPr>
           </a:p>
           <a:p>
-            <a:r>
-              <a:rPr lang="en-AU" dirty="0" smtClean="0">
-                <a:latin typeface="Arial" panose="020B0604020202020204" pitchFamily="34" charset="0"/>
-                <a:cs typeface="Arial" panose="020B0604020202020204" pitchFamily="34" charset="0"/>
-              </a:rPr>
-              <a:t>Step 4b: </a:t>
-            </a:r>
-            <a:r>
-              <a:rPr lang="en-AU" dirty="0" smtClean="0">
-                <a:latin typeface="Lucida Sans" panose="020B0602030504020204" pitchFamily="34" charset="0"/>
-                <a:cs typeface="Arial" panose="020B0604020202020204" pitchFamily="34" charset="0"/>
-              </a:rPr>
-              <a:t>Open your favourite browser to the 127.0.0.1 add that is returned by the </a:t>
-            </a:r>
-            <a:r>
-              <a:rPr lang="en-AU" dirty="0" err="1" smtClean="0">
-                <a:latin typeface="Lucida Sans" panose="020B0602030504020204" pitchFamily="34" charset="0"/>
-                <a:cs typeface="Arial" panose="020B0604020202020204" pitchFamily="34" charset="0"/>
-              </a:rPr>
-              <a:t>jupyter</a:t>
-            </a:r>
-            <a:r>
-              <a:rPr lang="en-AU" dirty="0" smtClean="0">
-                <a:latin typeface="Lucida Sans" panose="020B0602030504020204" pitchFamily="34" charset="0"/>
-                <a:cs typeface="Arial" panose="020B0604020202020204" pitchFamily="34" charset="0"/>
-              </a:rPr>
-              <a:t> command</a:t>
-            </a:r>
-          </a:p>
-        </p:txBody>
-      </p:sp>
-      <p:sp>
-        <p:nvSpPr>
-          <p:cNvPr id="5" name="TextBox 4"/>
-          <p:cNvSpPr txBox="1"/>
+            <a:endParaRPr lang="en-AU" sz="2000" dirty="0" smtClean="0">
+              <a:solidFill>
+                <a:srgbClr val="FF0000"/>
+              </a:solidFill>
+              <a:latin typeface="Lucida Sans" panose="020B0602030504020204" pitchFamily="34" charset="0"/>
+            </a:endParaRPr>
+          </a:p>
+        </p:txBody>
+      </p:sp>
+      <p:pic>
+        <p:nvPicPr>
+          <p:cNvPr id="4" name="Picture 3"/>
+          <p:cNvPicPr>
+            <a:picLocks noChangeAspect="1"/>
+          </p:cNvPicPr>
           <p:nvPr/>
-        </p:nvSpPr>
+        </p:nvPicPr>
+        <p:blipFill>
+          <a:blip r:embed="rId2">
+            <a:extLst>
+              <a:ext uri="{28A0092B-C50C-407E-A947-70E740481C1C}">
+                <a14:useLocalDpi xmlns:a14="http://schemas.microsoft.com/office/drawing/2010/main" val="0"/>
+              </a:ext>
+            </a:extLst>
+          </a:blip>
+          <a:stretch>
+            <a:fillRect/>
+          </a:stretch>
+        </p:blipFill>
         <p:spPr>
           <a:xfrm>
-            <a:off x="1382805" y="1690688"/>
-            <a:ext cx="8661345" cy="646331"/>
+            <a:off x="2256817" y="4281544"/>
+            <a:ext cx="7390504" cy="1549373"/>
           </a:xfrm>
           <a:prstGeom prst="rect">
             <a:avLst/>
           </a:prstGeom>
-          <a:noFill/>
-        </p:spPr>
-        <p:txBody>
-          <a:bodyPr wrap="none" rtlCol="0">
-            <a:spAutoFit/>
-          </a:bodyPr>
-          <a:lstStyle/>
-          <a:p>
-            <a:r>
-              <a:rPr lang="en-AU" dirty="0" smtClean="0">
-                <a:latin typeface="Arial" panose="020B0604020202020204" pitchFamily="34" charset="0"/>
-                <a:cs typeface="Arial" panose="020B0604020202020204" pitchFamily="34" charset="0"/>
-              </a:rPr>
-              <a:t>Step 4: Log in to the VM using </a:t>
-            </a:r>
-            <a:r>
-              <a:rPr lang="en-AU" dirty="0" err="1" smtClean="0">
-                <a:latin typeface="Arial" panose="020B0604020202020204" pitchFamily="34" charset="0"/>
-                <a:cs typeface="Arial" panose="020B0604020202020204" pitchFamily="34" charset="0"/>
-              </a:rPr>
-              <a:t>ssh</a:t>
-            </a:r>
-            <a:r>
-              <a:rPr lang="en-AU" dirty="0" smtClean="0">
-                <a:latin typeface="Arial" panose="020B0604020202020204" pitchFamily="34" charset="0"/>
-                <a:cs typeface="Arial" panose="020B0604020202020204" pitchFamily="34" charset="0"/>
-              </a:rPr>
-              <a:t> once it finished the command prompt will return </a:t>
-            </a:r>
-          </a:p>
-          <a:p>
-            <a:pPr lvl="1"/>
-            <a:r>
-              <a:rPr lang="en-AU" dirty="0">
-                <a:latin typeface="Arial" panose="020B0604020202020204" pitchFamily="34" charset="0"/>
-                <a:cs typeface="Arial" panose="020B0604020202020204" pitchFamily="34" charset="0"/>
-              </a:rPr>
-              <a:t> </a:t>
-            </a:r>
-            <a:r>
-              <a:rPr lang="en-AU" dirty="0" smtClean="0">
-                <a:latin typeface="Lucida Sans" panose="020B0602030504020204" pitchFamily="34" charset="0"/>
-                <a:cs typeface="Arial" panose="020B0604020202020204" pitchFamily="34" charset="0"/>
-              </a:rPr>
-              <a:t>% vagrant </a:t>
-            </a:r>
-            <a:r>
-              <a:rPr lang="en-AU" dirty="0" err="1" smtClean="0">
-                <a:latin typeface="Lucida Sans" panose="020B0602030504020204" pitchFamily="34" charset="0"/>
-                <a:cs typeface="Arial" panose="020B0604020202020204" pitchFamily="34" charset="0"/>
-              </a:rPr>
-              <a:t>ssh</a:t>
-            </a:r>
-            <a:r>
-              <a:rPr lang="en-AU" dirty="0" smtClean="0">
-                <a:latin typeface="Lucida Sans" panose="020B0602030504020204" pitchFamily="34" charset="0"/>
-                <a:cs typeface="Arial" panose="020B0604020202020204" pitchFamily="34" charset="0"/>
-              </a:rPr>
-              <a:t> </a:t>
-            </a:r>
-          </a:p>
-        </p:txBody>
-      </p:sp>
+        </p:spPr>
+      </p:pic>
     </p:spTree>
     <p:extLst>
       <p:ext uri="{BB962C8B-B14F-4D97-AF65-F5344CB8AC3E}">
-        <p14:creationId xmlns:p14="http://schemas.microsoft.com/office/powerpoint/2010/main" val="14571371"/>
+        <p14:creationId xmlns:p14="http://schemas.microsoft.com/office/powerpoint/2010/main" val="2595889104"/>
       </p:ext>
     </p:extLst>
   </p:cSld>
@@ -8617,38 +9055,31 @@
             <p:ph type="title"/>
           </p:nvPr>
         </p:nvSpPr>
-        <p:spPr>
-          <a:xfrm>
-            <a:off x="989972" y="282341"/>
-            <a:ext cx="10364451" cy="1210283"/>
-          </a:xfrm>
-        </p:spPr>
-        <p:txBody>
-          <a:bodyPr/>
+        <p:spPr/>
+        <p:txBody>
+          <a:bodyPr>
+            <a:normAutofit/>
+          </a:bodyPr>
           <a:lstStyle/>
           <a:p>
             <a:r>
-              <a:rPr lang="en-AU" b="1" dirty="0" smtClean="0">
-                <a:latin typeface="Lucida Sans Typewriter" panose="020B0509030504030204" pitchFamily="49" charset="0"/>
-              </a:rPr>
-              <a:t>Summary of commands	</a:t>
-            </a:r>
-            <a:endParaRPr lang="en-AU" b="1" dirty="0">
-              <a:latin typeface="Lucida Sans Typewriter" panose="020B0509030504030204" pitchFamily="49" charset="0"/>
-            </a:endParaRPr>
-          </a:p>
-        </p:txBody>
-      </p:sp>
-      <p:sp>
-        <p:nvSpPr>
-          <p:cNvPr id="3" name="TextBox 2"/>
+              <a:rPr lang="en-AU" dirty="0" smtClean="0"/>
+              <a:t>Accessing your VM</a:t>
+            </a:r>
+            <a:endParaRPr lang="en-AU" dirty="0"/>
+          </a:p>
+        </p:txBody>
+      </p:sp>
+      <p:sp>
+        <p:nvSpPr>
+          <p:cNvPr id="5" name="TextBox 4"/>
           <p:cNvSpPr txBox="1"/>
           <p:nvPr/>
         </p:nvSpPr>
         <p:spPr>
           <a:xfrm>
-            <a:off x="1559856" y="1690688"/>
-            <a:ext cx="9224685" cy="3970318"/>
+            <a:off x="1337805" y="1709350"/>
+            <a:ext cx="9516388" cy="923330"/>
           </a:xfrm>
           <a:prstGeom prst="rect">
             <a:avLst/>
@@ -8656,7 +9087,7 @@
           <a:noFill/>
         </p:spPr>
         <p:txBody>
-          <a:bodyPr wrap="square" rtlCol="0">
+          <a:bodyPr wrap="none" rtlCol="0">
             <a:spAutoFit/>
           </a:bodyPr>
           <a:lstStyle/>
@@ -8666,292 +9097,89 @@
                 <a:latin typeface="Arial" panose="020B0604020202020204" pitchFamily="34" charset="0"/>
                 <a:cs typeface="Arial" panose="020B0604020202020204" pitchFamily="34" charset="0"/>
               </a:rPr>
-              <a:t>Step 1  - Create the project directory</a:t>
-            </a:r>
-          </a:p>
-          <a:p>
-            <a:pPr marL="742950" lvl="1" indent="-285750">
-              <a:buFont typeface="Wingdings" panose="05000000000000000000" pitchFamily="2" charset="2"/>
-              <a:buChar char="Ø"/>
-            </a:pPr>
-            <a:r>
-              <a:rPr lang="en-AU" dirty="0" err="1" smtClean="0">
-                <a:latin typeface="Lucida Sans Typewriter" panose="020B0509030504030204" pitchFamily="49" charset="0"/>
-                <a:cs typeface="Arial" panose="020B0604020202020204" pitchFamily="34" charset="0"/>
-              </a:rPr>
-              <a:t>mkdir</a:t>
-            </a:r>
+              <a:t>Step 4: Secure Shell (SSH) is used to login to your VM.  This process of accessing you VM </a:t>
+            </a:r>
+          </a:p>
+          <a:p>
             <a:r>
               <a:rPr lang="en-AU" dirty="0" smtClean="0">
-                <a:latin typeface="Lucida Sans Typewriter" panose="020B0509030504030204" pitchFamily="49" charset="0"/>
-                <a:cs typeface="Arial" panose="020B0604020202020204" pitchFamily="34" charset="0"/>
-              </a:rPr>
-              <a:t> courses</a:t>
-            </a:r>
-          </a:p>
-          <a:p>
-            <a:pPr marL="742950" lvl="1" indent="-285750">
-              <a:buFont typeface="Wingdings" panose="05000000000000000000" pitchFamily="2" charset="2"/>
-              <a:buChar char="Ø"/>
-            </a:pPr>
-            <a:r>
-              <a:rPr lang="en-AU" dirty="0" smtClean="0">
-                <a:latin typeface="Lucida Sans Typewriter" panose="020B0509030504030204" pitchFamily="49" charset="0"/>
-                <a:cs typeface="Arial" panose="020B0604020202020204" pitchFamily="34" charset="0"/>
-              </a:rPr>
-              <a:t>cd courses</a:t>
-            </a:r>
-          </a:p>
-          <a:p>
-            <a:r>
-              <a:rPr lang="en-AU" dirty="0" smtClean="0">
-                <a:latin typeface="Arial" panose="020B0604020202020204" pitchFamily="34" charset="0"/>
-                <a:cs typeface="Arial" panose="020B0604020202020204" pitchFamily="34" charset="0"/>
-              </a:rPr>
-              <a:t>Step 2  - Clone the repository with </a:t>
-            </a:r>
-            <a:r>
-              <a:rPr lang="en-AU" dirty="0" err="1" smtClean="0">
-                <a:latin typeface="Arial" panose="020B0604020202020204" pitchFamily="34" charset="0"/>
-                <a:cs typeface="Arial" panose="020B0604020202020204" pitchFamily="34" charset="0"/>
-              </a:rPr>
-              <a:t>Vagrantfile</a:t>
-            </a:r>
-            <a:endParaRPr lang="en-AU" dirty="0" smtClean="0">
+                <a:latin typeface="Arial" panose="020B0604020202020204" pitchFamily="34" charset="0"/>
+                <a:cs typeface="Arial" panose="020B0604020202020204" pitchFamily="34" charset="0"/>
+              </a:rPr>
+              <a:t>has been greatly simplified with Vagrant.  The command is:</a:t>
+            </a:r>
+            <a:endParaRPr lang="en-AU" dirty="0">
               <a:latin typeface="Arial" panose="020B0604020202020204" pitchFamily="34" charset="0"/>
               <a:cs typeface="Arial" panose="020B0604020202020204" pitchFamily="34" charset="0"/>
             </a:endParaRPr>
           </a:p>
           <a:p>
-            <a:pPr marL="742950" lvl="1" indent="-285750">
-              <a:buFont typeface="Wingdings" panose="05000000000000000000" pitchFamily="2" charset="2"/>
-              <a:buChar char="Ø"/>
-            </a:pPr>
+            <a:pPr lvl="1"/>
+            <a:r>
+              <a:rPr lang="en-AU" dirty="0">
+                <a:latin typeface="Lucida Sans" panose="020B0602030504020204" pitchFamily="34" charset="0"/>
+                <a:cs typeface="Arial" panose="020B0604020202020204" pitchFamily="34" charset="0"/>
+              </a:rPr>
+              <a:t>&gt;</a:t>
+            </a:r>
             <a:r>
               <a:rPr lang="en-AU" dirty="0" smtClean="0">
-                <a:latin typeface="Lucida Sans Typewriter" panose="020B0509030504030204" pitchFamily="49" charset="0"/>
-                <a:cs typeface="Arial" panose="020B0604020202020204" pitchFamily="34" charset="0"/>
-              </a:rPr>
-              <a:t>git clone </a:t>
+                <a:latin typeface="Lucida Sans" panose="020B0602030504020204" pitchFamily="34" charset="0"/>
+                <a:cs typeface="Arial" panose="020B0604020202020204" pitchFamily="34" charset="0"/>
+              </a:rPr>
+              <a:t> vagrant </a:t>
+            </a:r>
+            <a:r>
+              <a:rPr lang="en-AU" dirty="0" err="1" smtClean="0">
+                <a:latin typeface="Lucida Sans" panose="020B0602030504020204" pitchFamily="34" charset="0"/>
+                <a:cs typeface="Arial" panose="020B0604020202020204" pitchFamily="34" charset="0"/>
+              </a:rPr>
+              <a:t>ssh</a:t>
             </a:r>
             <a:r>
               <a:rPr lang="en-AU" dirty="0" smtClean="0">
-                <a:latin typeface="Lucida Sans Typewriter" panose="020B0509030504030204" pitchFamily="49" charset="0"/>
-                <a:cs typeface="Arial" panose="020B0604020202020204" pitchFamily="34" charset="0"/>
-                <a:hlinkClick r:id="rId2"/>
-              </a:rPr>
-              <a:t>https</a:t>
-            </a:r>
-            <a:r>
-              <a:rPr lang="en-AU" dirty="0">
-                <a:latin typeface="Lucida Sans Typewriter" panose="020B0509030504030204" pitchFamily="49" charset="0"/>
-                <a:cs typeface="Arial" panose="020B0604020202020204" pitchFamily="34" charset="0"/>
-                <a:hlinkClick r:id="rId2"/>
-              </a:rPr>
-              <a:t>://</a:t>
-            </a:r>
-            <a:r>
-              <a:rPr lang="en-AU" dirty="0" smtClean="0">
-                <a:latin typeface="Lucida Sans Typewriter" panose="020B0509030504030204" pitchFamily="49" charset="0"/>
-                <a:cs typeface="Arial" panose="020B0604020202020204" pitchFamily="34" charset="0"/>
-                <a:hlinkClick r:id="rId2"/>
-              </a:rPr>
-              <a:t>github.com/adrianopolpo/stat1400.git</a:t>
-            </a:r>
-            <a:endParaRPr lang="en-AU" dirty="0" smtClean="0">
-              <a:latin typeface="Lucida Sans Typewriter" panose="020B0509030504030204" pitchFamily="49" charset="0"/>
-              <a:cs typeface="Arial" panose="020B0604020202020204" pitchFamily="34" charset="0"/>
-            </a:endParaRPr>
-          </a:p>
-          <a:p>
-            <a:r>
-              <a:rPr lang="en-AU" dirty="0" smtClean="0">
-                <a:latin typeface="Arial" panose="020B0604020202020204" pitchFamily="34" charset="0"/>
-                <a:cs typeface="Arial" panose="020B0604020202020204" pitchFamily="34" charset="0"/>
-              </a:rPr>
-              <a:t>Step 3  - launch the Virtual machine</a:t>
-            </a:r>
-          </a:p>
-          <a:p>
-            <a:pPr marL="742950" lvl="1" indent="-285750">
-              <a:buFont typeface="Wingdings" panose="05000000000000000000" pitchFamily="2" charset="2"/>
-              <a:buChar char="Ø"/>
-            </a:pPr>
-            <a:r>
-              <a:rPr lang="en-AU" dirty="0" smtClean="0">
-                <a:latin typeface="Lucida Sans Typewriter" panose="020B0509030504030204" pitchFamily="49" charset="0"/>
-                <a:cs typeface="Arial" panose="020B0604020202020204" pitchFamily="34" charset="0"/>
-              </a:rPr>
-              <a:t>cd stat1400	</a:t>
-            </a:r>
-          </a:p>
-          <a:p>
-            <a:pPr marL="742950" lvl="1" indent="-285750">
-              <a:buFont typeface="Wingdings" panose="05000000000000000000" pitchFamily="2" charset="2"/>
-              <a:buChar char="Ø"/>
-            </a:pPr>
-            <a:r>
-              <a:rPr lang="en-AU" dirty="0" smtClean="0">
-                <a:latin typeface="Lucida Sans Typewriter" panose="020B0509030504030204" pitchFamily="49" charset="0"/>
-                <a:cs typeface="Arial" panose="020B0604020202020204" pitchFamily="34" charset="0"/>
-              </a:rPr>
-              <a:t>vagrant up</a:t>
-            </a:r>
-          </a:p>
-          <a:p>
-            <a:r>
-              <a:rPr lang="en-AU" dirty="0" smtClean="0">
-                <a:latin typeface="Arial" panose="020B0604020202020204" pitchFamily="34" charset="0"/>
-                <a:cs typeface="Arial" panose="020B0604020202020204" pitchFamily="34" charset="0"/>
-              </a:rPr>
-              <a:t>Step 4  - login to the virtual machine </a:t>
-            </a:r>
-          </a:p>
-          <a:p>
-            <a:pPr marL="742950" lvl="1" indent="-285750">
-              <a:buFont typeface="Wingdings" panose="05000000000000000000" pitchFamily="2" charset="2"/>
-              <a:buChar char="Ø"/>
-            </a:pPr>
-            <a:r>
-              <a:rPr lang="en-AU" dirty="0" smtClean="0">
-                <a:latin typeface="Lucida Sans Typewriter" panose="020B0509030504030204" pitchFamily="49" charset="0"/>
-                <a:cs typeface="Arial" panose="020B0604020202020204" pitchFamily="34" charset="0"/>
-              </a:rPr>
-              <a:t>vagrant </a:t>
-            </a:r>
-            <a:r>
-              <a:rPr lang="en-AU" dirty="0" err="1" smtClean="0">
-                <a:latin typeface="Lucida Sans Typewriter" panose="020B0509030504030204" pitchFamily="49" charset="0"/>
-                <a:cs typeface="Arial" panose="020B0604020202020204" pitchFamily="34" charset="0"/>
-              </a:rPr>
-              <a:t>ssh</a:t>
-            </a:r>
-            <a:endParaRPr lang="en-AU" dirty="0" smtClean="0">
-              <a:latin typeface="Lucida Sans Typewriter" panose="020B0509030504030204" pitchFamily="49" charset="0"/>
-              <a:cs typeface="Arial" panose="020B0604020202020204" pitchFamily="34" charset="0"/>
-            </a:endParaRPr>
-          </a:p>
-          <a:p>
-            <a:r>
-              <a:rPr lang="en-AU" dirty="0" smtClean="0">
-                <a:latin typeface="Arial" panose="020B0604020202020204" pitchFamily="34" charset="0"/>
-                <a:cs typeface="Arial" panose="020B0604020202020204" pitchFamily="34" charset="0"/>
-              </a:rPr>
-              <a:t>Step 4a  - start your </a:t>
-            </a:r>
-            <a:r>
-              <a:rPr lang="en-AU" dirty="0" err="1" smtClean="0">
-                <a:latin typeface="Arial" panose="020B0604020202020204" pitchFamily="34" charset="0"/>
-                <a:cs typeface="Arial" panose="020B0604020202020204" pitchFamily="34" charset="0"/>
-              </a:rPr>
-              <a:t>jupyter</a:t>
-            </a:r>
-            <a:r>
-              <a:rPr lang="en-AU" dirty="0" smtClean="0">
-                <a:latin typeface="Arial" panose="020B0604020202020204" pitchFamily="34" charset="0"/>
-                <a:cs typeface="Arial" panose="020B0604020202020204" pitchFamily="34" charset="0"/>
-              </a:rPr>
-              <a:t> notebook</a:t>
-            </a:r>
-          </a:p>
-          <a:p>
-            <a:pPr marL="742950" lvl="1" indent="-285750">
-              <a:buFont typeface="Wingdings" panose="05000000000000000000" pitchFamily="2" charset="2"/>
-              <a:buChar char="Ø"/>
-            </a:pPr>
-            <a:r>
-              <a:rPr lang="en-AU" dirty="0" smtClean="0">
-                <a:latin typeface="Lucida Sans Typewriter" panose="020B0509030504030204" pitchFamily="49" charset="0"/>
+                <a:latin typeface="Lucida Sans" panose="020B0602030504020204" pitchFamily="34" charset="0"/>
                 <a:cs typeface="Arial" panose="020B0604020202020204" pitchFamily="34" charset="0"/>
               </a:rPr>
               <a:t> </a:t>
             </a:r>
-            <a:r>
-              <a:rPr lang="en-AU" dirty="0" err="1" smtClean="0">
-                <a:latin typeface="Lucida Sans Typewriter" panose="020B0509030504030204" pitchFamily="49" charset="0"/>
-                <a:cs typeface="Arial" panose="020B0604020202020204" pitchFamily="34" charset="0"/>
-              </a:rPr>
-              <a:t>jupyter</a:t>
-            </a:r>
-            <a:r>
-              <a:rPr lang="en-AU" dirty="0" smtClean="0">
-                <a:latin typeface="Lucida Sans Typewriter" panose="020B0509030504030204" pitchFamily="49" charset="0"/>
-                <a:cs typeface="Arial" panose="020B0604020202020204" pitchFamily="34" charset="0"/>
-              </a:rPr>
-              <a:t> notebook </a:t>
-            </a:r>
-            <a:r>
-              <a:rPr lang="en-AU" dirty="0" smtClean="0">
-                <a:latin typeface="Lucida Sans Typewriter" panose="020B0509030504030204" pitchFamily="49" charset="0"/>
-                <a:cs typeface="Arial" panose="020B0604020202020204" pitchFamily="34" charset="0"/>
-              </a:rPr>
-              <a:t>–-</a:t>
-            </a:r>
-            <a:r>
-              <a:rPr lang="en-AU" dirty="0" err="1" smtClean="0">
-                <a:latin typeface="Lucida Sans Typewriter" panose="020B0509030504030204" pitchFamily="49" charset="0"/>
-                <a:cs typeface="Arial" panose="020B0604020202020204" pitchFamily="34" charset="0"/>
-              </a:rPr>
-              <a:t>ip</a:t>
-            </a:r>
-            <a:r>
-              <a:rPr lang="en-AU" dirty="0" smtClean="0">
-                <a:latin typeface="Lucida Sans Typewriter" panose="020B0509030504030204" pitchFamily="49" charset="0"/>
-                <a:cs typeface="Arial" panose="020B0604020202020204" pitchFamily="34" charset="0"/>
-              </a:rPr>
-              <a:t>=0.0.0.0 </a:t>
-            </a:r>
-            <a:r>
-              <a:rPr lang="en-AU" dirty="0" smtClean="0">
-                <a:latin typeface="Lucida Sans Typewriter" panose="020B0509030504030204" pitchFamily="49" charset="0"/>
-                <a:cs typeface="Arial" panose="020B0604020202020204" pitchFamily="34" charset="0"/>
-              </a:rPr>
-              <a:t>–-no-browser</a:t>
-            </a:r>
-          </a:p>
-          <a:p>
-            <a:r>
-              <a:rPr lang="en-AU" dirty="0" smtClean="0">
-                <a:latin typeface="Arial" panose="020B0604020202020204" pitchFamily="34" charset="0"/>
-                <a:cs typeface="Arial" panose="020B0604020202020204" pitchFamily="34" charset="0"/>
-              </a:rPr>
-              <a:t>Step 4b – open </a:t>
-            </a:r>
-            <a:r>
-              <a:rPr lang="en-AU" dirty="0" err="1" smtClean="0">
-                <a:latin typeface="Arial" panose="020B0604020202020204" pitchFamily="34" charset="0"/>
-                <a:cs typeface="Arial" panose="020B0604020202020204" pitchFamily="34" charset="0"/>
-              </a:rPr>
-              <a:t>jupyter</a:t>
-            </a:r>
-            <a:r>
-              <a:rPr lang="en-AU" dirty="0" smtClean="0">
-                <a:latin typeface="Arial" panose="020B0604020202020204" pitchFamily="34" charset="0"/>
-                <a:cs typeface="Arial" panose="020B0604020202020204" pitchFamily="34" charset="0"/>
-              </a:rPr>
-              <a:t> notebook in browser</a:t>
-            </a:r>
-          </a:p>
-          <a:p>
-            <a:pPr lvl="1"/>
-            <a:r>
-              <a:rPr lang="en-AU" dirty="0">
-                <a:latin typeface="Lucida Sans Typewriter" panose="020B0509030504030204" pitchFamily="49" charset="0"/>
-                <a:cs typeface="Arial" panose="020B0604020202020204" pitchFamily="34" charset="0"/>
-              </a:rPr>
-              <a:t> </a:t>
-            </a:r>
-            <a:endParaRPr lang="en-AU" dirty="0" smtClean="0">
-              <a:latin typeface="Lucida Sans Typewriter" panose="020B0509030504030204" pitchFamily="49" charset="0"/>
-              <a:cs typeface="Arial" panose="020B0604020202020204" pitchFamily="34" charset="0"/>
-            </a:endParaRPr>
-          </a:p>
-        </p:txBody>
-      </p:sp>
+          </a:p>
+        </p:txBody>
+      </p:sp>
+      <p:pic>
+        <p:nvPicPr>
+          <p:cNvPr id="3" name="Picture 2"/>
+          <p:cNvPicPr>
+            <a:picLocks noChangeAspect="1"/>
+          </p:cNvPicPr>
+          <p:nvPr/>
+        </p:nvPicPr>
+        <p:blipFill>
+          <a:blip r:embed="rId2">
+            <a:extLst>
+              <a:ext uri="{28A0092B-C50C-407E-A947-70E740481C1C}">
+                <a14:useLocalDpi xmlns:a14="http://schemas.microsoft.com/office/drawing/2010/main" val="0"/>
+              </a:ext>
+            </a:extLst>
+          </a:blip>
+          <a:stretch>
+            <a:fillRect/>
+          </a:stretch>
+        </p:blipFill>
+        <p:spPr>
+          <a:xfrm>
+            <a:off x="1601967" y="2632680"/>
+            <a:ext cx="8988064" cy="3133638"/>
+          </a:xfrm>
+          <a:prstGeom prst="rect">
+            <a:avLst/>
+          </a:prstGeom>
+        </p:spPr>
+      </p:pic>
     </p:spTree>
     <p:extLst>
       <p:ext uri="{BB962C8B-B14F-4D97-AF65-F5344CB8AC3E}">
-        <p14:creationId xmlns:p14="http://schemas.microsoft.com/office/powerpoint/2010/main" val="832770814"/>
+        <p14:creationId xmlns:p14="http://schemas.microsoft.com/office/powerpoint/2010/main" val="14571371"/>
       </p:ext>
     </p:extLst>
   </p:cSld>
@@ -9233,6 +9461,21 @@
 </file>
 
 <file path=customXml/item1.xml><?xml version="1.0" encoding="utf-8"?>
+<?mso-contentType ?>
+<FormTemplates xmlns="http://schemas.microsoft.com/sharepoint/v3/contenttype/forms">
+  <Display>DocumentLibraryForm</Display>
+  <Edit>DocumentLibraryForm</Edit>
+  <New>DocumentLibraryForm</New>
+</FormTemplates>
+</file>
+
+<file path=customXml/item2.xml><?xml version="1.0" encoding="utf-8"?>
+<p:properties xmlns:p="http://schemas.microsoft.com/office/2006/metadata/properties" xmlns:xsi="http://www.w3.org/2001/XMLSchema-instance" xmlns:pc="http://schemas.microsoft.com/office/infopath/2007/PartnerControls">
+  <documentManagement/>
+</p:properties>
+</file>
+
+<file path=customXml/item3.xml><?xml version="1.0" encoding="utf-8"?>
 <ct:contentTypeSchema xmlns:ct="http://schemas.microsoft.com/office/2006/metadata/contentType" xmlns:ma="http://schemas.microsoft.com/office/2006/metadata/properties/metaAttributes" ct:_="" ma:_="" ma:contentTypeName="Document" ma:contentTypeID="0x0101000C3F0734F22D774883C052A360730DF9" ma:contentTypeVersion="7" ma:contentTypeDescription="Create a new document." ma:contentTypeScope="" ma:versionID="68dbab044d50f9bfa9580c1de6249254">
   <xsd:schema xmlns:xsd="http://www.w3.org/2001/XMLSchema" xmlns:xs="http://www.w3.org/2001/XMLSchema" xmlns:p="http://schemas.microsoft.com/office/2006/metadata/properties" xmlns:ns3="c0477a94-a81b-4865-9707-6c9300ae147f" xmlns:ns4="45fda36c-df07-4f55-9922-29409b58d9d3" targetNamespace="http://schemas.microsoft.com/office/2006/metadata/properties" ma:root="true" ma:fieldsID="ea92a476c86701b878abbd8645c4be93" ns3:_="" ns4:_="">
     <xsd:import namespace="c0477a94-a81b-4865-9707-6c9300ae147f"/>
@@ -9417,22 +9660,32 @@
 </ct:contentTypeSchema>
 </file>
 
-<file path=customXml/item2.xml><?xml version="1.0" encoding="utf-8"?>
-<p:properties xmlns:p="http://schemas.microsoft.com/office/2006/metadata/properties" xmlns:xsi="http://www.w3.org/2001/XMLSchema-instance" xmlns:pc="http://schemas.microsoft.com/office/infopath/2007/PartnerControls">
-  <documentManagement/>
-</p:properties>
+<file path=customXml/itemProps1.xml><?xml version="1.0" encoding="utf-8"?>
+<ds:datastoreItem xmlns:ds="http://schemas.openxmlformats.org/officeDocument/2006/customXml" ds:itemID="{10127F0B-EA07-4AFF-8549-55D4D4284DC4}">
+  <ds:schemaRefs>
+    <ds:schemaRef ds:uri="http://schemas.microsoft.com/sharepoint/v3/contenttype/forms"/>
+  </ds:schemaRefs>
+</ds:datastoreItem>
 </file>
 
-<file path=customXml/item3.xml><?xml version="1.0" encoding="utf-8"?>
-<?mso-contentType ?>
-<FormTemplates xmlns="http://schemas.microsoft.com/sharepoint/v3/contenttype/forms">
-  <Display>DocumentLibraryForm</Display>
-  <Edit>DocumentLibraryForm</Edit>
-  <New>DocumentLibraryForm</New>
-</FormTemplates>
+<file path=customXml/itemProps2.xml><?xml version="1.0" encoding="utf-8"?>
+<ds:datastoreItem xmlns:ds="http://schemas.openxmlformats.org/officeDocument/2006/customXml" ds:itemID="{DC2CE541-9384-4F78-A2DC-081CEDD5EAE8}">
+  <ds:schemaRefs>
+    <ds:schemaRef ds:uri="http://purl.org/dc/elements/1.1/"/>
+    <ds:schemaRef ds:uri="http://schemas.microsoft.com/office/2006/metadata/properties"/>
+    <ds:schemaRef ds:uri="c0477a94-a81b-4865-9707-6c9300ae147f"/>
+    <ds:schemaRef ds:uri="http://schemas.microsoft.com/office/2006/documentManagement/types"/>
+    <ds:schemaRef ds:uri="http://purl.org/dc/terms/"/>
+    <ds:schemaRef ds:uri="http://schemas.openxmlformats.org/package/2006/metadata/core-properties"/>
+    <ds:schemaRef ds:uri="http://purl.org/dc/dcmitype/"/>
+    <ds:schemaRef ds:uri="45fda36c-df07-4f55-9922-29409b58d9d3"/>
+    <ds:schemaRef ds:uri="http://schemas.microsoft.com/office/infopath/2007/PartnerControls"/>
+    <ds:schemaRef ds:uri="http://www.w3.org/XML/1998/namespace"/>
+  </ds:schemaRefs>
+</ds:datastoreItem>
 </file>
 
-<file path=customXml/itemProps1.xml><?xml version="1.0" encoding="utf-8"?>
+<file path=customXml/itemProps3.xml><?xml version="1.0" encoding="utf-8"?>
 <ds:datastoreItem xmlns:ds="http://schemas.openxmlformats.org/officeDocument/2006/customXml" ds:itemID="{328FAD76-43D1-414B-B6EC-7811CDF23869}">
   <ds:schemaRefs>
     <ds:schemaRef ds:uri="http://schemas.microsoft.com/office/2006/metadata/contentType"/>
@@ -9449,29 +9702,4 @@
     <ds:schemaRef ds:uri="http://schemas.microsoft.com/internal/obd"/>
   </ds:schemaRefs>
 </ds:datastoreItem>
-</file>
-
-<file path=customXml/itemProps2.xml><?xml version="1.0" encoding="utf-8"?>
-<ds:datastoreItem xmlns:ds="http://schemas.openxmlformats.org/officeDocument/2006/customXml" ds:itemID="{DC2CE541-9384-4F78-A2DC-081CEDD5EAE8}">
-  <ds:schemaRefs>
-    <ds:schemaRef ds:uri="http://schemas.microsoft.com/office/2006/metadata/properties"/>
-    <ds:schemaRef ds:uri="c0477a94-a81b-4865-9707-6c9300ae147f"/>
-    <ds:schemaRef ds:uri="http://schemas.microsoft.com/office/2006/documentManagement/types"/>
-    <ds:schemaRef ds:uri="http://purl.org/dc/terms/"/>
-    <ds:schemaRef ds:uri="http://schemas.openxmlformats.org/package/2006/metadata/core-properties"/>
-    <ds:schemaRef ds:uri="http://purl.org/dc/dcmitype/"/>
-    <ds:schemaRef ds:uri="45fda36c-df07-4f55-9922-29409b58d9d3"/>
-    <ds:schemaRef ds:uri="http://purl.org/dc/elements/1.1/"/>
-    <ds:schemaRef ds:uri="http://schemas.microsoft.com/office/infopath/2007/PartnerControls"/>
-    <ds:schemaRef ds:uri="http://www.w3.org/XML/1998/namespace"/>
-  </ds:schemaRefs>
-</ds:datastoreItem>
-</file>
-
-<file path=customXml/itemProps3.xml><?xml version="1.0" encoding="utf-8"?>
-<ds:datastoreItem xmlns:ds="http://schemas.openxmlformats.org/officeDocument/2006/customXml" ds:itemID="{10127F0B-EA07-4AFF-8549-55D4D4284DC4}">
-  <ds:schemaRefs>
-    <ds:schemaRef ds:uri="http://schemas.microsoft.com/sharepoint/v3/contenttype/forms"/>
-  </ds:schemaRefs>
-</ds:datastoreItem>
 </file>
</xml_diff>

<commit_message>
fixed typos in ppt
</commit_message>
<xml_diff>
--- a/VM_instructions.pptx
+++ b/VM_instructions.pptx
@@ -2,7 +2,7 @@
 <file path=ppt/presentation.xml><?xml version="1.0" encoding="utf-8"?>
 <p:presentation xmlns:a="http://schemas.openxmlformats.org/drawingml/2006/main" xmlns:r="http://schemas.openxmlformats.org/officeDocument/2006/relationships" xmlns:p="http://schemas.openxmlformats.org/presentationml/2006/main" saveSubsetFonts="1">
   <p:sldMasterIdLst>
-    <p:sldMasterId id="2147483888" r:id="rId4"/>
+    <p:sldMasterId id="2147483906" r:id="rId4"/>
   </p:sldMasterIdLst>
   <p:sldIdLst>
     <p:sldId id="256" r:id="rId5"/>
@@ -242,8 +242,8 @@
               <a:buNone/>
               <a:defRPr sz="2200">
                 <a:solidFill>
-                  <a:schemeClr val="tx1">
-                    <a:lumMod val="75000"/>
+                  <a:schemeClr val="bg1">
+                    <a:lumMod val="50000"/>
                   </a:schemeClr>
                 </a:solidFill>
               </a:defRPr>
@@ -307,7 +307,7 @@
           <a:p>
             <a:fld id="{A97D098C-81A2-4741-849D-B3F04101F1CD}" type="datetimeFigureOut">
               <a:rPr lang="en-AU" smtClean="0"/>
-              <a:t>1/03/2021</a:t>
+              <a:t>7/03/2021</a:t>
             </a:fld>
             <a:endParaRPr lang="en-AU"/>
           </a:p>
@@ -358,7 +358,7 @@
     </p:spTree>
     <p:extLst>
       <p:ext uri="{BB962C8B-B14F-4D97-AF65-F5344CB8AC3E}">
-        <p14:creationId xmlns:p14="http://schemas.microsoft.com/office/powerpoint/2010/main" val="3527020372"/>
+        <p14:creationId xmlns:p14="http://schemas.microsoft.com/office/powerpoint/2010/main" val="1232277692"/>
       </p:ext>
     </p:extLst>
   </p:cSld>
@@ -622,7 +622,7 @@
           <a:p>
             <a:fld id="{A97D098C-81A2-4741-849D-B3F04101F1CD}" type="datetimeFigureOut">
               <a:rPr lang="en-AU" smtClean="0"/>
-              <a:t>1/03/2021</a:t>
+              <a:t>7/03/2021</a:t>
             </a:fld>
             <a:endParaRPr lang="en-AU"/>
           </a:p>
@@ -673,7 +673,7 @@
     </p:spTree>
     <p:extLst>
       <p:ext uri="{BB962C8B-B14F-4D97-AF65-F5344CB8AC3E}">
-        <p14:creationId xmlns:p14="http://schemas.microsoft.com/office/powerpoint/2010/main" val="3096866179"/>
+        <p14:creationId xmlns:p14="http://schemas.microsoft.com/office/powerpoint/2010/main" val="2310998264"/>
       </p:ext>
     </p:extLst>
   </p:cSld>
@@ -844,7 +844,7 @@
           <a:p>
             <a:fld id="{A97D098C-81A2-4741-849D-B3F04101F1CD}" type="datetimeFigureOut">
               <a:rPr lang="en-AU" smtClean="0"/>
-              <a:t>1/03/2021</a:t>
+              <a:t>7/03/2021</a:t>
             </a:fld>
             <a:endParaRPr lang="en-AU"/>
           </a:p>
@@ -895,7 +895,7 @@
     </p:spTree>
     <p:extLst>
       <p:ext uri="{BB962C8B-B14F-4D97-AF65-F5344CB8AC3E}">
-        <p14:creationId xmlns:p14="http://schemas.microsoft.com/office/powerpoint/2010/main" val="2011358386"/>
+        <p14:creationId xmlns:p14="http://schemas.microsoft.com/office/powerpoint/2010/main" val="1710526304"/>
       </p:ext>
     </p:extLst>
   </p:cSld>
@@ -1135,7 +1135,7 @@
           <a:p>
             <a:fld id="{A97D098C-81A2-4741-849D-B3F04101F1CD}" type="datetimeFigureOut">
               <a:rPr lang="en-AU" smtClean="0"/>
-              <a:t>1/03/2021</a:t>
+              <a:t>7/03/2021</a:t>
             </a:fld>
             <a:endParaRPr lang="en-AU"/>
           </a:p>
@@ -1418,7 +1418,7 @@
     </p:spTree>
     <p:extLst>
       <p:ext uri="{BB962C8B-B14F-4D97-AF65-F5344CB8AC3E}">
-        <p14:creationId xmlns:p14="http://schemas.microsoft.com/office/powerpoint/2010/main" val="1996575356"/>
+        <p14:creationId xmlns:p14="http://schemas.microsoft.com/office/powerpoint/2010/main" val="2138993765"/>
       </p:ext>
     </p:extLst>
   </p:cSld>
@@ -1589,7 +1589,7 @@
           <a:p>
             <a:fld id="{A97D098C-81A2-4741-849D-B3F04101F1CD}" type="datetimeFigureOut">
               <a:rPr lang="en-AU" smtClean="0"/>
-              <a:t>1/03/2021</a:t>
+              <a:t>7/03/2021</a:t>
             </a:fld>
             <a:endParaRPr lang="en-AU"/>
           </a:p>
@@ -1640,7 +1640,7 @@
     </p:spTree>
     <p:extLst>
       <p:ext uri="{BB962C8B-B14F-4D97-AF65-F5344CB8AC3E}">
-        <p14:creationId xmlns:p14="http://schemas.microsoft.com/office/powerpoint/2010/main" val="1884955457"/>
+        <p14:creationId xmlns:p14="http://schemas.microsoft.com/office/powerpoint/2010/main" val="316946181"/>
       </p:ext>
     </p:extLst>
   </p:cSld>
@@ -2165,7 +2165,7 @@
           <a:p>
             <a:fld id="{A97D098C-81A2-4741-849D-B3F04101F1CD}" type="datetimeFigureOut">
               <a:rPr lang="en-AU" smtClean="0"/>
-              <a:t>1/03/2021</a:t>
+              <a:t>7/03/2021</a:t>
             </a:fld>
             <a:endParaRPr lang="en-AU"/>
           </a:p>
@@ -2216,7 +2216,7 @@
     </p:spTree>
     <p:extLst>
       <p:ext uri="{BB962C8B-B14F-4D97-AF65-F5344CB8AC3E}">
-        <p14:creationId xmlns:p14="http://schemas.microsoft.com/office/powerpoint/2010/main" val="985389338"/>
+        <p14:creationId xmlns:p14="http://schemas.microsoft.com/office/powerpoint/2010/main" val="4236000929"/>
       </p:ext>
     </p:extLst>
   </p:cSld>
@@ -3026,7 +3026,7 @@
           <a:p>
             <a:fld id="{A97D098C-81A2-4741-849D-B3F04101F1CD}" type="datetimeFigureOut">
               <a:rPr lang="en-AU" smtClean="0"/>
-              <a:t>1/03/2021</a:t>
+              <a:t>7/03/2021</a:t>
             </a:fld>
             <a:endParaRPr lang="en-AU"/>
           </a:p>
@@ -3077,7 +3077,7 @@
     </p:spTree>
     <p:extLst>
       <p:ext uri="{BB962C8B-B14F-4D97-AF65-F5344CB8AC3E}">
-        <p14:creationId xmlns:p14="http://schemas.microsoft.com/office/powerpoint/2010/main" val="1151125059"/>
+        <p14:creationId xmlns:p14="http://schemas.microsoft.com/office/powerpoint/2010/main" val="1105539533"/>
       </p:ext>
     </p:extLst>
   </p:cSld>
@@ -3231,7 +3231,7 @@
           <a:p>
             <a:fld id="{A97D098C-81A2-4741-849D-B3F04101F1CD}" type="datetimeFigureOut">
               <a:rPr lang="en-AU" smtClean="0"/>
-              <a:t>1/03/2021</a:t>
+              <a:t>7/03/2021</a:t>
             </a:fld>
             <a:endParaRPr lang="en-AU"/>
           </a:p>
@@ -3282,7 +3282,7 @@
     </p:spTree>
     <p:extLst>
       <p:ext uri="{BB962C8B-B14F-4D97-AF65-F5344CB8AC3E}">
-        <p14:creationId xmlns:p14="http://schemas.microsoft.com/office/powerpoint/2010/main" val="2524600231"/>
+        <p14:creationId xmlns:p14="http://schemas.microsoft.com/office/powerpoint/2010/main" val="252957561"/>
       </p:ext>
     </p:extLst>
   </p:cSld>
@@ -3445,7 +3445,7 @@
           <a:p>
             <a:fld id="{A97D098C-81A2-4741-849D-B3F04101F1CD}" type="datetimeFigureOut">
               <a:rPr lang="en-AU" smtClean="0"/>
-              <a:t>1/03/2021</a:t>
+              <a:t>7/03/2021</a:t>
             </a:fld>
             <a:endParaRPr lang="en-AU"/>
           </a:p>
@@ -3496,7 +3496,7 @@
     </p:spTree>
     <p:extLst>
       <p:ext uri="{BB962C8B-B14F-4D97-AF65-F5344CB8AC3E}">
-        <p14:creationId xmlns:p14="http://schemas.microsoft.com/office/powerpoint/2010/main" val="1076698239"/>
+        <p14:creationId xmlns:p14="http://schemas.microsoft.com/office/powerpoint/2010/main" val="3265533271"/>
       </p:ext>
     </p:extLst>
   </p:cSld>
@@ -3650,7 +3650,7 @@
           <a:p>
             <a:fld id="{A97D098C-81A2-4741-849D-B3F04101F1CD}" type="datetimeFigureOut">
               <a:rPr lang="en-AU" smtClean="0"/>
-              <a:t>1/03/2021</a:t>
+              <a:t>7/03/2021</a:t>
             </a:fld>
             <a:endParaRPr lang="en-AU"/>
           </a:p>
@@ -3701,7 +3701,7 @@
     </p:spTree>
     <p:extLst>
       <p:ext uri="{BB962C8B-B14F-4D97-AF65-F5344CB8AC3E}">
-        <p14:creationId xmlns:p14="http://schemas.microsoft.com/office/powerpoint/2010/main" val="331174394"/>
+        <p14:creationId xmlns:p14="http://schemas.microsoft.com/office/powerpoint/2010/main" val="1281383135"/>
       </p:ext>
     </p:extLst>
   </p:cSld>
@@ -3817,8 +3817,8 @@
               <a:buNone/>
               <a:defRPr sz="2000">
                 <a:solidFill>
-                  <a:schemeClr val="tx1">
-                    <a:lumMod val="75000"/>
+                  <a:schemeClr val="bg1">
+                    <a:lumMod val="50000"/>
                   </a:schemeClr>
                 </a:solidFill>
               </a:defRPr>
@@ -3930,7 +3930,7 @@
           <a:p>
             <a:fld id="{A97D098C-81A2-4741-849D-B3F04101F1CD}" type="datetimeFigureOut">
               <a:rPr lang="en-AU" smtClean="0"/>
-              <a:t>1/03/2021</a:t>
+              <a:t>7/03/2021</a:t>
             </a:fld>
             <a:endParaRPr lang="en-AU"/>
           </a:p>
@@ -3981,7 +3981,7 @@
     </p:spTree>
     <p:extLst>
       <p:ext uri="{BB962C8B-B14F-4D97-AF65-F5344CB8AC3E}">
-        <p14:creationId xmlns:p14="http://schemas.microsoft.com/office/powerpoint/2010/main" val="4236142082"/>
+        <p14:creationId xmlns:p14="http://schemas.microsoft.com/office/powerpoint/2010/main" val="2002894078"/>
       </p:ext>
     </p:extLst>
   </p:cSld>
@@ -4197,7 +4197,7 @@
           <a:p>
             <a:fld id="{A97D098C-81A2-4741-849D-B3F04101F1CD}" type="datetimeFigureOut">
               <a:rPr lang="en-AU" smtClean="0"/>
-              <a:t>1/03/2021</a:t>
+              <a:t>7/03/2021</a:t>
             </a:fld>
             <a:endParaRPr lang="en-AU"/>
           </a:p>
@@ -4248,7 +4248,7 @@
     </p:spTree>
     <p:extLst>
       <p:ext uri="{BB962C8B-B14F-4D97-AF65-F5344CB8AC3E}">
-        <p14:creationId xmlns:p14="http://schemas.microsoft.com/office/powerpoint/2010/main" val="268724315"/>
+        <p14:creationId xmlns:p14="http://schemas.microsoft.com/office/powerpoint/2010/main" val="501638764"/>
       </p:ext>
     </p:extLst>
   </p:cSld>
@@ -4612,7 +4612,7 @@
           <a:p>
             <a:fld id="{A97D098C-81A2-4741-849D-B3F04101F1CD}" type="datetimeFigureOut">
               <a:rPr lang="en-AU" smtClean="0"/>
-              <a:t>1/03/2021</a:t>
+              <a:t>7/03/2021</a:t>
             </a:fld>
             <a:endParaRPr lang="en-AU"/>
           </a:p>
@@ -4663,7 +4663,7 @@
     </p:spTree>
     <p:extLst>
       <p:ext uri="{BB962C8B-B14F-4D97-AF65-F5344CB8AC3E}">
-        <p14:creationId xmlns:p14="http://schemas.microsoft.com/office/powerpoint/2010/main" val="827694191"/>
+        <p14:creationId xmlns:p14="http://schemas.microsoft.com/office/powerpoint/2010/main" val="1173926321"/>
       </p:ext>
     </p:extLst>
   </p:cSld>
@@ -4760,7 +4760,7 @@
           <a:p>
             <a:fld id="{A97D098C-81A2-4741-849D-B3F04101F1CD}" type="datetimeFigureOut">
               <a:rPr lang="en-AU" smtClean="0"/>
-              <a:t>1/03/2021</a:t>
+              <a:t>7/03/2021</a:t>
             </a:fld>
             <a:endParaRPr lang="en-AU"/>
           </a:p>
@@ -4811,7 +4811,7 @@
     </p:spTree>
     <p:extLst>
       <p:ext uri="{BB962C8B-B14F-4D97-AF65-F5344CB8AC3E}">
-        <p14:creationId xmlns:p14="http://schemas.microsoft.com/office/powerpoint/2010/main" val="3323379457"/>
+        <p14:creationId xmlns:p14="http://schemas.microsoft.com/office/powerpoint/2010/main" val="356067080"/>
       </p:ext>
     </p:extLst>
   </p:cSld>
@@ -4885,7 +4885,7 @@
           <a:p>
             <a:fld id="{A97D098C-81A2-4741-849D-B3F04101F1CD}" type="datetimeFigureOut">
               <a:rPr lang="en-AU" smtClean="0"/>
-              <a:t>1/03/2021</a:t>
+              <a:t>7/03/2021</a:t>
             </a:fld>
             <a:endParaRPr lang="en-AU"/>
           </a:p>
@@ -4936,7 +4936,7 @@
     </p:spTree>
     <p:extLst>
       <p:ext uri="{BB962C8B-B14F-4D97-AF65-F5344CB8AC3E}">
-        <p14:creationId xmlns:p14="http://schemas.microsoft.com/office/powerpoint/2010/main" val="666126543"/>
+        <p14:creationId xmlns:p14="http://schemas.microsoft.com/office/powerpoint/2010/main" val="2412580840"/>
       </p:ext>
     </p:extLst>
   </p:cSld>
@@ -5164,7 +5164,7 @@
           <a:p>
             <a:fld id="{A97D098C-81A2-4741-849D-B3F04101F1CD}" type="datetimeFigureOut">
               <a:rPr lang="en-AU" smtClean="0"/>
-              <a:t>1/03/2021</a:t>
+              <a:t>7/03/2021</a:t>
             </a:fld>
             <a:endParaRPr lang="en-AU"/>
           </a:p>
@@ -5215,7 +5215,7 @@
     </p:spTree>
     <p:extLst>
       <p:ext uri="{BB962C8B-B14F-4D97-AF65-F5344CB8AC3E}">
-        <p14:creationId xmlns:p14="http://schemas.microsoft.com/office/powerpoint/2010/main" val="2930799520"/>
+        <p14:creationId xmlns:p14="http://schemas.microsoft.com/office/powerpoint/2010/main" val="1356865874"/>
       </p:ext>
     </p:extLst>
   </p:cSld>
@@ -5479,7 +5479,7 @@
           <a:p>
             <a:fld id="{A97D098C-81A2-4741-849D-B3F04101F1CD}" type="datetimeFigureOut">
               <a:rPr lang="en-AU" smtClean="0"/>
-              <a:t>1/03/2021</a:t>
+              <a:t>7/03/2021</a:t>
             </a:fld>
             <a:endParaRPr lang="en-AU"/>
           </a:p>
@@ -5530,7 +5530,7 @@
     </p:spTree>
     <p:extLst>
       <p:ext uri="{BB962C8B-B14F-4D97-AF65-F5344CB8AC3E}">
-        <p14:creationId xmlns:p14="http://schemas.microsoft.com/office/powerpoint/2010/main" val="2905403884"/>
+        <p14:creationId xmlns:p14="http://schemas.microsoft.com/office/powerpoint/2010/main" val="1629434411"/>
       </p:ext>
     </p:extLst>
   </p:cSld>
@@ -5544,8 +5544,8 @@
 <p:sldMaster xmlns:a="http://schemas.openxmlformats.org/drawingml/2006/main" xmlns:r="http://schemas.openxmlformats.org/officeDocument/2006/relationships" xmlns:p="http://schemas.openxmlformats.org/presentationml/2006/main">
   <p:cSld>
     <p:bg>
-      <p:bgRef idx="1001">
-        <a:schemeClr val="bg1"/>
+      <p:bgRef idx="1003">
+        <a:schemeClr val="bg2"/>
       </p:bgRef>
     </p:bg>
     <p:spTree>
@@ -5572,7 +5572,7 @@
         </p:nvPicPr>
         <p:blipFill>
           <a:blip r:embed="rId19">
-            <a:alphaModFix amt="40000"/>
+            <a:alphaModFix amt="70000"/>
             <a:extLst>
               <a:ext uri="{28A0092B-C50C-407E-A947-70E740481C1C}">
                 <a14:useLocalDpi xmlns:a14="http://schemas.microsoft.com/office/drawing/2010/main" val="0"/>
@@ -5732,7 +5732,7 @@
           <a:p>
             <a:fld id="{A97D098C-81A2-4741-849D-B3F04101F1CD}" type="datetimeFigureOut">
               <a:rPr lang="en-AU" smtClean="0"/>
-              <a:t>1/03/2021</a:t>
+              <a:t>7/03/2021</a:t>
             </a:fld>
             <a:endParaRPr lang="en-AU"/>
           </a:p>
@@ -5815,29 +5815,29 @@
     </p:spTree>
     <p:extLst>
       <p:ext uri="{BB962C8B-B14F-4D97-AF65-F5344CB8AC3E}">
-        <p14:creationId xmlns:p14="http://schemas.microsoft.com/office/powerpoint/2010/main" val="3695174247"/>
+        <p14:creationId xmlns:p14="http://schemas.microsoft.com/office/powerpoint/2010/main" val="3266847051"/>
       </p:ext>
     </p:extLst>
   </p:cSld>
-  <p:clrMap bg1="dk1" tx1="lt1" bg2="dk2" tx2="lt2" accent1="accent1" accent2="accent2" accent3="accent3" accent4="accent4" accent5="accent5" accent6="accent6" hlink="hlink" folHlink="folHlink"/>
+  <p:clrMap bg1="lt1" tx1="dk1" bg2="lt2" tx2="dk2" accent1="accent1" accent2="accent2" accent3="accent3" accent4="accent4" accent5="accent5" accent6="accent6" hlink="hlink" folHlink="folHlink"/>
   <p:sldLayoutIdLst>
-    <p:sldLayoutId id="2147483889" r:id="rId1"/>
-    <p:sldLayoutId id="2147483890" r:id="rId2"/>
-    <p:sldLayoutId id="2147483891" r:id="rId3"/>
-    <p:sldLayoutId id="2147483892" r:id="rId4"/>
-    <p:sldLayoutId id="2147483893" r:id="rId5"/>
-    <p:sldLayoutId id="2147483894" r:id="rId6"/>
-    <p:sldLayoutId id="2147483895" r:id="rId7"/>
-    <p:sldLayoutId id="2147483896" r:id="rId8"/>
-    <p:sldLayoutId id="2147483897" r:id="rId9"/>
-    <p:sldLayoutId id="2147483898" r:id="rId10"/>
-    <p:sldLayoutId id="2147483899" r:id="rId11"/>
-    <p:sldLayoutId id="2147483900" r:id="rId12"/>
-    <p:sldLayoutId id="2147483901" r:id="rId13"/>
-    <p:sldLayoutId id="2147483902" r:id="rId14"/>
-    <p:sldLayoutId id="2147483903" r:id="rId15"/>
-    <p:sldLayoutId id="2147483904" r:id="rId16"/>
-    <p:sldLayoutId id="2147483905" r:id="rId17"/>
+    <p:sldLayoutId id="2147483907" r:id="rId1"/>
+    <p:sldLayoutId id="2147483908" r:id="rId2"/>
+    <p:sldLayoutId id="2147483909" r:id="rId3"/>
+    <p:sldLayoutId id="2147483910" r:id="rId4"/>
+    <p:sldLayoutId id="2147483911" r:id="rId5"/>
+    <p:sldLayoutId id="2147483912" r:id="rId6"/>
+    <p:sldLayoutId id="2147483913" r:id="rId7"/>
+    <p:sldLayoutId id="2147483914" r:id="rId8"/>
+    <p:sldLayoutId id="2147483915" r:id="rId9"/>
+    <p:sldLayoutId id="2147483916" r:id="rId10"/>
+    <p:sldLayoutId id="2147483917" r:id="rId11"/>
+    <p:sldLayoutId id="2147483918" r:id="rId12"/>
+    <p:sldLayoutId id="2147483919" r:id="rId13"/>
+    <p:sldLayoutId id="2147483920" r:id="rId14"/>
+    <p:sldLayoutId id="2147483921" r:id="rId15"/>
+    <p:sldLayoutId id="2147483922" r:id="rId16"/>
+    <p:sldLayoutId id="2147483923" r:id="rId17"/>
   </p:sldLayoutIdLst>
   <p:txStyles>
     <p:titleStyle>
@@ -5853,13 +5853,7 @@
           <a:solidFill>
             <a:schemeClr val="tx1"/>
           </a:solidFill>
-          <a:effectLst>
-            <a:outerShdw blurRad="38100" dist="38100" dir="2700000" algn="tl">
-              <a:srgbClr val="000000">
-                <a:alpha val="43137"/>
-              </a:srgbClr>
-            </a:outerShdw>
-          </a:effectLst>
+          <a:effectLst/>
           <a:latin typeface="+mj-lt"/>
           <a:ea typeface="+mj-ea"/>
           <a:cs typeface="+mj-cs"/>
@@ -5883,13 +5877,7 @@
           <a:solidFill>
             <a:schemeClr val="tx1"/>
           </a:solidFill>
-          <a:effectLst>
-            <a:outerShdw blurRad="47625" dist="12700" dir="2700000" algn="tl" rotWithShape="0">
-              <a:srgbClr val="000000">
-                <a:alpha val="36000"/>
-              </a:srgbClr>
-            </a:outerShdw>
-          </a:effectLst>
+          <a:effectLst/>
           <a:latin typeface="+mn-lt"/>
           <a:ea typeface="+mn-ea"/>
           <a:cs typeface="+mn-cs"/>
@@ -5911,13 +5899,7 @@
           <a:solidFill>
             <a:schemeClr val="tx1"/>
           </a:solidFill>
-          <a:effectLst>
-            <a:outerShdw blurRad="47625" dist="12700" dir="2700000" algn="tl" rotWithShape="0">
-              <a:srgbClr val="000000">
-                <a:alpha val="36000"/>
-              </a:srgbClr>
-            </a:outerShdw>
-          </a:effectLst>
+          <a:effectLst/>
           <a:latin typeface="+mn-lt"/>
           <a:ea typeface="+mn-ea"/>
           <a:cs typeface="+mn-cs"/>
@@ -5939,13 +5921,7 @@
           <a:solidFill>
             <a:schemeClr val="tx1"/>
           </a:solidFill>
-          <a:effectLst>
-            <a:outerShdw blurRad="47625" dist="12700" dir="2700000" algn="tl" rotWithShape="0">
-              <a:srgbClr val="000000">
-                <a:alpha val="36000"/>
-              </a:srgbClr>
-            </a:outerShdw>
-          </a:effectLst>
+          <a:effectLst/>
           <a:latin typeface="+mn-lt"/>
           <a:ea typeface="+mn-ea"/>
           <a:cs typeface="+mn-cs"/>
@@ -5967,13 +5943,7 @@
           <a:solidFill>
             <a:schemeClr val="tx1"/>
           </a:solidFill>
-          <a:effectLst>
-            <a:outerShdw blurRad="47625" dist="12700" dir="2700000" algn="tl" rotWithShape="0">
-              <a:srgbClr val="000000">
-                <a:alpha val="36000"/>
-              </a:srgbClr>
-            </a:outerShdw>
-          </a:effectLst>
+          <a:effectLst/>
           <a:latin typeface="+mn-lt"/>
           <a:ea typeface="+mn-ea"/>
           <a:cs typeface="+mn-cs"/>
@@ -5995,13 +5965,7 @@
           <a:solidFill>
             <a:schemeClr val="tx1"/>
           </a:solidFill>
-          <a:effectLst>
-            <a:outerShdw blurRad="47625" dist="12700" dir="2700000" algn="tl" rotWithShape="0">
-              <a:srgbClr val="000000">
-                <a:alpha val="36000"/>
-              </a:srgbClr>
-            </a:outerShdw>
-          </a:effectLst>
+          <a:effectLst/>
           <a:latin typeface="+mn-lt"/>
           <a:ea typeface="+mn-ea"/>
           <a:cs typeface="+mn-cs"/>
@@ -6023,13 +5987,7 @@
           <a:solidFill>
             <a:schemeClr val="tx1"/>
           </a:solidFill>
-          <a:effectLst>
-            <a:outerShdw blurRad="47625" dist="12700" dir="2700000" algn="tl" rotWithShape="0">
-              <a:srgbClr val="000000">
-                <a:alpha val="36000"/>
-              </a:srgbClr>
-            </a:outerShdw>
-          </a:effectLst>
+          <a:effectLst/>
           <a:latin typeface="+mn-lt"/>
           <a:ea typeface="+mn-ea"/>
           <a:cs typeface="+mn-cs"/>
@@ -6051,13 +6009,7 @@
           <a:solidFill>
             <a:schemeClr val="tx1"/>
           </a:solidFill>
-          <a:effectLst>
-            <a:outerShdw blurRad="47625" dist="12700" dir="2700000" algn="tl" rotWithShape="0">
-              <a:srgbClr val="000000">
-                <a:alpha val="36000"/>
-              </a:srgbClr>
-            </a:outerShdw>
-          </a:effectLst>
+          <a:effectLst/>
           <a:latin typeface="+mn-lt"/>
           <a:ea typeface="+mn-ea"/>
           <a:cs typeface="+mn-cs"/>
@@ -6079,13 +6031,7 @@
           <a:solidFill>
             <a:schemeClr val="tx1"/>
           </a:solidFill>
-          <a:effectLst>
-            <a:outerShdw blurRad="47625" dist="12700" dir="2700000" algn="tl" rotWithShape="0">
-              <a:srgbClr val="000000">
-                <a:alpha val="36000"/>
-              </a:srgbClr>
-            </a:outerShdw>
-          </a:effectLst>
+          <a:effectLst/>
           <a:latin typeface="+mn-lt"/>
           <a:ea typeface="+mn-ea"/>
           <a:cs typeface="+mn-cs"/>
@@ -6107,13 +6053,7 @@
           <a:solidFill>
             <a:schemeClr val="tx1"/>
           </a:solidFill>
-          <a:effectLst>
-            <a:outerShdw blurRad="47625" dist="12700" dir="2700000" algn="tl" rotWithShape="0">
-              <a:srgbClr val="000000">
-                <a:alpha val="36000"/>
-              </a:srgbClr>
-            </a:outerShdw>
-          </a:effectLst>
+          <a:effectLst/>
           <a:latin typeface="+mn-lt"/>
           <a:ea typeface="+mn-ea"/>
           <a:cs typeface="+mn-cs"/>
@@ -6668,14 +6608,21 @@
                 <a:latin typeface="Arial" panose="020B0604020202020204" pitchFamily="34" charset="0"/>
                 <a:cs typeface="Arial" panose="020B0604020202020204" pitchFamily="34" charset="0"/>
               </a:rPr>
-              <a:t>juptyer</a:t>
-            </a:r>
-            <a:r>
-              <a:rPr lang="en-AU" dirty="0" smtClean="0">
-                <a:latin typeface="Arial" panose="020B0604020202020204" pitchFamily="34" charset="0"/>
-                <a:cs typeface="Arial" panose="020B0604020202020204" pitchFamily="34" charset="0"/>
-              </a:rPr>
-              <a:t> notebook  --</a:t>
+              <a:t>jupyter</a:t>
+            </a:r>
+            <a:r>
+              <a:rPr lang="en-AU" dirty="0" smtClean="0">
+                <a:latin typeface="Arial" panose="020B0604020202020204" pitchFamily="34" charset="0"/>
+                <a:cs typeface="Arial" panose="020B0604020202020204" pitchFamily="34" charset="0"/>
+              </a:rPr>
+              <a:t> </a:t>
+            </a:r>
+            <a:r>
+              <a:rPr lang="en-AU" dirty="0" smtClean="0">
+                <a:latin typeface="Arial" panose="020B0604020202020204" pitchFamily="34" charset="0"/>
+                <a:cs typeface="Arial" panose="020B0604020202020204" pitchFamily="34" charset="0"/>
+              </a:rPr>
+              <a:t>notebook  --</a:t>
             </a:r>
             <a:r>
               <a:rPr lang="en-AU" dirty="0" err="1" smtClean="0">
@@ -6692,43 +6639,54 @@
               <a:t>=0.0.0.0 --no-browser</a:t>
             </a:r>
             <a:endParaRPr lang="en-AU" dirty="0">
-              <a:latin typeface="Lucida Sans" panose="020B0602030504020204" pitchFamily="34" charset="0"/>
+              <a:latin typeface="Arial" panose="020B0604020202020204" pitchFamily="34" charset="0"/>
               <a:cs typeface="Arial" panose="020B0604020202020204" pitchFamily="34" charset="0"/>
             </a:endParaRPr>
           </a:p>
           <a:p>
             <a:r>
-              <a:rPr lang="en-AU" dirty="0" smtClean="0"/>
+              <a:rPr lang="en-AU" dirty="0" smtClean="0">
+                <a:latin typeface="Arial" panose="020B0604020202020204" pitchFamily="34" charset="0"/>
+                <a:cs typeface="Arial" panose="020B0604020202020204" pitchFamily="34" charset="0"/>
+              </a:rPr>
               <a:t>   </a:t>
             </a:r>
             <a:r>
               <a:rPr lang="en-AU" dirty="0" smtClean="0">
                 <a:solidFill>
-                  <a:srgbClr val="FFFF00"/>
+                  <a:srgbClr val="FF0000"/>
                 </a:solidFill>
+                <a:latin typeface="Arial" panose="020B0604020202020204" pitchFamily="34" charset="0"/>
+                <a:cs typeface="Arial" panose="020B0604020202020204" pitchFamily="34" charset="0"/>
               </a:rPr>
               <a:t>NOTE: there are 2 dashes before “</a:t>
             </a:r>
             <a:r>
               <a:rPr lang="en-AU" dirty="0" err="1" smtClean="0">
                 <a:solidFill>
-                  <a:srgbClr val="FFFF00"/>
+                  <a:srgbClr val="FF0000"/>
                 </a:solidFill>
+                <a:latin typeface="Arial" panose="020B0604020202020204" pitchFamily="34" charset="0"/>
+                <a:cs typeface="Arial" panose="020B0604020202020204" pitchFamily="34" charset="0"/>
               </a:rPr>
               <a:t>ip</a:t>
             </a:r>
             <a:r>
               <a:rPr lang="en-AU" dirty="0" smtClean="0">
                 <a:solidFill>
-                  <a:srgbClr val="FFFF00"/>
+                  <a:srgbClr val="FF0000"/>
                 </a:solidFill>
+                <a:latin typeface="Arial" panose="020B0604020202020204" pitchFamily="34" charset="0"/>
+                <a:cs typeface="Arial" panose="020B0604020202020204" pitchFamily="34" charset="0"/>
               </a:rPr>
               <a:t>” and “no-browser”</a:t>
             </a:r>
             <a:endParaRPr lang="en-AU" dirty="0">
               <a:solidFill>
-                <a:srgbClr val="FFFF00"/>
+                <a:srgbClr val="FF0000"/>
               </a:solidFill>
+              <a:latin typeface="Arial" panose="020B0604020202020204" pitchFamily="34" charset="0"/>
+              <a:cs typeface="Arial" panose="020B0604020202020204" pitchFamily="34" charset="0"/>
             </a:endParaRPr>
           </a:p>
         </p:txBody>
@@ -6875,7 +6833,10 @@
               <a:t> notebook server is running on your VM you can then open a browser and copy and paste the URL that starts with </a:t>
             </a:r>
             <a:r>
-              <a:rPr lang="en-AU" dirty="0" smtClean="0">
+              <a:rPr lang="en-AU" b="1" dirty="0" smtClean="0">
+                <a:solidFill>
+                  <a:srgbClr val="00B050"/>
+                </a:solidFill>
                 <a:latin typeface="Arial" panose="020B0604020202020204" pitchFamily="34" charset="0"/>
                 <a:cs typeface="Arial" panose="020B0604020202020204" pitchFamily="34" charset="0"/>
                 <a:hlinkClick r:id="rId2"/>
@@ -6883,7 +6844,10 @@
               <a:t>http://127.0.0.1:8888/?token=...</a:t>
             </a:r>
             <a:r>
-              <a:rPr lang="en-AU" dirty="0">
+              <a:rPr lang="en-AU" b="1" dirty="0">
+                <a:solidFill>
+                  <a:srgbClr val="00B050"/>
+                </a:solidFill>
                 <a:latin typeface="Arial" panose="020B0604020202020204" pitchFamily="34" charset="0"/>
                 <a:cs typeface="Arial" panose="020B0604020202020204" pitchFamily="34" charset="0"/>
               </a:rPr>
@@ -7137,14 +7101,34 @@
           </a:xfrm>
         </p:spPr>
         <p:txBody>
-          <a:bodyPr/>
+          <a:bodyPr>
+            <a:normAutofit fontScale="90000"/>
+          </a:bodyPr>
           <a:lstStyle/>
           <a:p>
             <a:r>
               <a:rPr lang="en-AU" b="1" dirty="0" smtClean="0">
                 <a:latin typeface="Lucida Sans Typewriter" panose="020B0509030504030204" pitchFamily="49" charset="0"/>
               </a:rPr>
-              <a:t>Summary of commands	</a:t>
+              <a:t>Summary of </a:t>
+            </a:r>
+            <a:r>
+              <a:rPr lang="en-AU" b="1" dirty="0" smtClean="0">
+                <a:latin typeface="Lucida Sans Typewriter" panose="020B0509030504030204" pitchFamily="49" charset="0"/>
+              </a:rPr>
+              <a:t>commands To Install and BUILD your VM and Start </a:t>
+            </a:r>
+            <a:r>
+              <a:rPr lang="en-AU" b="1" dirty="0" err="1" smtClean="0">
+                <a:latin typeface="Lucida Sans Typewriter" panose="020B0509030504030204" pitchFamily="49" charset="0"/>
+              </a:rPr>
+              <a:t>Jupyter</a:t>
+            </a:r>
+            <a:r>
+              <a:rPr lang="en-AU" b="1" dirty="0" smtClean="0">
+                <a:latin typeface="Lucida Sans Typewriter" panose="020B0509030504030204" pitchFamily="49" charset="0"/>
+              </a:rPr>
+              <a:t> Notebook</a:t>
             </a:r>
             <a:endParaRPr lang="en-AU" b="1" dirty="0">
               <a:latin typeface="Lucida Sans Typewriter" panose="020B0509030504030204" pitchFamily="49" charset="0"/>
@@ -7563,7 +7547,7 @@
         <p:spPr>
           <a:xfrm>
             <a:off x="838200" y="1734671"/>
-            <a:ext cx="8238565" cy="5262979"/>
+            <a:ext cx="8238565" cy="4154984"/>
           </a:xfrm>
           <a:prstGeom prst="rect">
             <a:avLst/>
@@ -7577,39 +7561,65 @@
           <a:lstStyle/>
           <a:p>
             <a:r>
-              <a:rPr lang="en-AU" sz="2400" dirty="0"/>
+              <a:rPr lang="en-AU" dirty="0">
+                <a:latin typeface="Arial" panose="020B0604020202020204" pitchFamily="34" charset="0"/>
+                <a:cs typeface="Arial" panose="020B0604020202020204" pitchFamily="34" charset="0"/>
+              </a:rPr>
               <a:t>You will need to install a few </a:t>
             </a:r>
             <a:r>
-              <a:rPr lang="en-AU" sz="2400" dirty="0" smtClean="0"/>
+              <a:rPr lang="en-AU" dirty="0" smtClean="0">
+                <a:latin typeface="Arial" panose="020B0604020202020204" pitchFamily="34" charset="0"/>
+                <a:cs typeface="Arial" panose="020B0604020202020204" pitchFamily="34" charset="0"/>
+              </a:rPr>
               <a:t>open </a:t>
             </a:r>
             <a:r>
-              <a:rPr lang="en-AU" sz="2400" dirty="0"/>
+              <a:rPr lang="en-AU" dirty="0">
+                <a:latin typeface="Arial" panose="020B0604020202020204" pitchFamily="34" charset="0"/>
+                <a:cs typeface="Arial" panose="020B0604020202020204" pitchFamily="34" charset="0"/>
+              </a:rPr>
               <a:t>source tools.  </a:t>
             </a:r>
-            <a:endParaRPr lang="en-AU" sz="2400" dirty="0" smtClean="0"/>
-          </a:p>
-          <a:p>
-            <a:r>
-              <a:rPr lang="en-AU" sz="2400" dirty="0" smtClean="0"/>
+            <a:endParaRPr lang="en-AU" dirty="0" smtClean="0">
+              <a:latin typeface="Arial" panose="020B0604020202020204" pitchFamily="34" charset="0"/>
+              <a:cs typeface="Arial" panose="020B0604020202020204" pitchFamily="34" charset="0"/>
+            </a:endParaRPr>
+          </a:p>
+          <a:p>
+            <a:r>
+              <a:rPr lang="en-AU" dirty="0" smtClean="0">
+                <a:latin typeface="Arial" panose="020B0604020202020204" pitchFamily="34" charset="0"/>
+                <a:cs typeface="Arial" panose="020B0604020202020204" pitchFamily="34" charset="0"/>
+              </a:rPr>
               <a:t>These </a:t>
             </a:r>
             <a:r>
-              <a:rPr lang="en-AU" sz="2400" dirty="0"/>
+              <a:rPr lang="en-AU" dirty="0">
+                <a:latin typeface="Arial" panose="020B0604020202020204" pitchFamily="34" charset="0"/>
+                <a:cs typeface="Arial" panose="020B0604020202020204" pitchFamily="34" charset="0"/>
+              </a:rPr>
               <a:t>are </a:t>
             </a:r>
             <a:r>
-              <a:rPr lang="en-AU" sz="2400" dirty="0" err="1"/>
+              <a:rPr lang="en-AU" dirty="0" err="1">
+                <a:latin typeface="Arial" panose="020B0604020202020204" pitchFamily="34" charset="0"/>
+                <a:cs typeface="Arial" panose="020B0604020202020204" pitchFamily="34" charset="0"/>
+              </a:rPr>
               <a:t>Virtualbox</a:t>
             </a:r>
             <a:r>
-              <a:rPr lang="en-AU" sz="2400" dirty="0"/>
+              <a:rPr lang="en-AU" dirty="0">
+                <a:latin typeface="Arial" panose="020B0604020202020204" pitchFamily="34" charset="0"/>
+                <a:cs typeface="Arial" panose="020B0604020202020204" pitchFamily="34" charset="0"/>
+              </a:rPr>
               <a:t>, Vagrant and Git.</a:t>
             </a:r>
           </a:p>
           <a:p>
-            <a:endParaRPr lang="en-AU" sz="2400" dirty="0">
+            <a:endParaRPr lang="en-AU" dirty="0">
+              <a:latin typeface="Arial" panose="020B0604020202020204" pitchFamily="34" charset="0"/>
+              <a:cs typeface="Arial" panose="020B0604020202020204" pitchFamily="34" charset="0"/>
               <a:hlinkClick r:id="rId2"/>
             </a:endParaRPr>
           </a:p>
@@ -7619,19 +7629,36 @@
               <a:buChar char="•"/>
             </a:pPr>
             <a:r>
-              <a:rPr lang="en-AU" sz="2400" dirty="0">
+              <a:rPr lang="en-AU" dirty="0">
+                <a:solidFill>
+                  <a:srgbClr val="0070C0"/>
+                </a:solidFill>
+                <a:latin typeface="Arial" panose="020B0604020202020204" pitchFamily="34" charset="0"/>
+                <a:cs typeface="Arial" panose="020B0604020202020204" pitchFamily="34" charset="0"/>
                 <a:hlinkClick r:id="rId2"/>
               </a:rPr>
               <a:t>https://www.virtualbox.org/</a:t>
             </a:r>
-            <a:endParaRPr lang="en-AU" sz="2400" dirty="0"/>
+            <a:endParaRPr lang="en-AU" dirty="0">
+              <a:solidFill>
+                <a:srgbClr val="0070C0"/>
+              </a:solidFill>
+              <a:latin typeface="Arial" panose="020B0604020202020204" pitchFamily="34" charset="0"/>
+              <a:cs typeface="Arial" panose="020B0604020202020204" pitchFamily="34" charset="0"/>
+            </a:endParaRPr>
           </a:p>
           <a:p>
             <a:pPr marL="342900" indent="-342900">
               <a:buFont typeface="Arial" panose="020B0604020202020204" pitchFamily="34" charset="0"/>
               <a:buChar char="•"/>
             </a:pPr>
-            <a:endParaRPr lang="en-AU" sz="2400" dirty="0"/>
+            <a:endParaRPr lang="en-AU" dirty="0">
+              <a:solidFill>
+                <a:srgbClr val="0070C0"/>
+              </a:solidFill>
+              <a:latin typeface="Arial" panose="020B0604020202020204" pitchFamily="34" charset="0"/>
+              <a:cs typeface="Arial" panose="020B0604020202020204" pitchFamily="34" charset="0"/>
+            </a:endParaRPr>
           </a:p>
           <a:p>
             <a:pPr marL="342900" indent="-342900">
@@ -7639,39 +7666,66 @@
               <a:buChar char="•"/>
             </a:pPr>
             <a:r>
-              <a:rPr lang="en-AU" sz="2400" dirty="0">
+              <a:rPr lang="en-AU" dirty="0">
+                <a:solidFill>
+                  <a:srgbClr val="0070C0"/>
+                </a:solidFill>
+                <a:latin typeface="Arial" panose="020B0604020202020204" pitchFamily="34" charset="0"/>
+                <a:cs typeface="Arial" panose="020B0604020202020204" pitchFamily="34" charset="0"/>
                 <a:hlinkClick r:id="rId3"/>
               </a:rPr>
               <a:t>https://www.vagrantup.com/downloads.html</a:t>
             </a:r>
-            <a:endParaRPr lang="en-AU" sz="2400" dirty="0"/>
-          </a:p>
-          <a:p>
-            <a:endParaRPr lang="en-AU" sz="2400" u="sng" dirty="0"/>
-          </a:p>
-          <a:p>
-            <a:r>
-              <a:rPr lang="en-AU" sz="2400" dirty="0" err="1"/>
+            <a:endParaRPr lang="en-AU" dirty="0">
+              <a:solidFill>
+                <a:srgbClr val="0070C0"/>
+              </a:solidFill>
+              <a:latin typeface="Arial" panose="020B0604020202020204" pitchFamily="34" charset="0"/>
+              <a:cs typeface="Arial" panose="020B0604020202020204" pitchFamily="34" charset="0"/>
+            </a:endParaRPr>
+          </a:p>
+          <a:p>
+            <a:endParaRPr lang="en-AU" u="sng" dirty="0">
+              <a:latin typeface="Arial" panose="020B0604020202020204" pitchFamily="34" charset="0"/>
+              <a:cs typeface="Arial" panose="020B0604020202020204" pitchFamily="34" charset="0"/>
+            </a:endParaRPr>
+          </a:p>
+          <a:p>
+            <a:r>
+              <a:rPr lang="en-AU" dirty="0" err="1">
+                <a:latin typeface="Arial" panose="020B0604020202020204" pitchFamily="34" charset="0"/>
+                <a:cs typeface="Arial" panose="020B0604020202020204" pitchFamily="34" charset="0"/>
+              </a:rPr>
               <a:t>Macbooks</a:t>
             </a:r>
             <a:r>
-              <a:rPr lang="en-AU" sz="2400" dirty="0"/>
+              <a:rPr lang="en-AU" dirty="0">
+                <a:latin typeface="Arial" panose="020B0604020202020204" pitchFamily="34" charset="0"/>
+                <a:cs typeface="Arial" panose="020B0604020202020204" pitchFamily="34" charset="0"/>
+              </a:rPr>
               <a:t> typically have git installed.</a:t>
             </a:r>
           </a:p>
           <a:p>
-            <a:endParaRPr lang="en-AU" sz="2400" dirty="0">
-              <a:cs typeface="Calibri"/>
+            <a:endParaRPr lang="en-AU" dirty="0">
+              <a:latin typeface="Arial" panose="020B0604020202020204" pitchFamily="34" charset="0"/>
+              <a:cs typeface="Arial" panose="020B0604020202020204" pitchFamily="34" charset="0"/>
             </a:endParaRPr>
           </a:p>
           <a:p>
             <a:r>
-              <a:rPr lang="en-AU" sz="2400" dirty="0"/>
+              <a:rPr lang="en-AU" dirty="0">
+                <a:latin typeface="Arial" panose="020B0604020202020204" pitchFamily="34" charset="0"/>
+                <a:cs typeface="Arial" panose="020B0604020202020204" pitchFamily="34" charset="0"/>
+              </a:rPr>
               <a:t>Windows may or may not have git installed if not here is a link.</a:t>
             </a:r>
           </a:p>
           <a:p>
-            <a:endParaRPr lang="en-AU" sz="2400" dirty="0"/>
+            <a:endParaRPr lang="en-AU" dirty="0">
+              <a:latin typeface="Arial" panose="020B0604020202020204" pitchFamily="34" charset="0"/>
+              <a:cs typeface="Arial" panose="020B0604020202020204" pitchFamily="34" charset="0"/>
+            </a:endParaRPr>
           </a:p>
           <a:p>
             <a:pPr marL="342900" indent="-342900">
@@ -7679,12 +7733,23 @@
               <a:buChar char="•"/>
             </a:pPr>
             <a:r>
-              <a:rPr lang="en-AU" sz="2400" dirty="0">
+              <a:rPr lang="en-AU" b="1" dirty="0">
+                <a:solidFill>
+                  <a:srgbClr val="0070C0"/>
+                </a:solidFill>
+                <a:latin typeface="Arial" panose="020B0604020202020204" pitchFamily="34" charset="0"/>
+                <a:cs typeface="Arial" panose="020B0604020202020204" pitchFamily="34" charset="0"/>
                 <a:hlinkClick r:id="rId4"/>
               </a:rPr>
               <a:t>https://gitforwindows.org/</a:t>
             </a:r>
-            <a:endParaRPr lang="en-AU" sz="2400" dirty="0"/>
+            <a:endParaRPr lang="en-AU" b="1" dirty="0">
+              <a:solidFill>
+                <a:srgbClr val="0070C0"/>
+              </a:solidFill>
+              <a:latin typeface="Arial" panose="020B0604020202020204" pitchFamily="34" charset="0"/>
+              <a:cs typeface="Arial" panose="020B0604020202020204" pitchFamily="34" charset="0"/>
+            </a:endParaRPr>
           </a:p>
           <a:p>
             <a:endParaRPr lang="en-AU" sz="2400" dirty="0"/>
@@ -7876,25 +7941,24 @@
           <a:lstStyle/>
           <a:p>
             <a:r>
-              <a:rPr lang="en-AU" dirty="0" smtClean="0"/>
-              <a:t>Enter the command “</a:t>
-            </a:r>
-            <a:r>
-              <a:rPr lang="en-AU" dirty="0" smtClean="0">
-                <a:latin typeface="Lucida Sans" panose="020B0602030504020204" pitchFamily="34" charset="0"/>
-              </a:rPr>
-              <a:t>vagrant –v</a:t>
-            </a:r>
-            <a:r>
-              <a:rPr lang="en-AU" dirty="0" smtClean="0"/>
-              <a:t>” </a:t>
-            </a:r>
-          </a:p>
-          <a:p>
-            <a:endParaRPr lang="en-AU" dirty="0" smtClean="0"/>
-          </a:p>
-          <a:p>
-            <a:endParaRPr lang="en-AU" dirty="0"/>
+              <a:rPr lang="en-AU" dirty="0" smtClean="0">
+                <a:latin typeface="Arial" panose="020B0604020202020204" pitchFamily="34" charset="0"/>
+                <a:cs typeface="Arial" panose="020B0604020202020204" pitchFamily="34" charset="0"/>
+              </a:rPr>
+              <a:t>Enter the command “vagrant –v” </a:t>
+            </a:r>
+          </a:p>
+          <a:p>
+            <a:endParaRPr lang="en-AU" dirty="0" smtClean="0">
+              <a:latin typeface="Arial" panose="020B0604020202020204" pitchFamily="34" charset="0"/>
+              <a:cs typeface="Arial" panose="020B0604020202020204" pitchFamily="34" charset="0"/>
+            </a:endParaRPr>
+          </a:p>
+          <a:p>
+            <a:endParaRPr lang="en-AU" dirty="0">
+              <a:latin typeface="Arial" panose="020B0604020202020204" pitchFamily="34" charset="0"/>
+              <a:cs typeface="Arial" panose="020B0604020202020204" pitchFamily="34" charset="0"/>
+            </a:endParaRPr>
           </a:p>
         </p:txBody>
       </p:sp>
@@ -7906,7 +7970,7 @@
         </p:nvSpPr>
         <p:spPr>
           <a:xfrm>
-            <a:off x="1008529" y="5647764"/>
+            <a:off x="1008529" y="5360072"/>
             <a:ext cx="7221071" cy="646331"/>
           </a:xfrm>
           <a:prstGeom prst="rect">
@@ -7921,7 +7985,10 @@
           <a:lstStyle/>
           <a:p>
             <a:r>
-              <a:rPr lang="en-AU" dirty="0" smtClean="0"/>
+              <a:rPr lang="en-AU" dirty="0" smtClean="0">
+                <a:latin typeface="Arial" panose="020B0604020202020204" pitchFamily="34" charset="0"/>
+                <a:cs typeface="Arial" panose="020B0604020202020204" pitchFamily="34" charset="0"/>
+              </a:rPr>
               <a:t>If it returns the version number as shown above you are almost there!  Next test if git is installed. </a:t>
             </a:r>
           </a:p>
@@ -8017,11 +8084,7 @@
             <a:pPr algn="l"/>
             <a:r>
               <a:rPr lang="en-AU" dirty="0" smtClean="0"/>
-              <a:t>Test for git </a:t>
-            </a:r>
-            <a:r>
-              <a:rPr lang="en-AU" dirty="0" smtClean="0"/>
-              <a:t>on Windows	</a:t>
+              <a:t>Test for git on Windows	</a:t>
             </a:r>
             <a:endParaRPr lang="en-AU" dirty="0"/>
           </a:p>
@@ -8081,38 +8144,51 @@
           <a:p>
             <a:pPr algn="ctr"/>
             <a:r>
-              <a:rPr lang="en-AU" dirty="0" smtClean="0"/>
+              <a:rPr lang="en-AU" dirty="0" smtClean="0">
+                <a:latin typeface="Arial" panose="020B0604020202020204" pitchFamily="34" charset="0"/>
+                <a:cs typeface="Arial" panose="020B0604020202020204" pitchFamily="34" charset="0"/>
+              </a:rPr>
               <a:t>If it is does return something similar to the example shown.  </a:t>
             </a:r>
             <a:r>
-              <a:rPr lang="en-AU" dirty="0"/>
+              <a:rPr lang="en-AU" dirty="0">
+                <a:latin typeface="Arial" panose="020B0604020202020204" pitchFamily="34" charset="0"/>
+                <a:cs typeface="Arial" panose="020B0604020202020204" pitchFamily="34" charset="0"/>
+              </a:rPr>
               <a:t>H</a:t>
             </a:r>
             <a:r>
-              <a:rPr lang="en-AU" dirty="0" smtClean="0"/>
+              <a:rPr lang="en-AU" dirty="0" smtClean="0">
+                <a:latin typeface="Arial" panose="020B0604020202020204" pitchFamily="34" charset="0"/>
+                <a:cs typeface="Arial" panose="020B0604020202020204" pitchFamily="34" charset="0"/>
+              </a:rPr>
               <a:t>ere </a:t>
             </a:r>
             <a:r>
-              <a:rPr lang="en-AU" dirty="0"/>
+              <a:rPr lang="en-AU" dirty="0">
+                <a:latin typeface="Arial" panose="020B0604020202020204" pitchFamily="34" charset="0"/>
+                <a:cs typeface="Arial" panose="020B0604020202020204" pitchFamily="34" charset="0"/>
+              </a:rPr>
               <a:t>is a </a:t>
             </a:r>
             <a:r>
-              <a:rPr lang="en-AU" dirty="0" smtClean="0"/>
-              <a:t>link to the </a:t>
-            </a:r>
-            <a:r>
-              <a:rPr lang="en-AU" dirty="0" smtClean="0"/>
-              <a:t>current version (2.30.1) of the software. I</a:t>
-            </a:r>
-            <a:r>
-              <a:rPr lang="en-AU" dirty="0" smtClean="0"/>
-              <a:t>t does not need to be the exact same version as shown!</a:t>
-            </a:r>
-            <a:endParaRPr lang="en-AU" dirty="0"/>
+              <a:rPr lang="en-AU" dirty="0" smtClean="0">
+                <a:latin typeface="Arial" panose="020B0604020202020204" pitchFamily="34" charset="0"/>
+                <a:cs typeface="Arial" panose="020B0604020202020204" pitchFamily="34" charset="0"/>
+              </a:rPr>
+              <a:t>link to the current version (2.30.1) of the software. It does not need to be the exact same version as shown!</a:t>
+            </a:r>
+            <a:endParaRPr lang="en-AU" dirty="0">
+              <a:latin typeface="Arial" panose="020B0604020202020204" pitchFamily="34" charset="0"/>
+              <a:cs typeface="Arial" panose="020B0604020202020204" pitchFamily="34" charset="0"/>
+            </a:endParaRPr>
           </a:p>
           <a:p>
             <a:pPr algn="ctr"/>
-            <a:endParaRPr lang="en-AU" dirty="0"/>
+            <a:endParaRPr lang="en-AU" dirty="0">
+              <a:latin typeface="Arial" panose="020B0604020202020204" pitchFamily="34" charset="0"/>
+              <a:cs typeface="Arial" panose="020B0604020202020204" pitchFamily="34" charset="0"/>
+            </a:endParaRPr>
           </a:p>
           <a:p>
             <a:pPr marL="342900" indent="-342900" algn="ctr">
@@ -8121,17 +8197,33 @@
             </a:pPr>
             <a:r>
               <a:rPr lang="en-AU" sz="2400" dirty="0">
+                <a:solidFill>
+                  <a:srgbClr val="00B050"/>
+                </a:solidFill>
+                <a:latin typeface="Arial" panose="020B0604020202020204" pitchFamily="34" charset="0"/>
+                <a:cs typeface="Arial" panose="020B0604020202020204" pitchFamily="34" charset="0"/>
                 <a:hlinkClick r:id="rId3"/>
               </a:rPr>
               <a:t>https://gitforwindows.org</a:t>
             </a:r>
             <a:r>
               <a:rPr lang="en-AU" sz="2400" dirty="0" smtClean="0">
+                <a:solidFill>
+                  <a:srgbClr val="00B050"/>
+                </a:solidFill>
+                <a:latin typeface="Arial" panose="020B0604020202020204" pitchFamily="34" charset="0"/>
+                <a:cs typeface="Arial" panose="020B0604020202020204" pitchFamily="34" charset="0"/>
                 <a:hlinkClick r:id="rId3"/>
               </a:rPr>
               <a:t>/</a:t>
             </a:r>
-            <a:endParaRPr lang="en-AU" sz="2400" dirty="0" smtClean="0"/>
+            <a:endParaRPr lang="en-AU" sz="2400" dirty="0" smtClean="0">
+              <a:solidFill>
+                <a:srgbClr val="00B050"/>
+              </a:solidFill>
+              <a:latin typeface="Arial" panose="020B0604020202020204" pitchFamily="34" charset="0"/>
+              <a:cs typeface="Arial" panose="020B0604020202020204" pitchFamily="34" charset="0"/>
+            </a:endParaRPr>
           </a:p>
           <a:p>
             <a:endParaRPr lang="en-AU" sz="2400" dirty="0" smtClean="0"/>
@@ -8147,7 +8239,7 @@
         <p:spPr>
           <a:xfrm>
             <a:off x="913775" y="1482851"/>
-            <a:ext cx="6608284" cy="369332"/>
+            <a:ext cx="7532896" cy="369332"/>
           </a:xfrm>
           <a:prstGeom prst="rect">
             <a:avLst/>
@@ -8161,21 +8253,28 @@
           <a:lstStyle/>
           <a:p>
             <a:r>
-              <a:rPr lang="en-AU" dirty="0" smtClean="0"/>
+              <a:rPr lang="en-AU" dirty="0" smtClean="0">
+                <a:latin typeface="Arial" panose="020B0604020202020204" pitchFamily="34" charset="0"/>
+                <a:cs typeface="Arial" panose="020B0604020202020204" pitchFamily="34" charset="0"/>
+              </a:rPr>
               <a:t>To check if Git is install on your computer us the command </a:t>
             </a:r>
             <a:r>
-              <a:rPr lang="en-AU" dirty="0" smtClean="0">
+              <a:rPr lang="en-AU" b="1" dirty="0" smtClean="0">
                 <a:solidFill>
-                  <a:srgbClr val="FFFF00"/>
+                  <a:srgbClr val="0070C0"/>
                 </a:solidFill>
+                <a:latin typeface="Arial" panose="020B0604020202020204" pitchFamily="34" charset="0"/>
+                <a:cs typeface="Arial" panose="020B0604020202020204" pitchFamily="34" charset="0"/>
               </a:rPr>
               <a:t>git --version</a:t>
             </a:r>
-            <a:endParaRPr lang="en-AU" dirty="0">
+            <a:endParaRPr lang="en-AU" b="1" dirty="0">
               <a:solidFill>
-                <a:srgbClr val="FFFF00"/>
+                <a:srgbClr val="0070C0"/>
               </a:solidFill>
+              <a:latin typeface="Arial" panose="020B0604020202020204" pitchFamily="34" charset="0"/>
+              <a:cs typeface="Arial" panose="020B0604020202020204" pitchFamily="34" charset="0"/>
             </a:endParaRPr>
           </a:p>
         </p:txBody>
@@ -8219,7 +8318,7 @@
         <p:spPr>
           <a:xfrm>
             <a:off x="6731540" y="4562272"/>
-            <a:ext cx="4423903" cy="369332"/>
+            <a:ext cx="4522135" cy="369332"/>
           </a:xfrm>
           <a:prstGeom prst="rect">
             <a:avLst/>
@@ -8233,16 +8332,16 @@
           <a:lstStyle/>
           <a:p>
             <a:r>
-              <a:rPr lang="en-AU" dirty="0" smtClean="0">
+              <a:rPr lang="en-AU" b="1" dirty="0" smtClean="0">
                 <a:solidFill>
-                  <a:srgbClr val="92D050"/>
+                  <a:srgbClr val="00B050"/>
                 </a:solidFill>
               </a:rPr>
               <a:t>Recommend the 64-bit Git for Windows Setup</a:t>
             </a:r>
-            <a:endParaRPr lang="en-AU" dirty="0">
+            <a:endParaRPr lang="en-AU" b="1" dirty="0">
               <a:solidFill>
-                <a:srgbClr val="92D050"/>
+                <a:srgbClr val="00B050"/>
               </a:solidFill>
             </a:endParaRPr>
           </a:p>
@@ -8351,8 +8450,8 @@
         </p:nvSpPr>
         <p:spPr>
           <a:xfrm>
-            <a:off x="797747" y="2054681"/>
-            <a:ext cx="5147178" cy="2308324"/>
+            <a:off x="607247" y="2054681"/>
+            <a:ext cx="6186309" cy="2308324"/>
           </a:xfrm>
           <a:prstGeom prst="rect">
             <a:avLst/>
@@ -8370,30 +8469,43 @@
                 <a:solidFill>
                   <a:srgbClr val="FF0000"/>
                 </a:solidFill>
+                <a:latin typeface="Arial" panose="020B0604020202020204" pitchFamily="34" charset="0"/>
+                <a:cs typeface="Arial" panose="020B0604020202020204" pitchFamily="34" charset="0"/>
               </a:rPr>
               <a:t>CAUTION!!</a:t>
             </a:r>
           </a:p>
           <a:p>
             <a:r>
-              <a:rPr lang="en-AU" dirty="0" smtClean="0"/>
+              <a:rPr lang="en-AU" dirty="0" smtClean="0">
+                <a:latin typeface="Arial" panose="020B0604020202020204" pitchFamily="34" charset="0"/>
+                <a:cs typeface="Arial" panose="020B0604020202020204" pitchFamily="34" charset="0"/>
+              </a:rPr>
               <a:t>In the Git Setup /</a:t>
             </a:r>
             <a:r>
-              <a:rPr lang="en-AU" dirty="0"/>
+              <a:rPr lang="en-AU" dirty="0">
+                <a:latin typeface="Arial" panose="020B0604020202020204" pitchFamily="34" charset="0"/>
+                <a:cs typeface="Arial" panose="020B0604020202020204" pitchFamily="34" charset="0"/>
+              </a:rPr>
               <a:t> </a:t>
             </a:r>
             <a:r>
-              <a:rPr lang="en-AU" dirty="0" smtClean="0"/>
+              <a:rPr lang="en-AU" dirty="0" smtClean="0">
+                <a:latin typeface="Arial" panose="020B0604020202020204" pitchFamily="34" charset="0"/>
+                <a:cs typeface="Arial" panose="020B0604020202020204" pitchFamily="34" charset="0"/>
+              </a:rPr>
               <a:t>installation step:</a:t>
             </a:r>
           </a:p>
           <a:p>
             <a:r>
-              <a:rPr lang="en-AU" dirty="0" smtClean="0">
+              <a:rPr lang="en-AU" b="1" dirty="0" smtClean="0">
                 <a:solidFill>
-                  <a:srgbClr val="FFFF00"/>
+                  <a:srgbClr val="002060"/>
                 </a:solidFill>
+                <a:latin typeface="Arial" panose="020B0604020202020204" pitchFamily="34" charset="0"/>
+                <a:cs typeface="Arial" panose="020B0604020202020204" pitchFamily="34" charset="0"/>
               </a:rPr>
               <a:t>Configuring the terminal emulator to use with Git Bash</a:t>
             </a:r>
@@ -8403,11 +8515,16 @@
               <a:solidFill>
                 <a:srgbClr val="FFFF00"/>
               </a:solidFill>
+              <a:latin typeface="Arial" panose="020B0604020202020204" pitchFamily="34" charset="0"/>
+              <a:cs typeface="Arial" panose="020B0604020202020204" pitchFamily="34" charset="0"/>
             </a:endParaRPr>
           </a:p>
           <a:p>
             <a:r>
-              <a:rPr lang="en-AU" dirty="0" smtClean="0"/>
+              <a:rPr lang="en-AU" dirty="0" smtClean="0">
+                <a:latin typeface="Arial" panose="020B0604020202020204" pitchFamily="34" charset="0"/>
+                <a:cs typeface="Arial" panose="020B0604020202020204" pitchFamily="34" charset="0"/>
+              </a:rPr>
               <a:t>Select the “</a:t>
             </a:r>
             <a:r>
@@ -8415,32 +8532,34 @@
                 <a:solidFill>
                   <a:srgbClr val="00B050"/>
                 </a:solidFill>
+                <a:latin typeface="Arial" panose="020B0604020202020204" pitchFamily="34" charset="0"/>
+                <a:cs typeface="Arial" panose="020B0604020202020204" pitchFamily="34" charset="0"/>
               </a:rPr>
               <a:t>Use Windows’ default console window</a:t>
             </a:r>
             <a:r>
-              <a:rPr lang="en-AU" dirty="0" smtClean="0"/>
+              <a:rPr lang="en-AU" dirty="0" smtClean="0">
+                <a:latin typeface="Arial" panose="020B0604020202020204" pitchFamily="34" charset="0"/>
+                <a:cs typeface="Arial" panose="020B0604020202020204" pitchFamily="34" charset="0"/>
+              </a:rPr>
               <a:t>”  </a:t>
             </a:r>
           </a:p>
           <a:p>
             <a:r>
-              <a:rPr lang="en-AU" dirty="0" smtClean="0"/>
-              <a:t>Not the </a:t>
-            </a:r>
-            <a:r>
-              <a:rPr lang="en-AU" smtClean="0"/>
-              <a:t>default which is </a:t>
-            </a:r>
-            <a:r>
-              <a:rPr lang="en-AU" dirty="0" smtClean="0"/>
-              <a:t>set to “</a:t>
+              <a:rPr lang="en-AU" dirty="0" smtClean="0">
+                <a:latin typeface="Arial" panose="020B0604020202020204" pitchFamily="34" charset="0"/>
+                <a:cs typeface="Arial" panose="020B0604020202020204" pitchFamily="34" charset="0"/>
+              </a:rPr>
+              <a:t>Not the default which is set to “</a:t>
             </a:r>
             <a:r>
               <a:rPr lang="en-AU" dirty="0" smtClean="0">
                 <a:solidFill>
                   <a:srgbClr val="FF0000"/>
                 </a:solidFill>
+                <a:latin typeface="Arial" panose="020B0604020202020204" pitchFamily="34" charset="0"/>
+                <a:cs typeface="Arial" panose="020B0604020202020204" pitchFamily="34" charset="0"/>
               </a:rPr>
               <a:t>Use </a:t>
             </a:r>
@@ -8449,19 +8568,30 @@
                 <a:solidFill>
                   <a:srgbClr val="FF0000"/>
                 </a:solidFill>
+                <a:latin typeface="Arial" panose="020B0604020202020204" pitchFamily="34" charset="0"/>
+                <a:cs typeface="Arial" panose="020B0604020202020204" pitchFamily="34" charset="0"/>
               </a:rPr>
               <a:t>MinTTY</a:t>
             </a:r>
             <a:r>
-              <a:rPr lang="en-AU" dirty="0" smtClean="0"/>
+              <a:rPr lang="en-AU" dirty="0" smtClean="0">
+                <a:latin typeface="Arial" panose="020B0604020202020204" pitchFamily="34" charset="0"/>
+                <a:cs typeface="Arial" panose="020B0604020202020204" pitchFamily="34" charset="0"/>
+              </a:rPr>
               <a:t>” </a:t>
             </a:r>
           </a:p>
           <a:p>
-            <a:endParaRPr lang="en-AU" dirty="0" smtClean="0"/>
-          </a:p>
-          <a:p>
-            <a:endParaRPr lang="en-AU" dirty="0"/>
+            <a:endParaRPr lang="en-AU" dirty="0" smtClean="0">
+              <a:latin typeface="Arial" panose="020B0604020202020204" pitchFamily="34" charset="0"/>
+              <a:cs typeface="Arial" panose="020B0604020202020204" pitchFamily="34" charset="0"/>
+            </a:endParaRPr>
+          </a:p>
+          <a:p>
+            <a:endParaRPr lang="en-AU" dirty="0">
+              <a:latin typeface="Arial" panose="020B0604020202020204" pitchFamily="34" charset="0"/>
+              <a:cs typeface="Arial" panose="020B0604020202020204" pitchFamily="34" charset="0"/>
+            </a:endParaRPr>
           </a:p>
         </p:txBody>
       </p:sp>
@@ -8487,7 +8617,7 @@
         </p:blipFill>
         <p:spPr>
           <a:xfrm>
-            <a:off x="6539133" y="2054681"/>
+            <a:off x="6958233" y="2054681"/>
             <a:ext cx="3895537" cy="3128436"/>
           </a:xfrm>
           <a:prstGeom prst="rect">
@@ -8906,18 +9036,30 @@
           <a:lstStyle/>
           <a:p>
             <a:r>
-              <a:rPr lang="en-AU" dirty="0" smtClean="0"/>
+              <a:rPr lang="en-AU" dirty="0" smtClean="0">
+                <a:latin typeface="Arial" panose="020B0604020202020204" pitchFamily="34" charset="0"/>
+                <a:cs typeface="Arial" panose="020B0604020202020204" pitchFamily="34" charset="0"/>
+              </a:rPr>
               <a:t>Step 2: clone the vagrant file repository from </a:t>
             </a:r>
             <a:r>
-              <a:rPr lang="en-AU" dirty="0" err="1" smtClean="0"/>
+              <a:rPr lang="en-AU" dirty="0" err="1" smtClean="0">
+                <a:latin typeface="Arial" panose="020B0604020202020204" pitchFamily="34" charset="0"/>
+                <a:cs typeface="Arial" panose="020B0604020202020204" pitchFamily="34" charset="0"/>
+              </a:rPr>
               <a:t>github</a:t>
             </a:r>
-            <a:endParaRPr lang="en-AU" dirty="0" smtClean="0"/>
-          </a:p>
-          <a:p>
-            <a:r>
-              <a:rPr lang="en-AU" dirty="0" smtClean="0"/>
+            <a:endParaRPr lang="en-AU" dirty="0" smtClean="0">
+              <a:latin typeface="Arial" panose="020B0604020202020204" pitchFamily="34" charset="0"/>
+              <a:cs typeface="Arial" panose="020B0604020202020204" pitchFamily="34" charset="0"/>
+            </a:endParaRPr>
+          </a:p>
+          <a:p>
+            <a:r>
+              <a:rPr lang="en-AU" dirty="0" smtClean="0">
+                <a:latin typeface="Arial" panose="020B0604020202020204" pitchFamily="34" charset="0"/>
+                <a:cs typeface="Arial" panose="020B0604020202020204" pitchFamily="34" charset="0"/>
+              </a:rPr>
               <a:t>For Windows and Macs this step the command is identical.</a:t>
             </a:r>
           </a:p>
@@ -8925,21 +9067,21 @@
             <a:pPr lvl="1"/>
             <a:r>
               <a:rPr lang="en-AU" dirty="0" smtClean="0">
-                <a:latin typeface="Lucida Sans" panose="020B0602030504020204" pitchFamily="34" charset="0"/>
+                <a:latin typeface="Arial" panose="020B0604020202020204" pitchFamily="34" charset="0"/>
                 <a:cs typeface="Arial" panose="020B0604020202020204" pitchFamily="34" charset="0"/>
               </a:rPr>
               <a:t>% git clone https</a:t>
             </a:r>
             <a:r>
               <a:rPr lang="en-AU" dirty="0">
-                <a:latin typeface="Lucida Sans" panose="020B0602030504020204" pitchFamily="34" charset="0"/>
+                <a:latin typeface="Arial" panose="020B0604020202020204" pitchFamily="34" charset="0"/>
                 <a:cs typeface="Arial" panose="020B0604020202020204" pitchFamily="34" charset="0"/>
               </a:rPr>
               <a:t>://</a:t>
             </a:r>
             <a:r>
               <a:rPr lang="en-AU" dirty="0" smtClean="0">
-                <a:latin typeface="Lucida Sans" panose="020B0602030504020204" pitchFamily="34" charset="0"/>
+                <a:latin typeface="Arial" panose="020B0604020202020204" pitchFamily="34" charset="0"/>
                 <a:cs typeface="Arial" panose="020B0604020202020204" pitchFamily="34" charset="0"/>
               </a:rPr>
               <a:t>github.com/adrianopolpo/stat1400.git</a:t>
@@ -8948,19 +9090,32 @@
           <a:p>
             <a:pPr lvl="1"/>
             <a:endParaRPr lang="en-AU" dirty="0" smtClean="0">
-              <a:latin typeface="Lucida Sans" panose="020B0602030504020204" pitchFamily="34" charset="0"/>
+              <a:latin typeface="Arial" panose="020B0604020202020204" pitchFamily="34" charset="0"/>
               <a:cs typeface="Arial" panose="020B0604020202020204" pitchFamily="34" charset="0"/>
             </a:endParaRPr>
           </a:p>
           <a:p>
-            <a:r>
-              <a:rPr lang="en-AU" dirty="0" smtClean="0"/>
+            <a:pPr lvl="1"/>
+            <a:endParaRPr lang="en-AU" dirty="0" smtClean="0">
+              <a:latin typeface="Arial" panose="020B0604020202020204" pitchFamily="34" charset="0"/>
+              <a:cs typeface="Arial" panose="020B0604020202020204" pitchFamily="34" charset="0"/>
+            </a:endParaRPr>
+          </a:p>
+          <a:p>
+            <a:r>
+              <a:rPr lang="en-AU" dirty="0" smtClean="0">
+                <a:latin typeface="Arial" panose="020B0604020202020204" pitchFamily="34" charset="0"/>
+                <a:cs typeface="Arial" panose="020B0604020202020204" pitchFamily="34" charset="0"/>
+              </a:rPr>
               <a:t>To verify that the command worked you can inspect the current directory for the new folder.</a:t>
             </a:r>
           </a:p>
           <a:p>
             <a:r>
-              <a:rPr lang="en-AU" dirty="0" smtClean="0"/>
+              <a:rPr lang="en-AU" dirty="0" smtClean="0">
+                <a:latin typeface="Arial" panose="020B0604020202020204" pitchFamily="34" charset="0"/>
+                <a:cs typeface="Arial" panose="020B0604020202020204" pitchFamily="34" charset="0"/>
+              </a:rPr>
               <a:t>On Windows:</a:t>
             </a:r>
           </a:p>
@@ -8971,7 +9126,7 @@
             </a:pPr>
             <a:r>
               <a:rPr lang="en-AU" dirty="0" err="1" smtClean="0">
-                <a:latin typeface="Lucida Sans" panose="020B0602030504020204" pitchFamily="34" charset="0"/>
+                <a:latin typeface="Arial" panose="020B0604020202020204" pitchFamily="34" charset="0"/>
                 <a:cs typeface="Arial" panose="020B0604020202020204" pitchFamily="34" charset="0"/>
               </a:rPr>
               <a:t>dir</a:t>
@@ -8981,24 +9136,29 @@
                 <a:latin typeface="Arial" panose="020B0604020202020204" pitchFamily="34" charset="0"/>
                 <a:cs typeface="Arial" panose="020B0604020202020204" pitchFamily="34" charset="0"/>
               </a:rPr>
-              <a:t> </a:t>
-            </a:r>
-            <a:r>
-              <a:rPr lang="en-AU" dirty="0" smtClean="0"/>
-              <a:t>   --- this shows all the files and sub-directories in the current folder</a:t>
-            </a:r>
-          </a:p>
-          <a:p>
-            <a:r>
-              <a:rPr lang="en-AU" dirty="0" smtClean="0"/>
+              <a:t>    --- this shows all the files and sub-directories in the current folder</a:t>
+            </a:r>
+          </a:p>
+          <a:p>
+            <a:r>
+              <a:rPr lang="en-AU" dirty="0" smtClean="0">
+                <a:latin typeface="Arial" panose="020B0604020202020204" pitchFamily="34" charset="0"/>
+                <a:cs typeface="Arial" panose="020B0604020202020204" pitchFamily="34" charset="0"/>
+              </a:rPr>
               <a:t>On </a:t>
             </a:r>
             <a:r>
-              <a:rPr lang="en-AU" dirty="0" err="1" smtClean="0"/>
+              <a:rPr lang="en-AU" dirty="0" err="1" smtClean="0">
+                <a:latin typeface="Arial" panose="020B0604020202020204" pitchFamily="34" charset="0"/>
+                <a:cs typeface="Arial" panose="020B0604020202020204" pitchFamily="34" charset="0"/>
+              </a:rPr>
               <a:t>Macbooks</a:t>
             </a:r>
             <a:r>
-              <a:rPr lang="en-AU" dirty="0" smtClean="0"/>
+              <a:rPr lang="en-AU" dirty="0" smtClean="0">
+                <a:latin typeface="Arial" panose="020B0604020202020204" pitchFamily="34" charset="0"/>
+                <a:cs typeface="Arial" panose="020B0604020202020204" pitchFamily="34" charset="0"/>
+              </a:rPr>
               <a:t>/Linux</a:t>
             </a:r>
           </a:p>
@@ -9009,39 +9169,38 @@
             </a:pPr>
             <a:r>
               <a:rPr lang="en-AU" dirty="0" smtClean="0">
-                <a:latin typeface="Lucida Sans" panose="020B0602030504020204" pitchFamily="34" charset="0"/>
-                <a:cs typeface="Arial" panose="020B0604020202020204" pitchFamily="34" charset="0"/>
-              </a:rPr>
-              <a:t>ls</a:t>
-            </a:r>
-            <a:r>
-              <a:rPr lang="en-AU" dirty="0" smtClean="0">
-                <a:latin typeface="Arial" panose="020B0604020202020204" pitchFamily="34" charset="0"/>
-                <a:cs typeface="Arial" panose="020B0604020202020204" pitchFamily="34" charset="0"/>
-              </a:rPr>
-              <a:t> </a:t>
-            </a:r>
-            <a:r>
-              <a:rPr lang="en-AU" dirty="0" smtClean="0"/>
-              <a:t> -- LIST so that is lower case L </a:t>
-            </a:r>
-            <a:endParaRPr lang="en-AU" dirty="0"/>
+                <a:latin typeface="Arial" panose="020B0604020202020204" pitchFamily="34" charset="0"/>
+                <a:cs typeface="Arial" panose="020B0604020202020204" pitchFamily="34" charset="0"/>
+              </a:rPr>
+              <a:t>ls  -- LIST so that is lower case L </a:t>
+            </a:r>
+            <a:endParaRPr lang="en-AU" dirty="0">
+              <a:latin typeface="Arial" panose="020B0604020202020204" pitchFamily="34" charset="0"/>
+              <a:cs typeface="Arial" panose="020B0604020202020204" pitchFamily="34" charset="0"/>
+            </a:endParaRPr>
           </a:p>
           <a:p>
             <a:pPr lvl="1"/>
-            <a:endParaRPr lang="en-AU" dirty="0" smtClean="0"/>
-          </a:p>
-          <a:p>
-            <a:r>
-              <a:rPr lang="en-AU" dirty="0" smtClean="0"/>
-              <a:t>You should see a directory stat1400.</a:t>
-            </a:r>
-          </a:p>
-          <a:p>
-            <a:endParaRPr lang="en-AU" dirty="0" smtClean="0"/>
-          </a:p>
-          <a:p>
-            <a:pPr lvl="1"/>
+            <a:endParaRPr lang="en-AU" dirty="0" smtClean="0">
+              <a:latin typeface="Arial" panose="020B0604020202020204" pitchFamily="34" charset="0"/>
+              <a:cs typeface="Arial" panose="020B0604020202020204" pitchFamily="34" charset="0"/>
+            </a:endParaRPr>
+          </a:p>
+          <a:p>
+            <a:r>
+              <a:rPr lang="en-AU" dirty="0" smtClean="0">
+                <a:latin typeface="Arial" panose="020B0604020202020204" pitchFamily="34" charset="0"/>
+                <a:cs typeface="Arial" panose="020B0604020202020204" pitchFamily="34" charset="0"/>
+              </a:rPr>
+              <a:t>You should see a directory stat1400</a:t>
+            </a:r>
+            <a:r>
+              <a:rPr lang="en-AU" dirty="0" smtClean="0">
+                <a:latin typeface="Arial" panose="020B0604020202020204" pitchFamily="34" charset="0"/>
+                <a:cs typeface="Arial" panose="020B0604020202020204" pitchFamily="34" charset="0"/>
+              </a:rPr>
+              <a:t>.</a:t>
+            </a:r>
             <a:endParaRPr lang="en-AU" dirty="0" smtClean="0"/>
           </a:p>
           <a:p>
@@ -9151,8 +9310,19 @@
                 <a:latin typeface="Lucida Sans" panose="020B0602030504020204" pitchFamily="34" charset="0"/>
                 <a:cs typeface="Arial" panose="020B0604020202020204" pitchFamily="34" charset="0"/>
               </a:rPr>
-              <a:t>% cd Course </a:t>
-            </a:r>
+              <a:t>% </a:t>
+            </a:r>
+            <a:r>
+              <a:rPr lang="en-AU" dirty="0" smtClean="0">
+                <a:latin typeface="Lucida Sans" panose="020B0602030504020204" pitchFamily="34" charset="0"/>
+                <a:cs typeface="Arial" panose="020B0604020202020204" pitchFamily="34" charset="0"/>
+              </a:rPr>
+              <a:t>cd stat1400</a:t>
+            </a:r>
+            <a:endParaRPr lang="en-AU" dirty="0" smtClean="0">
+              <a:latin typeface="Lucida Sans" panose="020B0602030504020204" pitchFamily="34" charset="0"/>
+              <a:cs typeface="Arial" panose="020B0604020202020204" pitchFamily="34" charset="0"/>
+            </a:endParaRPr>
           </a:p>
           <a:p>
             <a:r>
@@ -9599,34 +9769,34 @@
         <a:sysClr val="window" lastClr="FFFFFF"/>
       </a:lt1>
       <a:dk2>
-        <a:srgbClr val="4B4B4B"/>
+        <a:srgbClr val="1C647B"/>
       </a:dk2>
       <a:lt2>
-        <a:srgbClr val="B5B5B5"/>
+        <a:srgbClr val="98B7D3"/>
       </a:lt2>
       <a:accent1>
-        <a:srgbClr val="9AC43E"/>
+        <a:srgbClr val="274FA4"/>
       </a:accent1>
       <a:accent2>
-        <a:srgbClr val="44BA98"/>
+        <a:srgbClr val="48A8D0"/>
       </a:accent2>
       <a:accent3>
-        <a:srgbClr val="43A9D9"/>
+        <a:srgbClr val="53B18F"/>
       </a:accent3>
       <a:accent4>
-        <a:srgbClr val="6274D8"/>
+        <a:srgbClr val="D78D38"/>
       </a:accent4>
       <a:accent5>
-        <a:srgbClr val="AB54D7"/>
+        <a:srgbClr val="BA3F51"/>
       </a:accent5>
       <a:accent6>
-        <a:srgbClr val="D15B37"/>
+        <a:srgbClr val="AE52D9"/>
       </a:accent6>
       <a:hlink>
-        <a:srgbClr val="BFE962"/>
+        <a:srgbClr val="2AA2DA"/>
       </a:hlink>
       <a:folHlink>
-        <a:srgbClr val="C0D591"/>
+        <a:srgbClr val="76A3B8"/>
       </a:folHlink>
     </a:clrScheme>
     <a:fontScheme name="Droplet">
@@ -9846,28 +10016,13 @@
   <a:extraClrSchemeLst/>
   <a:extLst>
     <a:ext uri="{05A4C25C-085E-4340-85A3-A5531E510DB2}">
-      <thm15:themeFamily xmlns:thm15="http://schemas.microsoft.com/office/thememl/2012/main" name="Droplet" id="{8984A317-299A-4E50-B45D-BFC9EDE2337A}" vid="{892FADA9-420D-4323-A7A4-C1060166525B}"/>
+      <thm15:themeFamily xmlns:thm15="http://schemas.microsoft.com/office/thememl/2012/main" name="Droplet" id="{8984A317-299A-4E50-B45D-BFC9EDE2337A}" vid="{DEB094D4-7FD8-4F86-93D5-B0F1341EF586}"/>
     </a:ext>
   </a:extLst>
 </a:theme>
 </file>
 
 <file path=customXml/item1.xml><?xml version="1.0" encoding="utf-8"?>
-<p:properties xmlns:p="http://schemas.microsoft.com/office/2006/metadata/properties" xmlns:xsi="http://www.w3.org/2001/XMLSchema-instance" xmlns:pc="http://schemas.microsoft.com/office/infopath/2007/PartnerControls">
-  <documentManagement/>
-</p:properties>
-</file>
-
-<file path=customXml/item2.xml><?xml version="1.0" encoding="utf-8"?>
-<?mso-contentType ?>
-<FormTemplates xmlns="http://schemas.microsoft.com/sharepoint/v3/contenttype/forms">
-  <Display>DocumentLibraryForm</Display>
-  <Edit>DocumentLibraryForm</Edit>
-  <New>DocumentLibraryForm</New>
-</FormTemplates>
-</file>
-
-<file path=customXml/item3.xml><?xml version="1.0" encoding="utf-8"?>
 <ct:contentTypeSchema xmlns:ct="http://schemas.microsoft.com/office/2006/metadata/contentType" xmlns:ma="http://schemas.microsoft.com/office/2006/metadata/properties/metaAttributes" ct:_="" ma:_="" ma:contentTypeName="Document" ma:contentTypeID="0x0101000C3F0734F22D774883C052A360730DF9" ma:contentTypeVersion="7" ma:contentTypeDescription="Create a new document." ma:contentTypeScope="" ma:versionID="68dbab044d50f9bfa9580c1de6249254">
   <xsd:schema xmlns:xsd="http://www.w3.org/2001/XMLSchema" xmlns:xs="http://www.w3.org/2001/XMLSchema" xmlns:p="http://schemas.microsoft.com/office/2006/metadata/properties" xmlns:ns3="c0477a94-a81b-4865-9707-6c9300ae147f" xmlns:ns4="45fda36c-df07-4f55-9922-29409b58d9d3" targetNamespace="http://schemas.microsoft.com/office/2006/metadata/properties" ma:root="true" ma:fieldsID="ea92a476c86701b878abbd8645c4be93" ns3:_="" ns4:_="">
     <xsd:import namespace="c0477a94-a81b-4865-9707-6c9300ae147f"/>
@@ -10052,32 +10207,22 @@
 </ct:contentTypeSchema>
 </file>
 
-<file path=customXml/itemProps1.xml><?xml version="1.0" encoding="utf-8"?>
-<ds:datastoreItem xmlns:ds="http://schemas.openxmlformats.org/officeDocument/2006/customXml" ds:itemID="{DC2CE541-9384-4F78-A2DC-081CEDD5EAE8}">
-  <ds:schemaRefs>
-    <ds:schemaRef ds:uri="http://purl.org/dc/elements/1.1/"/>
-    <ds:schemaRef ds:uri="http://schemas.microsoft.com/office/2006/metadata/properties"/>
-    <ds:schemaRef ds:uri="c0477a94-a81b-4865-9707-6c9300ae147f"/>
-    <ds:schemaRef ds:uri="http://schemas.microsoft.com/office/2006/documentManagement/types"/>
-    <ds:schemaRef ds:uri="http://purl.org/dc/terms/"/>
-    <ds:schemaRef ds:uri="http://schemas.openxmlformats.org/package/2006/metadata/core-properties"/>
-    <ds:schemaRef ds:uri="http://purl.org/dc/dcmitype/"/>
-    <ds:schemaRef ds:uri="45fda36c-df07-4f55-9922-29409b58d9d3"/>
-    <ds:schemaRef ds:uri="http://schemas.microsoft.com/office/infopath/2007/PartnerControls"/>
-    <ds:schemaRef ds:uri="http://www.w3.org/XML/1998/namespace"/>
-  </ds:schemaRefs>
-</ds:datastoreItem>
+<file path=customXml/item2.xml><?xml version="1.0" encoding="utf-8"?>
+<?mso-contentType ?>
+<FormTemplates xmlns="http://schemas.microsoft.com/sharepoint/v3/contenttype/forms">
+  <Display>DocumentLibraryForm</Display>
+  <Edit>DocumentLibraryForm</Edit>
+  <New>DocumentLibraryForm</New>
+</FormTemplates>
 </file>
 
-<file path=customXml/itemProps2.xml><?xml version="1.0" encoding="utf-8"?>
-<ds:datastoreItem xmlns:ds="http://schemas.openxmlformats.org/officeDocument/2006/customXml" ds:itemID="{10127F0B-EA07-4AFF-8549-55D4D4284DC4}">
-  <ds:schemaRefs>
-    <ds:schemaRef ds:uri="http://schemas.microsoft.com/sharepoint/v3/contenttype/forms"/>
-  </ds:schemaRefs>
-</ds:datastoreItem>
+<file path=customXml/item3.xml><?xml version="1.0" encoding="utf-8"?>
+<p:properties xmlns:p="http://schemas.microsoft.com/office/2006/metadata/properties" xmlns:xsi="http://www.w3.org/2001/XMLSchema-instance" xmlns:pc="http://schemas.microsoft.com/office/infopath/2007/PartnerControls">
+  <documentManagement/>
+</p:properties>
 </file>
 
-<file path=customXml/itemProps3.xml><?xml version="1.0" encoding="utf-8"?>
+<file path=customXml/itemProps1.xml><?xml version="1.0" encoding="utf-8"?>
 <ds:datastoreItem xmlns:ds="http://schemas.openxmlformats.org/officeDocument/2006/customXml" ds:itemID="{328FAD76-43D1-414B-B6EC-7811CDF23869}">
   <ds:schemaRefs>
     <ds:schemaRef ds:uri="http://schemas.microsoft.com/office/2006/metadata/contentType"/>
@@ -10094,4 +10239,29 @@
     <ds:schemaRef ds:uri="http://schemas.microsoft.com/internal/obd"/>
   </ds:schemaRefs>
 </ds:datastoreItem>
+</file>
+
+<file path=customXml/itemProps2.xml><?xml version="1.0" encoding="utf-8"?>
+<ds:datastoreItem xmlns:ds="http://schemas.openxmlformats.org/officeDocument/2006/customXml" ds:itemID="{10127F0B-EA07-4AFF-8549-55D4D4284DC4}">
+  <ds:schemaRefs>
+    <ds:schemaRef ds:uri="http://schemas.microsoft.com/sharepoint/v3/contenttype/forms"/>
+  </ds:schemaRefs>
+</ds:datastoreItem>
+</file>
+
+<file path=customXml/itemProps3.xml><?xml version="1.0" encoding="utf-8"?>
+<ds:datastoreItem xmlns:ds="http://schemas.openxmlformats.org/officeDocument/2006/customXml" ds:itemID="{DC2CE541-9384-4F78-A2DC-081CEDD5EAE8}">
+  <ds:schemaRefs>
+    <ds:schemaRef ds:uri="http://purl.org/dc/terms/"/>
+    <ds:schemaRef ds:uri="http://schemas.openxmlformats.org/package/2006/metadata/core-properties"/>
+    <ds:schemaRef ds:uri="http://purl.org/dc/dcmitype/"/>
+    <ds:schemaRef ds:uri="http://schemas.microsoft.com/office/2006/documentManagement/types"/>
+    <ds:schemaRef ds:uri="http://purl.org/dc/elements/1.1/"/>
+    <ds:schemaRef ds:uri="http://schemas.microsoft.com/office/2006/metadata/properties"/>
+    <ds:schemaRef ds:uri="c0477a94-a81b-4865-9707-6c9300ae147f"/>
+    <ds:schemaRef ds:uri="http://schemas.microsoft.com/office/infopath/2007/PartnerControls"/>
+    <ds:schemaRef ds:uri="45fda36c-df07-4f55-9922-29409b58d9d3"/>
+    <ds:schemaRef ds:uri="http://www.w3.org/XML/1998/namespace"/>
+  </ds:schemaRefs>
+</ds:datastoreItem>
 </file>
</xml_diff>